<commit_message>
update the wire connection section.
</commit_message>
<xml_diff>
--- a/OT_System_Attack_Case_Study/Power_CircuitBreaker/img/designDoc.pptx
+++ b/OT_System_Attack_Case_Study/Power_CircuitBreaker/img/designDoc.pptx
@@ -6,6 +6,7 @@
   </p:sldMasterIdLst>
   <p:sldIdLst>
     <p:sldId id="256" r:id="rId2"/>
+    <p:sldId id="257" r:id="rId3"/>
   </p:sldIdLst>
   <p:sldSz cx="12192000" cy="6858000"/>
   <p:notesSz cx="6858000" cy="9144000"/>
@@ -104,6 +105,11 @@
       </a:defRPr>
     </a:lvl9pPr>
   </p:defaultTextStyle>
+  <p:extLst>
+    <p:ext uri="{EFAFB233-063F-42B5-8137-9DF3F51BA10A}">
+      <p15:sldGuideLst xmlns:p15="http://schemas.microsoft.com/office/powerpoint/2012/main"/>
+    </p:ext>
+  </p:extLst>
 </p:presentation>
 </file>
 
@@ -256,7 +262,7 @@
           <a:p>
             <a:fld id="{F0EB0E7A-F811-45C0-9812-9E3D3D3B182F}" type="datetimeFigureOut">
               <a:rPr lang="en-SG" smtClean="0"/>
-              <a:t>17/9/2024</a:t>
+              <a:t>18/9/2024</a:t>
             </a:fld>
             <a:endParaRPr lang="en-SG"/>
           </a:p>
@@ -456,7 +462,7 @@
           <a:p>
             <a:fld id="{F0EB0E7A-F811-45C0-9812-9E3D3D3B182F}" type="datetimeFigureOut">
               <a:rPr lang="en-SG" smtClean="0"/>
-              <a:t>17/9/2024</a:t>
+              <a:t>18/9/2024</a:t>
             </a:fld>
             <a:endParaRPr lang="en-SG"/>
           </a:p>
@@ -666,7 +672,7 @@
           <a:p>
             <a:fld id="{F0EB0E7A-F811-45C0-9812-9E3D3D3B182F}" type="datetimeFigureOut">
               <a:rPr lang="en-SG" smtClean="0"/>
-              <a:t>17/9/2024</a:t>
+              <a:t>18/9/2024</a:t>
             </a:fld>
             <a:endParaRPr lang="en-SG"/>
           </a:p>
@@ -866,7 +872,7 @@
           <a:p>
             <a:fld id="{F0EB0E7A-F811-45C0-9812-9E3D3D3B182F}" type="datetimeFigureOut">
               <a:rPr lang="en-SG" smtClean="0"/>
-              <a:t>17/9/2024</a:t>
+              <a:t>18/9/2024</a:t>
             </a:fld>
             <a:endParaRPr lang="en-SG"/>
           </a:p>
@@ -1142,7 +1148,7 @@
           <a:p>
             <a:fld id="{F0EB0E7A-F811-45C0-9812-9E3D3D3B182F}" type="datetimeFigureOut">
               <a:rPr lang="en-SG" smtClean="0"/>
-              <a:t>17/9/2024</a:t>
+              <a:t>18/9/2024</a:t>
             </a:fld>
             <a:endParaRPr lang="en-SG"/>
           </a:p>
@@ -1410,7 +1416,7 @@
           <a:p>
             <a:fld id="{F0EB0E7A-F811-45C0-9812-9E3D3D3B182F}" type="datetimeFigureOut">
               <a:rPr lang="en-SG" smtClean="0"/>
-              <a:t>17/9/2024</a:t>
+              <a:t>18/9/2024</a:t>
             </a:fld>
             <a:endParaRPr lang="en-SG"/>
           </a:p>
@@ -1825,7 +1831,7 @@
           <a:p>
             <a:fld id="{F0EB0E7A-F811-45C0-9812-9E3D3D3B182F}" type="datetimeFigureOut">
               <a:rPr lang="en-SG" smtClean="0"/>
-              <a:t>17/9/2024</a:t>
+              <a:t>18/9/2024</a:t>
             </a:fld>
             <a:endParaRPr lang="en-SG"/>
           </a:p>
@@ -1967,7 +1973,7 @@
           <a:p>
             <a:fld id="{F0EB0E7A-F811-45C0-9812-9E3D3D3B182F}" type="datetimeFigureOut">
               <a:rPr lang="en-SG" smtClean="0"/>
-              <a:t>17/9/2024</a:t>
+              <a:t>18/9/2024</a:t>
             </a:fld>
             <a:endParaRPr lang="en-SG"/>
           </a:p>
@@ -2080,7 +2086,7 @@
           <a:p>
             <a:fld id="{F0EB0E7A-F811-45C0-9812-9E3D3D3B182F}" type="datetimeFigureOut">
               <a:rPr lang="en-SG" smtClean="0"/>
-              <a:t>17/9/2024</a:t>
+              <a:t>18/9/2024</a:t>
             </a:fld>
             <a:endParaRPr lang="en-SG"/>
           </a:p>
@@ -2393,7 +2399,7 @@
           <a:p>
             <a:fld id="{F0EB0E7A-F811-45C0-9812-9E3D3D3B182F}" type="datetimeFigureOut">
               <a:rPr lang="en-SG" smtClean="0"/>
-              <a:t>17/9/2024</a:t>
+              <a:t>18/9/2024</a:t>
             </a:fld>
             <a:endParaRPr lang="en-SG"/>
           </a:p>
@@ -2682,7 +2688,7 @@
           <a:p>
             <a:fld id="{F0EB0E7A-F811-45C0-9812-9E3D3D3B182F}" type="datetimeFigureOut">
               <a:rPr lang="en-SG" smtClean="0"/>
-              <a:t>17/9/2024</a:t>
+              <a:t>18/9/2024</a:t>
             </a:fld>
             <a:endParaRPr lang="en-SG"/>
           </a:p>
@@ -2925,7 +2931,7 @@
           <a:p>
             <a:fld id="{F0EB0E7A-F811-45C0-9812-9E3D3D3B182F}" type="datetimeFigureOut">
               <a:rPr lang="en-SG" smtClean="0"/>
-              <a:t>17/9/2024</a:t>
+              <a:t>18/9/2024</a:t>
             </a:fld>
             <a:endParaRPr lang="en-SG"/>
           </a:p>
@@ -3344,10 +3350,10 @@
       </p:grpSpPr>
       <p:pic>
         <p:nvPicPr>
-          <p:cNvPr id="5" name="Picture 4">
-            <a:extLst>
-              <a:ext uri="{FF2B5EF4-FFF2-40B4-BE49-F238E27FC236}">
-                <a16:creationId xmlns:a16="http://schemas.microsoft.com/office/drawing/2014/main" id="{1076B6AB-3F66-72D6-16B1-AA0A5C330642}"/>
+          <p:cNvPr id="9" name="Picture 8">
+            <a:extLst>
+              <a:ext uri="{FF2B5EF4-FFF2-40B4-BE49-F238E27FC236}">
+                <a16:creationId xmlns:a16="http://schemas.microsoft.com/office/drawing/2014/main" id="{375FF876-7583-FF71-0BE3-CEF10BA561B8}"/>
               </a:ext>
             </a:extLst>
           </p:cNvPr>
@@ -3364,8 +3370,8 @@
         </p:blipFill>
         <p:spPr>
           <a:xfrm>
-            <a:off x="3186651" y="1588343"/>
-            <a:ext cx="2580708" cy="2304962"/>
+            <a:off x="5331606" y="1608560"/>
+            <a:ext cx="2741454" cy="2570447"/>
           </a:xfrm>
           <a:prstGeom prst="rect">
             <a:avLst/>
@@ -3374,10 +3380,10 @@
       </p:pic>
       <p:pic>
         <p:nvPicPr>
-          <p:cNvPr id="7" name="Picture 6">
-            <a:extLst>
-              <a:ext uri="{FF2B5EF4-FFF2-40B4-BE49-F238E27FC236}">
-                <a16:creationId xmlns:a16="http://schemas.microsoft.com/office/drawing/2014/main" id="{D3F825C3-31ED-47B4-9568-A49CFC307813}"/>
+          <p:cNvPr id="5" name="Picture 4">
+            <a:extLst>
+              <a:ext uri="{FF2B5EF4-FFF2-40B4-BE49-F238E27FC236}">
+                <a16:creationId xmlns:a16="http://schemas.microsoft.com/office/drawing/2014/main" id="{1076B6AB-3F66-72D6-16B1-AA0A5C330642}"/>
               </a:ext>
             </a:extLst>
           </p:cNvPr>
@@ -3394,8 +3400,8 @@
         </p:blipFill>
         <p:spPr>
           <a:xfrm>
-            <a:off x="764863" y="1853674"/>
-            <a:ext cx="1926965" cy="2039631"/>
+            <a:off x="3204671" y="1588341"/>
+            <a:ext cx="2580708" cy="2304962"/>
           </a:xfrm>
           <a:prstGeom prst="rect">
             <a:avLst/>
@@ -3404,10 +3410,10 @@
       </p:pic>
       <p:pic>
         <p:nvPicPr>
-          <p:cNvPr id="9" name="Picture 8">
-            <a:extLst>
-              <a:ext uri="{FF2B5EF4-FFF2-40B4-BE49-F238E27FC236}">
-                <a16:creationId xmlns:a16="http://schemas.microsoft.com/office/drawing/2014/main" id="{375FF876-7583-FF71-0BE3-CEF10BA561B8}"/>
+          <p:cNvPr id="7" name="Picture 6">
+            <a:extLst>
+              <a:ext uri="{FF2B5EF4-FFF2-40B4-BE49-F238E27FC236}">
+                <a16:creationId xmlns:a16="http://schemas.microsoft.com/office/drawing/2014/main" id="{D3F825C3-31ED-47B4-9568-A49CFC307813}"/>
               </a:ext>
             </a:extLst>
           </p:cNvPr>
@@ -3424,8 +3430,8 @@
         </p:blipFill>
         <p:spPr>
           <a:xfrm>
-            <a:off x="5682638" y="1588265"/>
-            <a:ext cx="2741454" cy="2570447"/>
+            <a:off x="1165555" y="1824976"/>
+            <a:ext cx="1926965" cy="2039631"/>
           </a:xfrm>
           <a:prstGeom prst="rect">
             <a:avLst/>
@@ -3454,18 +3460,3746 @@
         </p:blipFill>
         <p:spPr>
           <a:xfrm>
-            <a:off x="7865866" y="1413228"/>
-            <a:ext cx="2548594" cy="2920519"/>
+            <a:off x="7306780" y="1481920"/>
+            <a:ext cx="2428839" cy="2783288"/>
           </a:xfrm>
           <a:prstGeom prst="rect">
             <a:avLst/>
           </a:prstGeom>
         </p:spPr>
       </p:pic>
+      <p:pic>
+        <p:nvPicPr>
+          <p:cNvPr id="3" name="Picture 2" descr="A close-up of a device&#10;&#10;Description automatically generated">
+            <a:extLst>
+              <a:ext uri="{FF2B5EF4-FFF2-40B4-BE49-F238E27FC236}">
+                <a16:creationId xmlns:a16="http://schemas.microsoft.com/office/drawing/2014/main" id="{3ADD7C90-C484-EA7E-84DC-ECF9B8E9A68E}"/>
+              </a:ext>
+            </a:extLst>
+          </p:cNvPr>
+          <p:cNvPicPr>
+            <a:picLocks noChangeAspect="1"/>
+          </p:cNvPicPr>
+          <p:nvPr/>
+        </p:nvPicPr>
+        <p:blipFill>
+          <a:blip r:embed="rId6">
+            <a:extLst>
+              <a:ext uri="{28A0092B-C50C-407E-A947-70E740481C1C}">
+                <a14:useLocalDpi xmlns:a14="http://schemas.microsoft.com/office/drawing/2010/main" val="0"/>
+              </a:ext>
+            </a:extLst>
+          </a:blip>
+          <a:stretch>
+            <a:fillRect/>
+          </a:stretch>
+        </p:blipFill>
+        <p:spPr>
+          <a:xfrm>
+            <a:off x="9448451" y="1630371"/>
+            <a:ext cx="2428840" cy="2428840"/>
+          </a:xfrm>
+          <a:prstGeom prst="rect">
+            <a:avLst/>
+          </a:prstGeom>
+        </p:spPr>
+      </p:pic>
+      <p:sp>
+        <p:nvSpPr>
+          <p:cNvPr id="4" name="TextBox 3">
+            <a:extLst>
+              <a:ext uri="{FF2B5EF4-FFF2-40B4-BE49-F238E27FC236}">
+                <a16:creationId xmlns:a16="http://schemas.microsoft.com/office/drawing/2014/main" id="{2480EA78-7D26-4965-6FB7-7A6EADDC84AA}"/>
+              </a:ext>
+            </a:extLst>
+          </p:cNvPr>
+          <p:cNvSpPr txBox="1"/>
+          <p:nvPr/>
+        </p:nvSpPr>
+        <p:spPr>
+          <a:xfrm>
+            <a:off x="1262491" y="4019943"/>
+            <a:ext cx="1662451" cy="738664"/>
+          </a:xfrm>
+          <a:prstGeom prst="rect">
+            <a:avLst/>
+          </a:prstGeom>
+          <a:noFill/>
+        </p:spPr>
+        <p:txBody>
+          <a:bodyPr wrap="square">
+            <a:spAutoFit/>
+          </a:bodyPr>
+          <a:lstStyle/>
+          <a:p>
+            <a:r>
+              <a:rPr lang="en-US" sz="1400" b="1" dirty="0" err="1"/>
+              <a:t>Weidmuller</a:t>
+            </a:r>
+            <a:r>
+              <a:rPr lang="en-US" sz="1400" b="1" dirty="0"/>
+              <a:t> 2614860000 TOP 5VDC 48VDC0.1A</a:t>
+            </a:r>
+            <a:endParaRPr lang="en-SG" sz="1400" b="1" dirty="0"/>
+          </a:p>
+        </p:txBody>
+      </p:sp>
+      <p:sp>
+        <p:nvSpPr>
+          <p:cNvPr id="6" name="TextBox 5">
+            <a:extLst>
+              <a:ext uri="{FF2B5EF4-FFF2-40B4-BE49-F238E27FC236}">
+                <a16:creationId xmlns:a16="http://schemas.microsoft.com/office/drawing/2014/main" id="{4963922F-168B-5A9C-2E29-8CD3182FD3D7}"/>
+              </a:ext>
+            </a:extLst>
+          </p:cNvPr>
+          <p:cNvSpPr txBox="1"/>
+          <p:nvPr/>
+        </p:nvSpPr>
+        <p:spPr>
+          <a:xfrm>
+            <a:off x="3443148" y="4019943"/>
+            <a:ext cx="1952622" cy="738664"/>
+          </a:xfrm>
+          <a:prstGeom prst="rect">
+            <a:avLst/>
+          </a:prstGeom>
+          <a:noFill/>
+        </p:spPr>
+        <p:txBody>
+          <a:bodyPr wrap="square">
+            <a:spAutoFit/>
+          </a:bodyPr>
+          <a:lstStyle/>
+          <a:p>
+            <a:r>
+              <a:rPr lang="en-US" sz="1400" b="1" dirty="0"/>
+              <a:t>Schneider Electric Acti 9 - ARA auto recloser aux for </a:t>
+            </a:r>
+            <a:r>
+              <a:rPr lang="en-US" sz="1400" b="1" dirty="0" err="1"/>
+              <a:t>iID</a:t>
+            </a:r>
+            <a:r>
+              <a:rPr lang="en-US" sz="1400" b="1" dirty="0"/>
+              <a:t> 2P</a:t>
+            </a:r>
+            <a:endParaRPr lang="en-SG" sz="1400" b="1" dirty="0"/>
+          </a:p>
+        </p:txBody>
+      </p:sp>
+      <p:sp>
+        <p:nvSpPr>
+          <p:cNvPr id="8" name="TextBox 7">
+            <a:extLst>
+              <a:ext uri="{FF2B5EF4-FFF2-40B4-BE49-F238E27FC236}">
+                <a16:creationId xmlns:a16="http://schemas.microsoft.com/office/drawing/2014/main" id="{919D21F2-D3FA-69AB-F4B2-00DE60DBFC66}"/>
+              </a:ext>
+            </a:extLst>
+          </p:cNvPr>
+          <p:cNvSpPr txBox="1"/>
+          <p:nvPr/>
+        </p:nvSpPr>
+        <p:spPr>
+          <a:xfrm>
+            <a:off x="5874141" y="4022516"/>
+            <a:ext cx="1880021" cy="738664"/>
+          </a:xfrm>
+          <a:prstGeom prst="rect">
+            <a:avLst/>
+          </a:prstGeom>
+          <a:noFill/>
+        </p:spPr>
+        <p:txBody>
+          <a:bodyPr wrap="square">
+            <a:spAutoFit/>
+          </a:bodyPr>
+          <a:lstStyle/>
+          <a:p>
+            <a:r>
+              <a:rPr lang="en-US" sz="1400" b="1" dirty="0"/>
+              <a:t>Schneider Electric A9F04206 MCBs IC60N 2P, 6A C</a:t>
+            </a:r>
+            <a:endParaRPr lang="en-SG" sz="1400" b="1" dirty="0"/>
+          </a:p>
+        </p:txBody>
+      </p:sp>
+      <p:sp>
+        <p:nvSpPr>
+          <p:cNvPr id="10" name="TextBox 9">
+            <a:extLst>
+              <a:ext uri="{FF2B5EF4-FFF2-40B4-BE49-F238E27FC236}">
+                <a16:creationId xmlns:a16="http://schemas.microsoft.com/office/drawing/2014/main" id="{66132961-5954-9DEA-09C2-5C752C4BE467}"/>
+              </a:ext>
+            </a:extLst>
+          </p:cNvPr>
+          <p:cNvSpPr txBox="1"/>
+          <p:nvPr/>
+        </p:nvSpPr>
+        <p:spPr>
+          <a:xfrm>
+            <a:off x="7802434" y="4050482"/>
+            <a:ext cx="1792027" cy="954107"/>
+          </a:xfrm>
+          <a:prstGeom prst="rect">
+            <a:avLst/>
+          </a:prstGeom>
+          <a:noFill/>
+        </p:spPr>
+        <p:txBody>
+          <a:bodyPr wrap="square">
+            <a:spAutoFit/>
+          </a:bodyPr>
+          <a:lstStyle/>
+          <a:p>
+            <a:r>
+              <a:rPr lang="en-US" sz="1400" b="1" dirty="0"/>
+              <a:t>Schneider Electric A9A26924 - Acti 9 - Auxiliary contact </a:t>
+            </a:r>
+            <a:r>
+              <a:rPr lang="en-US" sz="1400" b="1" dirty="0" err="1"/>
+              <a:t>iOF</a:t>
+            </a:r>
+            <a:r>
+              <a:rPr lang="en-US" sz="1400" b="1" dirty="0"/>
+              <a:t> - 1 C/O - AC/DC</a:t>
+            </a:r>
+            <a:endParaRPr lang="en-SG" sz="1400" b="1" dirty="0"/>
+          </a:p>
+        </p:txBody>
+      </p:sp>
+      <p:sp>
+        <p:nvSpPr>
+          <p:cNvPr id="12" name="TextBox 11">
+            <a:extLst>
+              <a:ext uri="{FF2B5EF4-FFF2-40B4-BE49-F238E27FC236}">
+                <a16:creationId xmlns:a16="http://schemas.microsoft.com/office/drawing/2014/main" id="{E6B19E3C-8A10-C8F1-5701-68461E101528}"/>
+              </a:ext>
+            </a:extLst>
+          </p:cNvPr>
+          <p:cNvSpPr txBox="1"/>
+          <p:nvPr/>
+        </p:nvSpPr>
+        <p:spPr>
+          <a:xfrm>
+            <a:off x="9807347" y="4111676"/>
+            <a:ext cx="1792027" cy="738664"/>
+          </a:xfrm>
+          <a:prstGeom prst="rect">
+            <a:avLst/>
+          </a:prstGeom>
+          <a:noFill/>
+        </p:spPr>
+        <p:txBody>
+          <a:bodyPr wrap="square">
+            <a:spAutoFit/>
+          </a:bodyPr>
+          <a:lstStyle/>
+          <a:p>
+            <a:r>
+              <a:rPr lang="en-US" sz="1400" b="1" dirty="0"/>
+              <a:t>Schneider Electric </a:t>
+            </a:r>
+            <a:r>
+              <a:rPr lang="en-US" sz="1400" b="1" dirty="0" err="1"/>
+              <a:t>Modicon</a:t>
+            </a:r>
+            <a:r>
+              <a:rPr lang="en-US" sz="1400" b="1" dirty="0"/>
+              <a:t> M221 Nano PLC</a:t>
+            </a:r>
+            <a:endParaRPr lang="en-SG" sz="1400" b="1" dirty="0"/>
+          </a:p>
+        </p:txBody>
+      </p:sp>
+      <p:sp>
+        <p:nvSpPr>
+          <p:cNvPr id="13" name="TextBox 12">
+            <a:extLst>
+              <a:ext uri="{FF2B5EF4-FFF2-40B4-BE49-F238E27FC236}">
+                <a16:creationId xmlns:a16="http://schemas.microsoft.com/office/drawing/2014/main" id="{EEC9B0DB-1832-6642-0521-297E73877417}"/>
+              </a:ext>
+            </a:extLst>
+          </p:cNvPr>
+          <p:cNvSpPr txBox="1"/>
+          <p:nvPr/>
+        </p:nvSpPr>
+        <p:spPr>
+          <a:xfrm>
+            <a:off x="1290121" y="948949"/>
+            <a:ext cx="1662451" cy="523220"/>
+          </a:xfrm>
+          <a:prstGeom prst="rect">
+            <a:avLst/>
+          </a:prstGeom>
+          <a:noFill/>
+        </p:spPr>
+        <p:txBody>
+          <a:bodyPr wrap="square">
+            <a:spAutoFit/>
+          </a:bodyPr>
+          <a:lstStyle/>
+          <a:p>
+            <a:r>
+              <a:rPr lang="en-US" sz="1400" b="1" dirty="0">
+                <a:solidFill>
+                  <a:schemeClr val="tx2">
+                    <a:lumMod val="90000"/>
+                    <a:lumOff val="10000"/>
+                  </a:schemeClr>
+                </a:solidFill>
+              </a:rPr>
+              <a:t>5V-DC Relay with 48V-DC Contact</a:t>
+            </a:r>
+            <a:endParaRPr lang="en-SG" sz="1400" b="1" dirty="0">
+              <a:solidFill>
+                <a:schemeClr val="tx2">
+                  <a:lumMod val="90000"/>
+                  <a:lumOff val="10000"/>
+                </a:schemeClr>
+              </a:solidFill>
+            </a:endParaRPr>
+          </a:p>
+        </p:txBody>
+      </p:sp>
+      <p:sp>
+        <p:nvSpPr>
+          <p:cNvPr id="14" name="TextBox 13">
+            <a:extLst>
+              <a:ext uri="{FF2B5EF4-FFF2-40B4-BE49-F238E27FC236}">
+                <a16:creationId xmlns:a16="http://schemas.microsoft.com/office/drawing/2014/main" id="{1AF78D00-77B5-2A9D-3618-13AA36116725}"/>
+              </a:ext>
+            </a:extLst>
+          </p:cNvPr>
+          <p:cNvSpPr txBox="1"/>
+          <p:nvPr/>
+        </p:nvSpPr>
+        <p:spPr>
+          <a:xfrm>
+            <a:off x="5644329" y="948949"/>
+            <a:ext cx="1662451" cy="523220"/>
+          </a:xfrm>
+          <a:prstGeom prst="rect">
+            <a:avLst/>
+          </a:prstGeom>
+          <a:noFill/>
+        </p:spPr>
+        <p:txBody>
+          <a:bodyPr wrap="square">
+            <a:spAutoFit/>
+          </a:bodyPr>
+          <a:lstStyle/>
+          <a:p>
+            <a:r>
+              <a:rPr lang="en-US" sz="1400" b="1" dirty="0">
+                <a:solidFill>
+                  <a:schemeClr val="tx2">
+                    <a:lumMod val="90000"/>
+                    <a:lumOff val="10000"/>
+                  </a:schemeClr>
+                </a:solidFill>
+              </a:rPr>
+              <a:t>High Voltage AC Circuit Breaker</a:t>
+            </a:r>
+            <a:endParaRPr lang="en-SG" sz="1400" b="1" dirty="0">
+              <a:solidFill>
+                <a:schemeClr val="tx2">
+                  <a:lumMod val="90000"/>
+                  <a:lumOff val="10000"/>
+                </a:schemeClr>
+              </a:solidFill>
+            </a:endParaRPr>
+          </a:p>
+        </p:txBody>
+      </p:sp>
+      <p:sp>
+        <p:nvSpPr>
+          <p:cNvPr id="15" name="TextBox 14">
+            <a:extLst>
+              <a:ext uri="{FF2B5EF4-FFF2-40B4-BE49-F238E27FC236}">
+                <a16:creationId xmlns:a16="http://schemas.microsoft.com/office/drawing/2014/main" id="{CC29BCBA-8612-2DA1-014F-143314B8666F}"/>
+              </a:ext>
+            </a:extLst>
+          </p:cNvPr>
+          <p:cNvSpPr txBox="1"/>
+          <p:nvPr/>
+        </p:nvSpPr>
+        <p:spPr>
+          <a:xfrm>
+            <a:off x="3443148" y="931933"/>
+            <a:ext cx="1662451" cy="523220"/>
+          </a:xfrm>
+          <a:prstGeom prst="rect">
+            <a:avLst/>
+          </a:prstGeom>
+          <a:noFill/>
+        </p:spPr>
+        <p:txBody>
+          <a:bodyPr wrap="square">
+            <a:spAutoFit/>
+          </a:bodyPr>
+          <a:lstStyle/>
+          <a:p>
+            <a:r>
+              <a:rPr lang="en-US" sz="1400" b="1" dirty="0">
+                <a:solidFill>
+                  <a:schemeClr val="tx2">
+                    <a:lumMod val="90000"/>
+                    <a:lumOff val="10000"/>
+                  </a:schemeClr>
+                </a:solidFill>
+              </a:rPr>
+              <a:t>Breaker Control Motor</a:t>
+            </a:r>
+            <a:endParaRPr lang="en-SG" sz="1400" b="1" dirty="0">
+              <a:solidFill>
+                <a:schemeClr val="tx2">
+                  <a:lumMod val="90000"/>
+                  <a:lumOff val="10000"/>
+                </a:schemeClr>
+              </a:solidFill>
+            </a:endParaRPr>
+          </a:p>
+        </p:txBody>
+      </p:sp>
+      <p:sp>
+        <p:nvSpPr>
+          <p:cNvPr id="16" name="TextBox 15">
+            <a:extLst>
+              <a:ext uri="{FF2B5EF4-FFF2-40B4-BE49-F238E27FC236}">
+                <a16:creationId xmlns:a16="http://schemas.microsoft.com/office/drawing/2014/main" id="{B841DB09-ECC3-11CC-135C-8CAC01F4311D}"/>
+              </a:ext>
+            </a:extLst>
+          </p:cNvPr>
+          <p:cNvSpPr txBox="1"/>
+          <p:nvPr/>
+        </p:nvSpPr>
+        <p:spPr>
+          <a:xfrm>
+            <a:off x="7709301" y="948949"/>
+            <a:ext cx="1662451" cy="523220"/>
+          </a:xfrm>
+          <a:prstGeom prst="rect">
+            <a:avLst/>
+          </a:prstGeom>
+          <a:noFill/>
+        </p:spPr>
+        <p:txBody>
+          <a:bodyPr wrap="square">
+            <a:spAutoFit/>
+          </a:bodyPr>
+          <a:lstStyle/>
+          <a:p>
+            <a:r>
+              <a:rPr lang="en-US" sz="1400" b="1" dirty="0">
+                <a:solidFill>
+                  <a:schemeClr val="tx2">
+                    <a:lumMod val="90000"/>
+                    <a:lumOff val="10000"/>
+                  </a:schemeClr>
+                </a:solidFill>
+              </a:rPr>
+              <a:t>Breaker State Sensor</a:t>
+            </a:r>
+            <a:endParaRPr lang="en-SG" sz="1400" b="1" dirty="0">
+              <a:solidFill>
+                <a:schemeClr val="tx2">
+                  <a:lumMod val="90000"/>
+                  <a:lumOff val="10000"/>
+                </a:schemeClr>
+              </a:solidFill>
+            </a:endParaRPr>
+          </a:p>
+        </p:txBody>
+      </p:sp>
+      <p:sp>
+        <p:nvSpPr>
+          <p:cNvPr id="18" name="TextBox 17">
+            <a:extLst>
+              <a:ext uri="{FF2B5EF4-FFF2-40B4-BE49-F238E27FC236}">
+                <a16:creationId xmlns:a16="http://schemas.microsoft.com/office/drawing/2014/main" id="{36AE49EA-E724-54E7-87FE-D86A214FDADB}"/>
+              </a:ext>
+            </a:extLst>
+          </p:cNvPr>
+          <p:cNvSpPr txBox="1"/>
+          <p:nvPr/>
+        </p:nvSpPr>
+        <p:spPr>
+          <a:xfrm>
+            <a:off x="9594569" y="931933"/>
+            <a:ext cx="1871391" cy="523220"/>
+          </a:xfrm>
+          <a:prstGeom prst="rect">
+            <a:avLst/>
+          </a:prstGeom>
+          <a:noFill/>
+        </p:spPr>
+        <p:txBody>
+          <a:bodyPr wrap="square">
+            <a:spAutoFit/>
+          </a:bodyPr>
+          <a:lstStyle/>
+          <a:p>
+            <a:r>
+              <a:rPr lang="en-US" sz="1400" b="1" dirty="0">
+                <a:solidFill>
+                  <a:schemeClr val="tx2">
+                    <a:lumMod val="90000"/>
+                    <a:lumOff val="10000"/>
+                  </a:schemeClr>
+                </a:solidFill>
+              </a:rPr>
+              <a:t>Programmable Logic Controller (PLC)</a:t>
+            </a:r>
+            <a:endParaRPr lang="en-SG" sz="1400" b="1" dirty="0">
+              <a:solidFill>
+                <a:schemeClr val="tx2">
+                  <a:lumMod val="90000"/>
+                  <a:lumOff val="10000"/>
+                </a:schemeClr>
+              </a:solidFill>
+            </a:endParaRPr>
+          </a:p>
+        </p:txBody>
+      </p:sp>
     </p:spTree>
     <p:extLst>
       <p:ext uri="{BB962C8B-B14F-4D97-AF65-F5344CB8AC3E}">
         <p14:creationId xmlns:p14="http://schemas.microsoft.com/office/powerpoint/2010/main" val="1810838819"/>
+      </p:ext>
+    </p:extLst>
+  </p:cSld>
+  <p:clrMapOvr>
+    <a:masterClrMapping/>
+  </p:clrMapOvr>
+</p:sld>
+</file>
+
+<file path=ppt/slides/slide2.xml><?xml version="1.0" encoding="utf-8"?>
+<p:sld xmlns:a="http://schemas.openxmlformats.org/drawingml/2006/main" xmlns:r="http://schemas.openxmlformats.org/officeDocument/2006/relationships" xmlns:p="http://schemas.openxmlformats.org/presentationml/2006/main">
+  <p:cSld>
+    <p:spTree>
+      <p:nvGrpSpPr>
+        <p:cNvPr id="1" name=""/>
+        <p:cNvGrpSpPr/>
+        <p:nvPr/>
+      </p:nvGrpSpPr>
+      <p:grpSpPr>
+        <a:xfrm>
+          <a:off x="0" y="0"/>
+          <a:ext cx="0" cy="0"/>
+          <a:chOff x="0" y="0"/>
+          <a:chExt cx="0" cy="0"/>
+        </a:xfrm>
+      </p:grpSpPr>
+      <p:cxnSp>
+        <p:nvCxnSpPr>
+          <p:cNvPr id="4" name="Straight Connector 3">
+            <a:extLst>
+              <a:ext uri="{FF2B5EF4-FFF2-40B4-BE49-F238E27FC236}">
+                <a16:creationId xmlns:a16="http://schemas.microsoft.com/office/drawing/2014/main" id="{6296ECFD-4336-0875-593E-12936CE862F7}"/>
+              </a:ext>
+            </a:extLst>
+          </p:cNvPr>
+          <p:cNvCxnSpPr/>
+          <p:nvPr/>
+        </p:nvCxnSpPr>
+        <p:spPr>
+          <a:xfrm>
+            <a:off x="866331" y="900566"/>
+            <a:ext cx="10307578" cy="0"/>
+          </a:xfrm>
+          <a:prstGeom prst="line">
+            <a:avLst/>
+          </a:prstGeom>
+          <a:ln w="28575">
+            <a:solidFill>
+              <a:srgbClr val="C00000"/>
+            </a:solidFill>
+          </a:ln>
+        </p:spPr>
+        <p:style>
+          <a:lnRef idx="2">
+            <a:schemeClr val="accent1"/>
+          </a:lnRef>
+          <a:fillRef idx="0">
+            <a:schemeClr val="accent1"/>
+          </a:fillRef>
+          <a:effectRef idx="1">
+            <a:schemeClr val="accent1"/>
+          </a:effectRef>
+          <a:fontRef idx="minor">
+            <a:schemeClr val="tx1"/>
+          </a:fontRef>
+        </p:style>
+      </p:cxnSp>
+      <p:cxnSp>
+        <p:nvCxnSpPr>
+          <p:cNvPr id="5" name="Straight Connector 4">
+            <a:extLst>
+              <a:ext uri="{FF2B5EF4-FFF2-40B4-BE49-F238E27FC236}">
+                <a16:creationId xmlns:a16="http://schemas.microsoft.com/office/drawing/2014/main" id="{A15676C4-4CB1-24CA-F19C-D6A21916EEEB}"/>
+              </a:ext>
+            </a:extLst>
+          </p:cNvPr>
+          <p:cNvCxnSpPr/>
+          <p:nvPr/>
+        </p:nvCxnSpPr>
+        <p:spPr>
+          <a:xfrm>
+            <a:off x="866331" y="1268724"/>
+            <a:ext cx="10307578" cy="0"/>
+          </a:xfrm>
+          <a:prstGeom prst="line">
+            <a:avLst/>
+          </a:prstGeom>
+          <a:ln w="28575">
+            <a:solidFill>
+              <a:schemeClr val="tx2">
+                <a:lumMod val="90000"/>
+                <a:lumOff val="10000"/>
+              </a:schemeClr>
+            </a:solidFill>
+          </a:ln>
+        </p:spPr>
+        <p:style>
+          <a:lnRef idx="2">
+            <a:schemeClr val="accent1"/>
+          </a:lnRef>
+          <a:fillRef idx="0">
+            <a:schemeClr val="accent1"/>
+          </a:fillRef>
+          <a:effectRef idx="1">
+            <a:schemeClr val="accent1"/>
+          </a:effectRef>
+          <a:fontRef idx="minor">
+            <a:schemeClr val="tx1"/>
+          </a:fontRef>
+        </p:style>
+      </p:cxnSp>
+      <p:cxnSp>
+        <p:nvCxnSpPr>
+          <p:cNvPr id="6" name="Straight Connector 5">
+            <a:extLst>
+              <a:ext uri="{FF2B5EF4-FFF2-40B4-BE49-F238E27FC236}">
+                <a16:creationId xmlns:a16="http://schemas.microsoft.com/office/drawing/2014/main" id="{84EE3B42-5DB1-A000-766E-7EEEC7911A94}"/>
+              </a:ext>
+            </a:extLst>
+          </p:cNvPr>
+          <p:cNvCxnSpPr/>
+          <p:nvPr/>
+        </p:nvCxnSpPr>
+        <p:spPr>
+          <a:xfrm>
+            <a:off x="866331" y="1626607"/>
+            <a:ext cx="10307578" cy="0"/>
+          </a:xfrm>
+          <a:prstGeom prst="line">
+            <a:avLst/>
+          </a:prstGeom>
+          <a:ln w="28575">
+            <a:solidFill>
+              <a:schemeClr val="accent6">
+                <a:lumMod val="75000"/>
+              </a:schemeClr>
+            </a:solidFill>
+          </a:ln>
+        </p:spPr>
+        <p:style>
+          <a:lnRef idx="2">
+            <a:schemeClr val="accent1"/>
+          </a:lnRef>
+          <a:fillRef idx="0">
+            <a:schemeClr val="accent1"/>
+          </a:fillRef>
+          <a:effectRef idx="1">
+            <a:schemeClr val="accent1"/>
+          </a:effectRef>
+          <a:fontRef idx="minor">
+            <a:schemeClr val="tx1"/>
+          </a:fontRef>
+        </p:style>
+      </p:cxnSp>
+      <p:sp>
+        <p:nvSpPr>
+          <p:cNvPr id="7" name="TextBox 6">
+            <a:extLst>
+              <a:ext uri="{FF2B5EF4-FFF2-40B4-BE49-F238E27FC236}">
+                <a16:creationId xmlns:a16="http://schemas.microsoft.com/office/drawing/2014/main" id="{9EB41F07-05BA-83E6-84CD-C7E08DEF1939}"/>
+              </a:ext>
+            </a:extLst>
+          </p:cNvPr>
+          <p:cNvSpPr txBox="1"/>
+          <p:nvPr/>
+        </p:nvSpPr>
+        <p:spPr>
+          <a:xfrm>
+            <a:off x="786688" y="592789"/>
+            <a:ext cx="1761303" cy="307777"/>
+          </a:xfrm>
+          <a:prstGeom prst="rect">
+            <a:avLst/>
+          </a:prstGeom>
+          <a:noFill/>
+        </p:spPr>
+        <p:txBody>
+          <a:bodyPr wrap="square">
+            <a:spAutoFit/>
+          </a:bodyPr>
+          <a:lstStyle/>
+          <a:p>
+            <a:r>
+              <a:rPr lang="en-US" sz="1400" b="1" dirty="0">
+                <a:solidFill>
+                  <a:srgbClr val="C00000"/>
+                </a:solidFill>
+              </a:rPr>
+              <a:t>AC lift 220V </a:t>
+            </a:r>
+            <a:endParaRPr lang="en-SG" sz="1400" b="1" dirty="0">
+              <a:solidFill>
+                <a:srgbClr val="C00000"/>
+              </a:solidFill>
+            </a:endParaRPr>
+          </a:p>
+        </p:txBody>
+      </p:sp>
+      <p:pic>
+        <p:nvPicPr>
+          <p:cNvPr id="8" name="Picture 7">
+            <a:extLst>
+              <a:ext uri="{FF2B5EF4-FFF2-40B4-BE49-F238E27FC236}">
+                <a16:creationId xmlns:a16="http://schemas.microsoft.com/office/drawing/2014/main" id="{7DE8B184-C19E-77D3-F7DF-DE28FD41E8F6}"/>
+              </a:ext>
+            </a:extLst>
+          </p:cNvPr>
+          <p:cNvPicPr>
+            <a:picLocks noChangeAspect="1"/>
+          </p:cNvPicPr>
+          <p:nvPr/>
+        </p:nvPicPr>
+        <p:blipFill>
+          <a:blip r:embed="rId2"/>
+          <a:srcRect l="19888" r="20523"/>
+          <a:stretch/>
+        </p:blipFill>
+        <p:spPr>
+          <a:xfrm>
+            <a:off x="5024068" y="2517109"/>
+            <a:ext cx="986319" cy="1551968"/>
+          </a:xfrm>
+          <a:prstGeom prst="rect">
+            <a:avLst/>
+          </a:prstGeom>
+        </p:spPr>
+      </p:pic>
+      <p:cxnSp>
+        <p:nvCxnSpPr>
+          <p:cNvPr id="10" name="Straight Connector 9">
+            <a:extLst>
+              <a:ext uri="{FF2B5EF4-FFF2-40B4-BE49-F238E27FC236}">
+                <a16:creationId xmlns:a16="http://schemas.microsoft.com/office/drawing/2014/main" id="{AA987845-09D0-7A00-BB5A-1AD928E43AD7}"/>
+              </a:ext>
+            </a:extLst>
+          </p:cNvPr>
+          <p:cNvCxnSpPr>
+            <a:cxnSpLocks/>
+          </p:cNvCxnSpPr>
+          <p:nvPr/>
+        </p:nvCxnSpPr>
+        <p:spPr>
+          <a:xfrm>
+            <a:off x="5599421" y="900566"/>
+            <a:ext cx="0" cy="1811752"/>
+          </a:xfrm>
+          <a:prstGeom prst="line">
+            <a:avLst/>
+          </a:prstGeom>
+          <a:ln>
+            <a:solidFill>
+              <a:srgbClr val="C00000"/>
+            </a:solidFill>
+          </a:ln>
+        </p:spPr>
+        <p:style>
+          <a:lnRef idx="2">
+            <a:schemeClr val="accent1"/>
+          </a:lnRef>
+          <a:fillRef idx="0">
+            <a:schemeClr val="accent1"/>
+          </a:fillRef>
+          <a:effectRef idx="1">
+            <a:schemeClr val="accent1"/>
+          </a:effectRef>
+          <a:fontRef idx="minor">
+            <a:schemeClr val="tx1"/>
+          </a:fontRef>
+        </p:style>
+      </p:cxnSp>
+      <p:sp>
+        <p:nvSpPr>
+          <p:cNvPr id="12" name="TextBox 11">
+            <a:extLst>
+              <a:ext uri="{FF2B5EF4-FFF2-40B4-BE49-F238E27FC236}">
+                <a16:creationId xmlns:a16="http://schemas.microsoft.com/office/drawing/2014/main" id="{654A1A48-11C4-A583-9EC2-0AB844C76671}"/>
+              </a:ext>
+            </a:extLst>
+          </p:cNvPr>
+          <p:cNvSpPr txBox="1"/>
+          <p:nvPr/>
+        </p:nvSpPr>
+        <p:spPr>
+          <a:xfrm>
+            <a:off x="786688" y="986001"/>
+            <a:ext cx="1190886" cy="307777"/>
+          </a:xfrm>
+          <a:prstGeom prst="rect">
+            <a:avLst/>
+          </a:prstGeom>
+          <a:noFill/>
+        </p:spPr>
+        <p:txBody>
+          <a:bodyPr wrap="square">
+            <a:spAutoFit/>
+          </a:bodyPr>
+          <a:lstStyle/>
+          <a:p>
+            <a:r>
+              <a:rPr lang="en-US" sz="1400" b="1" dirty="0">
+                <a:solidFill>
+                  <a:schemeClr val="accent4">
+                    <a:lumMod val="50000"/>
+                  </a:schemeClr>
+                </a:solidFill>
+              </a:rPr>
+              <a:t>AC Neutral</a:t>
+            </a:r>
+            <a:endParaRPr lang="en-SG" sz="1400" b="1" dirty="0">
+              <a:solidFill>
+                <a:schemeClr val="accent4">
+                  <a:lumMod val="50000"/>
+                </a:schemeClr>
+              </a:solidFill>
+            </a:endParaRPr>
+          </a:p>
+        </p:txBody>
+      </p:sp>
+      <p:sp>
+        <p:nvSpPr>
+          <p:cNvPr id="13" name="TextBox 12">
+            <a:extLst>
+              <a:ext uri="{FF2B5EF4-FFF2-40B4-BE49-F238E27FC236}">
+                <a16:creationId xmlns:a16="http://schemas.microsoft.com/office/drawing/2014/main" id="{2CEBFE18-5D71-5EDF-6548-D89388371163}"/>
+              </a:ext>
+            </a:extLst>
+          </p:cNvPr>
+          <p:cNvSpPr txBox="1"/>
+          <p:nvPr/>
+        </p:nvSpPr>
+        <p:spPr>
+          <a:xfrm>
+            <a:off x="786688" y="1329105"/>
+            <a:ext cx="1763015" cy="307777"/>
+          </a:xfrm>
+          <a:prstGeom prst="rect">
+            <a:avLst/>
+          </a:prstGeom>
+          <a:noFill/>
+        </p:spPr>
+        <p:txBody>
+          <a:bodyPr wrap="square">
+            <a:spAutoFit/>
+          </a:bodyPr>
+          <a:lstStyle/>
+          <a:p>
+            <a:r>
+              <a:rPr lang="en-US" sz="1400" b="1" dirty="0">
+                <a:solidFill>
+                  <a:schemeClr val="accent6">
+                    <a:lumMod val="75000"/>
+                  </a:schemeClr>
+                </a:solidFill>
+              </a:rPr>
+              <a:t>AC Protective Earth </a:t>
+            </a:r>
+            <a:endParaRPr lang="en-SG" sz="1400" b="1" dirty="0">
+              <a:solidFill>
+                <a:schemeClr val="accent6">
+                  <a:lumMod val="75000"/>
+                </a:schemeClr>
+              </a:solidFill>
+            </a:endParaRPr>
+          </a:p>
+        </p:txBody>
+      </p:sp>
+      <p:cxnSp>
+        <p:nvCxnSpPr>
+          <p:cNvPr id="14" name="Straight Connector 13">
+            <a:extLst>
+              <a:ext uri="{FF2B5EF4-FFF2-40B4-BE49-F238E27FC236}">
+                <a16:creationId xmlns:a16="http://schemas.microsoft.com/office/drawing/2014/main" id="{8BCD8705-7F52-2DC8-0D7A-90E2EB682E9C}"/>
+              </a:ext>
+            </a:extLst>
+          </p:cNvPr>
+          <p:cNvCxnSpPr>
+            <a:cxnSpLocks/>
+          </p:cNvCxnSpPr>
+          <p:nvPr/>
+        </p:nvCxnSpPr>
+        <p:spPr>
+          <a:xfrm>
+            <a:off x="5381950" y="1288446"/>
+            <a:ext cx="0" cy="1423872"/>
+          </a:xfrm>
+          <a:prstGeom prst="line">
+            <a:avLst/>
+          </a:prstGeom>
+          <a:ln>
+            <a:solidFill>
+              <a:schemeClr val="tx2">
+                <a:lumMod val="75000"/>
+                <a:lumOff val="25000"/>
+              </a:schemeClr>
+            </a:solidFill>
+          </a:ln>
+        </p:spPr>
+        <p:style>
+          <a:lnRef idx="2">
+            <a:schemeClr val="accent1"/>
+          </a:lnRef>
+          <a:fillRef idx="0">
+            <a:schemeClr val="accent1"/>
+          </a:fillRef>
+          <a:effectRef idx="1">
+            <a:schemeClr val="accent1"/>
+          </a:effectRef>
+          <a:fontRef idx="minor">
+            <a:schemeClr val="tx1"/>
+          </a:fontRef>
+        </p:style>
+      </p:cxnSp>
+      <p:cxnSp>
+        <p:nvCxnSpPr>
+          <p:cNvPr id="17" name="Straight Connector 16">
+            <a:extLst>
+              <a:ext uri="{FF2B5EF4-FFF2-40B4-BE49-F238E27FC236}">
+                <a16:creationId xmlns:a16="http://schemas.microsoft.com/office/drawing/2014/main" id="{82ABE6B9-A06C-EF72-CD0D-60AF43E10403}"/>
+              </a:ext>
+            </a:extLst>
+          </p:cNvPr>
+          <p:cNvCxnSpPr>
+            <a:cxnSpLocks/>
+          </p:cNvCxnSpPr>
+          <p:nvPr/>
+        </p:nvCxnSpPr>
+        <p:spPr>
+          <a:xfrm>
+            <a:off x="942211" y="5904562"/>
+            <a:ext cx="7509918" cy="0"/>
+          </a:xfrm>
+          <a:prstGeom prst="line">
+            <a:avLst/>
+          </a:prstGeom>
+          <a:ln w="28575">
+            <a:solidFill>
+              <a:schemeClr val="accent5">
+                <a:lumMod val="75000"/>
+              </a:schemeClr>
+            </a:solidFill>
+          </a:ln>
+        </p:spPr>
+        <p:style>
+          <a:lnRef idx="2">
+            <a:schemeClr val="accent1"/>
+          </a:lnRef>
+          <a:fillRef idx="0">
+            <a:schemeClr val="accent1"/>
+          </a:fillRef>
+          <a:effectRef idx="1">
+            <a:schemeClr val="accent1"/>
+          </a:effectRef>
+          <a:fontRef idx="minor">
+            <a:schemeClr val="tx1"/>
+          </a:fontRef>
+        </p:style>
+      </p:cxnSp>
+      <p:sp>
+        <p:nvSpPr>
+          <p:cNvPr id="18" name="TextBox 17">
+            <a:extLst>
+              <a:ext uri="{FF2B5EF4-FFF2-40B4-BE49-F238E27FC236}">
+                <a16:creationId xmlns:a16="http://schemas.microsoft.com/office/drawing/2014/main" id="{D6700285-5C1B-2A39-1158-A976BEB835FC}"/>
+              </a:ext>
+            </a:extLst>
+          </p:cNvPr>
+          <p:cNvSpPr txBox="1"/>
+          <p:nvPr/>
+        </p:nvSpPr>
+        <p:spPr>
+          <a:xfrm>
+            <a:off x="907158" y="5611564"/>
+            <a:ext cx="1125222" cy="307777"/>
+          </a:xfrm>
+          <a:prstGeom prst="rect">
+            <a:avLst/>
+          </a:prstGeom>
+          <a:noFill/>
+          <a:ln>
+            <a:noFill/>
+          </a:ln>
+        </p:spPr>
+        <p:txBody>
+          <a:bodyPr wrap="square">
+            <a:spAutoFit/>
+          </a:bodyPr>
+          <a:lstStyle/>
+          <a:p>
+            <a:r>
+              <a:rPr lang="en-US" sz="1400" b="1" dirty="0">
+                <a:solidFill>
+                  <a:schemeClr val="accent5">
+                    <a:lumMod val="75000"/>
+                  </a:schemeClr>
+                </a:solidFill>
+              </a:rPr>
+              <a:t>48V DC +</a:t>
+            </a:r>
+            <a:endParaRPr lang="en-SG" sz="1400" b="1" dirty="0">
+              <a:solidFill>
+                <a:schemeClr val="accent5">
+                  <a:lumMod val="75000"/>
+                </a:schemeClr>
+              </a:solidFill>
+            </a:endParaRPr>
+          </a:p>
+        </p:txBody>
+      </p:sp>
+      <p:cxnSp>
+        <p:nvCxnSpPr>
+          <p:cNvPr id="19" name="Straight Connector 18">
+            <a:extLst>
+              <a:ext uri="{FF2B5EF4-FFF2-40B4-BE49-F238E27FC236}">
+                <a16:creationId xmlns:a16="http://schemas.microsoft.com/office/drawing/2014/main" id="{0AD1B317-8FE9-8CA0-0DDC-98824CDC1F67}"/>
+              </a:ext>
+            </a:extLst>
+          </p:cNvPr>
+          <p:cNvCxnSpPr>
+            <a:cxnSpLocks/>
+          </p:cNvCxnSpPr>
+          <p:nvPr/>
+        </p:nvCxnSpPr>
+        <p:spPr>
+          <a:xfrm>
+            <a:off x="942211" y="6231622"/>
+            <a:ext cx="7727616" cy="0"/>
+          </a:xfrm>
+          <a:prstGeom prst="line">
+            <a:avLst/>
+          </a:prstGeom>
+          <a:ln w="28575">
+            <a:solidFill>
+              <a:schemeClr val="tx1"/>
+            </a:solidFill>
+          </a:ln>
+        </p:spPr>
+        <p:style>
+          <a:lnRef idx="2">
+            <a:schemeClr val="accent1"/>
+          </a:lnRef>
+          <a:fillRef idx="0">
+            <a:schemeClr val="accent1"/>
+          </a:fillRef>
+          <a:effectRef idx="1">
+            <a:schemeClr val="accent1"/>
+          </a:effectRef>
+          <a:fontRef idx="minor">
+            <a:schemeClr val="tx1"/>
+          </a:fontRef>
+        </p:style>
+      </p:cxnSp>
+      <p:sp>
+        <p:nvSpPr>
+          <p:cNvPr id="20" name="TextBox 19">
+            <a:extLst>
+              <a:ext uri="{FF2B5EF4-FFF2-40B4-BE49-F238E27FC236}">
+                <a16:creationId xmlns:a16="http://schemas.microsoft.com/office/drawing/2014/main" id="{5738E542-CC6F-841C-91DC-5B8D8BDA6263}"/>
+              </a:ext>
+            </a:extLst>
+          </p:cNvPr>
+          <p:cNvSpPr txBox="1"/>
+          <p:nvPr/>
+        </p:nvSpPr>
+        <p:spPr>
+          <a:xfrm>
+            <a:off x="907158" y="5954668"/>
+            <a:ext cx="949946" cy="307777"/>
+          </a:xfrm>
+          <a:prstGeom prst="rect">
+            <a:avLst/>
+          </a:prstGeom>
+          <a:noFill/>
+        </p:spPr>
+        <p:txBody>
+          <a:bodyPr wrap="square">
+            <a:spAutoFit/>
+          </a:bodyPr>
+          <a:lstStyle/>
+          <a:p>
+            <a:r>
+              <a:rPr lang="en-US" sz="1400" b="1" dirty="0"/>
+              <a:t>DC- GND</a:t>
+            </a:r>
+            <a:endParaRPr lang="en-SG" sz="1400" b="1" dirty="0"/>
+          </a:p>
+        </p:txBody>
+      </p:sp>
+      <p:pic>
+        <p:nvPicPr>
+          <p:cNvPr id="21" name="Picture 20">
+            <a:extLst>
+              <a:ext uri="{FF2B5EF4-FFF2-40B4-BE49-F238E27FC236}">
+                <a16:creationId xmlns:a16="http://schemas.microsoft.com/office/drawing/2014/main" id="{36E8670B-D67D-3759-0124-AA2950FCB834}"/>
+              </a:ext>
+            </a:extLst>
+          </p:cNvPr>
+          <p:cNvPicPr>
+            <a:picLocks noChangeAspect="1"/>
+          </p:cNvPicPr>
+          <p:nvPr/>
+        </p:nvPicPr>
+        <p:blipFill>
+          <a:blip r:embed="rId3"/>
+          <a:stretch>
+            <a:fillRect/>
+          </a:stretch>
+        </p:blipFill>
+        <p:spPr>
+          <a:xfrm>
+            <a:off x="3391750" y="2577247"/>
+            <a:ext cx="1579235" cy="1410496"/>
+          </a:xfrm>
+          <a:prstGeom prst="rect">
+            <a:avLst/>
+          </a:prstGeom>
+        </p:spPr>
+      </p:pic>
+      <p:sp>
+        <p:nvSpPr>
+          <p:cNvPr id="22" name="Arrow: Right 21">
+            <a:extLst>
+              <a:ext uri="{FF2B5EF4-FFF2-40B4-BE49-F238E27FC236}">
+                <a16:creationId xmlns:a16="http://schemas.microsoft.com/office/drawing/2014/main" id="{D300ACA8-E9D9-5F84-C4B6-6D1F4A817FBC}"/>
+              </a:ext>
+            </a:extLst>
+          </p:cNvPr>
+          <p:cNvSpPr/>
+          <p:nvPr/>
+        </p:nvSpPr>
+        <p:spPr>
+          <a:xfrm>
+            <a:off x="4698719" y="3099073"/>
+            <a:ext cx="359596" cy="236306"/>
+          </a:xfrm>
+          <a:prstGeom prst="rightArrow">
+            <a:avLst/>
+          </a:prstGeom>
+        </p:spPr>
+        <p:style>
+          <a:lnRef idx="2">
+            <a:schemeClr val="accent1">
+              <a:shade val="15000"/>
+            </a:schemeClr>
+          </a:lnRef>
+          <a:fillRef idx="1">
+            <a:schemeClr val="accent1"/>
+          </a:fillRef>
+          <a:effectRef idx="0">
+            <a:schemeClr val="accent1"/>
+          </a:effectRef>
+          <a:fontRef idx="minor">
+            <a:schemeClr val="lt1"/>
+          </a:fontRef>
+        </p:style>
+        <p:txBody>
+          <a:bodyPr rtlCol="0" anchor="ctr"/>
+          <a:lstStyle/>
+          <a:p>
+            <a:pPr algn="ctr"/>
+            <a:endParaRPr lang="en-SG"/>
+          </a:p>
+        </p:txBody>
+      </p:sp>
+      <p:cxnSp>
+        <p:nvCxnSpPr>
+          <p:cNvPr id="23" name="Straight Connector 22">
+            <a:extLst>
+              <a:ext uri="{FF2B5EF4-FFF2-40B4-BE49-F238E27FC236}">
+                <a16:creationId xmlns:a16="http://schemas.microsoft.com/office/drawing/2014/main" id="{016DBD02-99CA-BFBF-4BBB-FE0DD9A5D4F7}"/>
+              </a:ext>
+            </a:extLst>
+          </p:cNvPr>
+          <p:cNvCxnSpPr>
+            <a:cxnSpLocks/>
+          </p:cNvCxnSpPr>
+          <p:nvPr/>
+        </p:nvCxnSpPr>
+        <p:spPr>
+          <a:xfrm>
+            <a:off x="3984666" y="900566"/>
+            <a:ext cx="0" cy="1811752"/>
+          </a:xfrm>
+          <a:prstGeom prst="line">
+            <a:avLst/>
+          </a:prstGeom>
+          <a:ln>
+            <a:solidFill>
+              <a:srgbClr val="C00000"/>
+            </a:solidFill>
+          </a:ln>
+        </p:spPr>
+        <p:style>
+          <a:lnRef idx="2">
+            <a:schemeClr val="accent1"/>
+          </a:lnRef>
+          <a:fillRef idx="0">
+            <a:schemeClr val="accent1"/>
+          </a:fillRef>
+          <a:effectRef idx="1">
+            <a:schemeClr val="accent1"/>
+          </a:effectRef>
+          <a:fontRef idx="minor">
+            <a:schemeClr val="tx1"/>
+          </a:fontRef>
+        </p:style>
+      </p:cxnSp>
+      <p:cxnSp>
+        <p:nvCxnSpPr>
+          <p:cNvPr id="24" name="Straight Connector 23">
+            <a:extLst>
+              <a:ext uri="{FF2B5EF4-FFF2-40B4-BE49-F238E27FC236}">
+                <a16:creationId xmlns:a16="http://schemas.microsoft.com/office/drawing/2014/main" id="{5C7B3C6B-EADA-20E1-17AF-A59E85DD992B}"/>
+              </a:ext>
+            </a:extLst>
+          </p:cNvPr>
+          <p:cNvCxnSpPr>
+            <a:cxnSpLocks/>
+          </p:cNvCxnSpPr>
+          <p:nvPr/>
+        </p:nvCxnSpPr>
+        <p:spPr>
+          <a:xfrm>
+            <a:off x="3880210" y="1288446"/>
+            <a:ext cx="0" cy="1423872"/>
+          </a:xfrm>
+          <a:prstGeom prst="line">
+            <a:avLst/>
+          </a:prstGeom>
+          <a:ln>
+            <a:solidFill>
+              <a:schemeClr val="tx2">
+                <a:lumMod val="75000"/>
+                <a:lumOff val="25000"/>
+              </a:schemeClr>
+            </a:solidFill>
+          </a:ln>
+        </p:spPr>
+        <p:style>
+          <a:lnRef idx="2">
+            <a:schemeClr val="accent1"/>
+          </a:lnRef>
+          <a:fillRef idx="0">
+            <a:schemeClr val="accent1"/>
+          </a:fillRef>
+          <a:effectRef idx="1">
+            <a:schemeClr val="accent1"/>
+          </a:effectRef>
+          <a:fontRef idx="minor">
+            <a:schemeClr val="tx1"/>
+          </a:fontRef>
+        </p:style>
+      </p:cxnSp>
+      <p:cxnSp>
+        <p:nvCxnSpPr>
+          <p:cNvPr id="26" name="Straight Connector 25">
+            <a:extLst>
+              <a:ext uri="{FF2B5EF4-FFF2-40B4-BE49-F238E27FC236}">
+                <a16:creationId xmlns:a16="http://schemas.microsoft.com/office/drawing/2014/main" id="{E1B4FABD-1EFF-E879-0036-DFDFF0E29640}"/>
+              </a:ext>
+            </a:extLst>
+          </p:cNvPr>
+          <p:cNvCxnSpPr/>
+          <p:nvPr/>
+        </p:nvCxnSpPr>
+        <p:spPr>
+          <a:xfrm>
+            <a:off x="3750072" y="1636882"/>
+            <a:ext cx="0" cy="1075436"/>
+          </a:xfrm>
+          <a:prstGeom prst="line">
+            <a:avLst/>
+          </a:prstGeom>
+          <a:ln>
+            <a:solidFill>
+              <a:schemeClr val="accent6">
+                <a:lumMod val="75000"/>
+              </a:schemeClr>
+            </a:solidFill>
+          </a:ln>
+        </p:spPr>
+        <p:style>
+          <a:lnRef idx="2">
+            <a:schemeClr val="accent1"/>
+          </a:lnRef>
+          <a:fillRef idx="0">
+            <a:schemeClr val="accent1"/>
+          </a:fillRef>
+          <a:effectRef idx="1">
+            <a:schemeClr val="accent1"/>
+          </a:effectRef>
+          <a:fontRef idx="minor">
+            <a:schemeClr val="tx1"/>
+          </a:fontRef>
+        </p:style>
+      </p:cxnSp>
+      <p:cxnSp>
+        <p:nvCxnSpPr>
+          <p:cNvPr id="28" name="Straight Connector 27">
+            <a:extLst>
+              <a:ext uri="{FF2B5EF4-FFF2-40B4-BE49-F238E27FC236}">
+                <a16:creationId xmlns:a16="http://schemas.microsoft.com/office/drawing/2014/main" id="{6D792D60-7DBF-D224-6E6F-D3E78B2EAF50}"/>
+              </a:ext>
+            </a:extLst>
+          </p:cNvPr>
+          <p:cNvCxnSpPr>
+            <a:cxnSpLocks/>
+          </p:cNvCxnSpPr>
+          <p:nvPr/>
+        </p:nvCxnSpPr>
+        <p:spPr>
+          <a:xfrm>
+            <a:off x="942211" y="5509548"/>
+            <a:ext cx="7482598" cy="14779"/>
+          </a:xfrm>
+          <a:prstGeom prst="line">
+            <a:avLst/>
+          </a:prstGeom>
+          <a:ln w="28575">
+            <a:solidFill>
+              <a:srgbClr val="FFC000"/>
+            </a:solidFill>
+          </a:ln>
+        </p:spPr>
+        <p:style>
+          <a:lnRef idx="2">
+            <a:schemeClr val="accent1"/>
+          </a:lnRef>
+          <a:fillRef idx="0">
+            <a:schemeClr val="accent1"/>
+          </a:fillRef>
+          <a:effectRef idx="1">
+            <a:schemeClr val="accent1"/>
+          </a:effectRef>
+          <a:fontRef idx="minor">
+            <a:schemeClr val="tx1"/>
+          </a:fontRef>
+        </p:style>
+      </p:cxnSp>
+      <p:sp>
+        <p:nvSpPr>
+          <p:cNvPr id="29" name="TextBox 28">
+            <a:extLst>
+              <a:ext uri="{FF2B5EF4-FFF2-40B4-BE49-F238E27FC236}">
+                <a16:creationId xmlns:a16="http://schemas.microsoft.com/office/drawing/2014/main" id="{99977859-13E9-0FC9-DBE3-C6BAC68B470B}"/>
+              </a:ext>
+            </a:extLst>
+          </p:cNvPr>
+          <p:cNvSpPr txBox="1"/>
+          <p:nvPr/>
+        </p:nvSpPr>
+        <p:spPr>
+          <a:xfrm>
+            <a:off x="907158" y="5216550"/>
+            <a:ext cx="1125222" cy="307777"/>
+          </a:xfrm>
+          <a:prstGeom prst="rect">
+            <a:avLst/>
+          </a:prstGeom>
+          <a:noFill/>
+        </p:spPr>
+        <p:txBody>
+          <a:bodyPr wrap="square">
+            <a:spAutoFit/>
+          </a:bodyPr>
+          <a:lstStyle/>
+          <a:p>
+            <a:r>
+              <a:rPr lang="en-US" sz="1400" b="1" dirty="0">
+                <a:solidFill>
+                  <a:srgbClr val="FFC000"/>
+                </a:solidFill>
+              </a:rPr>
+              <a:t>5V DC +</a:t>
+            </a:r>
+            <a:endParaRPr lang="en-SG" sz="1400" b="1" dirty="0">
+              <a:solidFill>
+                <a:srgbClr val="FFC000"/>
+              </a:solidFill>
+            </a:endParaRPr>
+          </a:p>
+        </p:txBody>
+      </p:sp>
+      <p:pic>
+        <p:nvPicPr>
+          <p:cNvPr id="30" name="Picture 29">
+            <a:extLst>
+              <a:ext uri="{FF2B5EF4-FFF2-40B4-BE49-F238E27FC236}">
+                <a16:creationId xmlns:a16="http://schemas.microsoft.com/office/drawing/2014/main" id="{9EDE8F38-5E60-5C89-7075-F587248FB803}"/>
+              </a:ext>
+            </a:extLst>
+          </p:cNvPr>
+          <p:cNvPicPr>
+            <a:picLocks noChangeAspect="1"/>
+          </p:cNvPicPr>
+          <p:nvPr/>
+        </p:nvPicPr>
+        <p:blipFill>
+          <a:blip r:embed="rId4"/>
+          <a:stretch>
+            <a:fillRect/>
+          </a:stretch>
+        </p:blipFill>
+        <p:spPr>
+          <a:xfrm>
+            <a:off x="1994665" y="2587844"/>
+            <a:ext cx="1230872" cy="1410497"/>
+          </a:xfrm>
+          <a:prstGeom prst="rect">
+            <a:avLst/>
+          </a:prstGeom>
+        </p:spPr>
+      </p:pic>
+      <p:sp>
+        <p:nvSpPr>
+          <p:cNvPr id="31" name="Arrow: Right 30">
+            <a:extLst>
+              <a:ext uri="{FF2B5EF4-FFF2-40B4-BE49-F238E27FC236}">
+                <a16:creationId xmlns:a16="http://schemas.microsoft.com/office/drawing/2014/main" id="{97ACA591-D15B-5D9A-17C7-99BA93D17637}"/>
+              </a:ext>
+            </a:extLst>
+          </p:cNvPr>
+          <p:cNvSpPr/>
+          <p:nvPr/>
+        </p:nvSpPr>
+        <p:spPr>
+          <a:xfrm>
+            <a:off x="2971823" y="3116937"/>
+            <a:ext cx="359596" cy="236306"/>
+          </a:xfrm>
+          <a:prstGeom prst="rightArrow">
+            <a:avLst/>
+          </a:prstGeom>
+        </p:spPr>
+        <p:style>
+          <a:lnRef idx="2">
+            <a:schemeClr val="accent1">
+              <a:shade val="15000"/>
+            </a:schemeClr>
+          </a:lnRef>
+          <a:fillRef idx="1">
+            <a:schemeClr val="accent1"/>
+          </a:fillRef>
+          <a:effectRef idx="0">
+            <a:schemeClr val="accent1"/>
+          </a:effectRef>
+          <a:fontRef idx="minor">
+            <a:schemeClr val="lt1"/>
+          </a:fontRef>
+        </p:style>
+        <p:txBody>
+          <a:bodyPr rtlCol="0" anchor="ctr"/>
+          <a:lstStyle/>
+          <a:p>
+            <a:pPr algn="ctr"/>
+            <a:endParaRPr lang="en-SG"/>
+          </a:p>
+        </p:txBody>
+      </p:sp>
+      <p:pic>
+        <p:nvPicPr>
+          <p:cNvPr id="32" name="Picture 31">
+            <a:extLst>
+              <a:ext uri="{FF2B5EF4-FFF2-40B4-BE49-F238E27FC236}">
+                <a16:creationId xmlns:a16="http://schemas.microsoft.com/office/drawing/2014/main" id="{BB0CBABD-3CA3-28F1-1DB1-BFD0EE2C52A9}"/>
+              </a:ext>
+            </a:extLst>
+          </p:cNvPr>
+          <p:cNvPicPr>
+            <a:picLocks noChangeAspect="1"/>
+          </p:cNvPicPr>
+          <p:nvPr/>
+        </p:nvPicPr>
+        <p:blipFill>
+          <a:blip r:embed="rId5"/>
+          <a:stretch>
+            <a:fillRect/>
+          </a:stretch>
+        </p:blipFill>
+        <p:spPr>
+          <a:xfrm>
+            <a:off x="6609842" y="2670699"/>
+            <a:ext cx="1125010" cy="1190787"/>
+          </a:xfrm>
+          <a:prstGeom prst="rect">
+            <a:avLst/>
+          </a:prstGeom>
+        </p:spPr>
+      </p:pic>
+      <p:pic>
+        <p:nvPicPr>
+          <p:cNvPr id="33" name="Picture 32" descr="A close-up of a device&#10;&#10;Description automatically generated">
+            <a:extLst>
+              <a:ext uri="{FF2B5EF4-FFF2-40B4-BE49-F238E27FC236}">
+                <a16:creationId xmlns:a16="http://schemas.microsoft.com/office/drawing/2014/main" id="{F000095D-F464-FFA5-67AD-5355663D2DBC}"/>
+              </a:ext>
+            </a:extLst>
+          </p:cNvPr>
+          <p:cNvPicPr>
+            <a:picLocks noChangeAspect="1"/>
+          </p:cNvPicPr>
+          <p:nvPr/>
+        </p:nvPicPr>
+        <p:blipFill>
+          <a:blip r:embed="rId6">
+            <a:extLst>
+              <a:ext uri="{28A0092B-C50C-407E-A947-70E740481C1C}">
+                <a14:useLocalDpi xmlns:a14="http://schemas.microsoft.com/office/drawing/2010/main" val="0"/>
+              </a:ext>
+            </a:extLst>
+          </a:blip>
+          <a:stretch>
+            <a:fillRect/>
+          </a:stretch>
+        </p:blipFill>
+        <p:spPr>
+          <a:xfrm>
+            <a:off x="8141360" y="2276522"/>
+            <a:ext cx="1689648" cy="1689648"/>
+          </a:xfrm>
+          <a:prstGeom prst="rect">
+            <a:avLst/>
+          </a:prstGeom>
+        </p:spPr>
+      </p:pic>
+      <p:cxnSp>
+        <p:nvCxnSpPr>
+          <p:cNvPr id="34" name="Straight Connector 33">
+            <a:extLst>
+              <a:ext uri="{FF2B5EF4-FFF2-40B4-BE49-F238E27FC236}">
+                <a16:creationId xmlns:a16="http://schemas.microsoft.com/office/drawing/2014/main" id="{8DA95922-9BAB-B682-6EB2-EAE6BFBD0432}"/>
+              </a:ext>
+            </a:extLst>
+          </p:cNvPr>
+          <p:cNvCxnSpPr>
+            <a:cxnSpLocks/>
+          </p:cNvCxnSpPr>
+          <p:nvPr/>
+        </p:nvCxnSpPr>
+        <p:spPr>
+          <a:xfrm>
+            <a:off x="6748414" y="3861486"/>
+            <a:ext cx="0" cy="2057855"/>
+          </a:xfrm>
+          <a:prstGeom prst="line">
+            <a:avLst/>
+          </a:prstGeom>
+          <a:ln>
+            <a:solidFill>
+              <a:schemeClr val="accent5">
+                <a:lumMod val="75000"/>
+              </a:schemeClr>
+            </a:solidFill>
+          </a:ln>
+        </p:spPr>
+        <p:style>
+          <a:lnRef idx="2">
+            <a:schemeClr val="accent1"/>
+          </a:lnRef>
+          <a:fillRef idx="0">
+            <a:schemeClr val="accent1"/>
+          </a:fillRef>
+          <a:effectRef idx="1">
+            <a:schemeClr val="accent1"/>
+          </a:effectRef>
+          <a:fontRef idx="minor">
+            <a:schemeClr val="tx1"/>
+          </a:fontRef>
+        </p:style>
+      </p:cxnSp>
+      <p:cxnSp>
+        <p:nvCxnSpPr>
+          <p:cNvPr id="37" name="Straight Connector 36">
+            <a:extLst>
+              <a:ext uri="{FF2B5EF4-FFF2-40B4-BE49-F238E27FC236}">
+                <a16:creationId xmlns:a16="http://schemas.microsoft.com/office/drawing/2014/main" id="{832F70DA-3454-162E-7B67-A433216B6630}"/>
+              </a:ext>
+            </a:extLst>
+          </p:cNvPr>
+          <p:cNvCxnSpPr>
+            <a:cxnSpLocks/>
+          </p:cNvCxnSpPr>
+          <p:nvPr/>
+        </p:nvCxnSpPr>
+        <p:spPr>
+          <a:xfrm flipV="1">
+            <a:off x="6967595" y="3848612"/>
+            <a:ext cx="0" cy="2383010"/>
+          </a:xfrm>
+          <a:prstGeom prst="line">
+            <a:avLst/>
+          </a:prstGeom>
+        </p:spPr>
+        <p:style>
+          <a:lnRef idx="2">
+            <a:schemeClr val="dk1"/>
+          </a:lnRef>
+          <a:fillRef idx="0">
+            <a:schemeClr val="dk1"/>
+          </a:fillRef>
+          <a:effectRef idx="1">
+            <a:schemeClr val="dk1"/>
+          </a:effectRef>
+          <a:fontRef idx="minor">
+            <a:schemeClr val="tx1"/>
+          </a:fontRef>
+        </p:style>
+      </p:cxnSp>
+      <p:cxnSp>
+        <p:nvCxnSpPr>
+          <p:cNvPr id="39" name="Straight Connector 38">
+            <a:extLst>
+              <a:ext uri="{FF2B5EF4-FFF2-40B4-BE49-F238E27FC236}">
+                <a16:creationId xmlns:a16="http://schemas.microsoft.com/office/drawing/2014/main" id="{5B8886BA-1A08-883F-8FA2-83E664F7EB4E}"/>
+              </a:ext>
+            </a:extLst>
+          </p:cNvPr>
+          <p:cNvCxnSpPr>
+            <a:cxnSpLocks/>
+          </p:cNvCxnSpPr>
+          <p:nvPr/>
+        </p:nvCxnSpPr>
+        <p:spPr>
+          <a:xfrm flipH="1">
+            <a:off x="6746707" y="2174600"/>
+            <a:ext cx="1707" cy="924473"/>
+          </a:xfrm>
+          <a:prstGeom prst="line">
+            <a:avLst/>
+          </a:prstGeom>
+          <a:ln>
+            <a:solidFill>
+              <a:schemeClr val="accent5">
+                <a:lumMod val="75000"/>
+              </a:schemeClr>
+            </a:solidFill>
+          </a:ln>
+        </p:spPr>
+        <p:style>
+          <a:lnRef idx="2">
+            <a:schemeClr val="accent1"/>
+          </a:lnRef>
+          <a:fillRef idx="0">
+            <a:schemeClr val="accent1"/>
+          </a:fillRef>
+          <a:effectRef idx="1">
+            <a:schemeClr val="accent1"/>
+          </a:effectRef>
+          <a:fontRef idx="minor">
+            <a:schemeClr val="tx1"/>
+          </a:fontRef>
+        </p:style>
+      </p:cxnSp>
+      <p:cxnSp>
+        <p:nvCxnSpPr>
+          <p:cNvPr id="42" name="Straight Connector 41">
+            <a:extLst>
+              <a:ext uri="{FF2B5EF4-FFF2-40B4-BE49-F238E27FC236}">
+                <a16:creationId xmlns:a16="http://schemas.microsoft.com/office/drawing/2014/main" id="{186878E4-28CB-BECE-3FD6-11BF773C4727}"/>
+              </a:ext>
+            </a:extLst>
+          </p:cNvPr>
+          <p:cNvCxnSpPr>
+            <a:cxnSpLocks/>
+          </p:cNvCxnSpPr>
+          <p:nvPr/>
+        </p:nvCxnSpPr>
+        <p:spPr>
+          <a:xfrm>
+            <a:off x="4181367" y="2169631"/>
+            <a:ext cx="2565340" cy="4969"/>
+          </a:xfrm>
+          <a:prstGeom prst="line">
+            <a:avLst/>
+          </a:prstGeom>
+          <a:ln>
+            <a:solidFill>
+              <a:schemeClr val="accent5">
+                <a:lumMod val="75000"/>
+              </a:schemeClr>
+            </a:solidFill>
+          </a:ln>
+        </p:spPr>
+        <p:style>
+          <a:lnRef idx="2">
+            <a:schemeClr val="accent1"/>
+          </a:lnRef>
+          <a:fillRef idx="0">
+            <a:schemeClr val="accent1"/>
+          </a:fillRef>
+          <a:effectRef idx="1">
+            <a:schemeClr val="accent1"/>
+          </a:effectRef>
+          <a:fontRef idx="minor">
+            <a:schemeClr val="tx1"/>
+          </a:fontRef>
+        </p:style>
+      </p:cxnSp>
+      <p:cxnSp>
+        <p:nvCxnSpPr>
+          <p:cNvPr id="46" name="Straight Connector 45">
+            <a:extLst>
+              <a:ext uri="{FF2B5EF4-FFF2-40B4-BE49-F238E27FC236}">
+                <a16:creationId xmlns:a16="http://schemas.microsoft.com/office/drawing/2014/main" id="{F17F4D44-91C0-13D1-6266-FC787430B064}"/>
+              </a:ext>
+            </a:extLst>
+          </p:cNvPr>
+          <p:cNvCxnSpPr>
+            <a:cxnSpLocks/>
+          </p:cNvCxnSpPr>
+          <p:nvPr/>
+        </p:nvCxnSpPr>
+        <p:spPr>
+          <a:xfrm>
+            <a:off x="4166935" y="2169631"/>
+            <a:ext cx="0" cy="560587"/>
+          </a:xfrm>
+          <a:prstGeom prst="line">
+            <a:avLst/>
+          </a:prstGeom>
+          <a:ln>
+            <a:solidFill>
+              <a:schemeClr val="accent5">
+                <a:lumMod val="75000"/>
+              </a:schemeClr>
+            </a:solidFill>
+          </a:ln>
+        </p:spPr>
+        <p:style>
+          <a:lnRef idx="2">
+            <a:schemeClr val="accent1"/>
+          </a:lnRef>
+          <a:fillRef idx="0">
+            <a:schemeClr val="accent1"/>
+          </a:fillRef>
+          <a:effectRef idx="1">
+            <a:schemeClr val="accent1"/>
+          </a:effectRef>
+          <a:fontRef idx="minor">
+            <a:schemeClr val="tx1"/>
+          </a:fontRef>
+        </p:style>
+      </p:cxnSp>
+      <p:cxnSp>
+        <p:nvCxnSpPr>
+          <p:cNvPr id="49" name="Straight Connector 48">
+            <a:extLst>
+              <a:ext uri="{FF2B5EF4-FFF2-40B4-BE49-F238E27FC236}">
+                <a16:creationId xmlns:a16="http://schemas.microsoft.com/office/drawing/2014/main" id="{AC4F5CEF-8C79-332E-3837-14B9156E6168}"/>
+              </a:ext>
+            </a:extLst>
+          </p:cNvPr>
+          <p:cNvCxnSpPr>
+            <a:cxnSpLocks/>
+          </p:cNvCxnSpPr>
+          <p:nvPr/>
+        </p:nvCxnSpPr>
+        <p:spPr>
+          <a:xfrm flipV="1">
+            <a:off x="6967595" y="2451842"/>
+            <a:ext cx="0" cy="540006"/>
+          </a:xfrm>
+          <a:prstGeom prst="line">
+            <a:avLst/>
+          </a:prstGeom>
+        </p:spPr>
+        <p:style>
+          <a:lnRef idx="2">
+            <a:schemeClr val="dk1"/>
+          </a:lnRef>
+          <a:fillRef idx="0">
+            <a:schemeClr val="dk1"/>
+          </a:fillRef>
+          <a:effectRef idx="1">
+            <a:schemeClr val="dk1"/>
+          </a:effectRef>
+          <a:fontRef idx="minor">
+            <a:schemeClr val="tx1"/>
+          </a:fontRef>
+        </p:style>
+      </p:cxnSp>
+      <p:cxnSp>
+        <p:nvCxnSpPr>
+          <p:cNvPr id="52" name="Straight Connector 51">
+            <a:extLst>
+              <a:ext uri="{FF2B5EF4-FFF2-40B4-BE49-F238E27FC236}">
+                <a16:creationId xmlns:a16="http://schemas.microsoft.com/office/drawing/2014/main" id="{089DFFC6-95AD-35B6-95B4-2EB843DA0B02}"/>
+              </a:ext>
+            </a:extLst>
+          </p:cNvPr>
+          <p:cNvCxnSpPr>
+            <a:cxnSpLocks/>
+          </p:cNvCxnSpPr>
+          <p:nvPr/>
+        </p:nvCxnSpPr>
+        <p:spPr>
+          <a:xfrm flipV="1">
+            <a:off x="4360594" y="2449924"/>
+            <a:ext cx="2607001" cy="0"/>
+          </a:xfrm>
+          <a:prstGeom prst="line">
+            <a:avLst/>
+          </a:prstGeom>
+        </p:spPr>
+        <p:style>
+          <a:lnRef idx="2">
+            <a:schemeClr val="dk1"/>
+          </a:lnRef>
+          <a:fillRef idx="0">
+            <a:schemeClr val="dk1"/>
+          </a:fillRef>
+          <a:effectRef idx="1">
+            <a:schemeClr val="dk1"/>
+          </a:effectRef>
+          <a:fontRef idx="minor">
+            <a:schemeClr val="tx1"/>
+          </a:fontRef>
+        </p:style>
+      </p:cxnSp>
+      <p:cxnSp>
+        <p:nvCxnSpPr>
+          <p:cNvPr id="55" name="Straight Connector 54">
+            <a:extLst>
+              <a:ext uri="{FF2B5EF4-FFF2-40B4-BE49-F238E27FC236}">
+                <a16:creationId xmlns:a16="http://schemas.microsoft.com/office/drawing/2014/main" id="{EFBED397-3765-D91C-D508-40CC4D37A756}"/>
+              </a:ext>
+            </a:extLst>
+          </p:cNvPr>
+          <p:cNvCxnSpPr>
+            <a:cxnSpLocks/>
+          </p:cNvCxnSpPr>
+          <p:nvPr/>
+        </p:nvCxnSpPr>
+        <p:spPr>
+          <a:xfrm flipV="1">
+            <a:off x="4350324" y="2442315"/>
+            <a:ext cx="0" cy="287903"/>
+          </a:xfrm>
+          <a:prstGeom prst="line">
+            <a:avLst/>
+          </a:prstGeom>
+        </p:spPr>
+        <p:style>
+          <a:lnRef idx="2">
+            <a:schemeClr val="dk1"/>
+          </a:lnRef>
+          <a:fillRef idx="0">
+            <a:schemeClr val="dk1"/>
+          </a:fillRef>
+          <a:effectRef idx="1">
+            <a:schemeClr val="dk1"/>
+          </a:effectRef>
+          <a:fontRef idx="minor">
+            <a:schemeClr val="tx1"/>
+          </a:fontRef>
+        </p:style>
+      </p:cxnSp>
+      <p:cxnSp>
+        <p:nvCxnSpPr>
+          <p:cNvPr id="57" name="Straight Connector 56">
+            <a:extLst>
+              <a:ext uri="{FF2B5EF4-FFF2-40B4-BE49-F238E27FC236}">
+                <a16:creationId xmlns:a16="http://schemas.microsoft.com/office/drawing/2014/main" id="{06CCAD8A-CE08-1AF2-B958-5EDF9075C92D}"/>
+              </a:ext>
+            </a:extLst>
+          </p:cNvPr>
+          <p:cNvCxnSpPr>
+            <a:cxnSpLocks/>
+          </p:cNvCxnSpPr>
+          <p:nvPr/>
+        </p:nvCxnSpPr>
+        <p:spPr>
+          <a:xfrm>
+            <a:off x="1857104" y="2381774"/>
+            <a:ext cx="0" cy="3105081"/>
+          </a:xfrm>
+          <a:prstGeom prst="line">
+            <a:avLst/>
+          </a:prstGeom>
+          <a:ln>
+            <a:solidFill>
+              <a:srgbClr val="FFC000"/>
+            </a:solidFill>
+          </a:ln>
+        </p:spPr>
+        <p:style>
+          <a:lnRef idx="2">
+            <a:schemeClr val="accent1"/>
+          </a:lnRef>
+          <a:fillRef idx="0">
+            <a:schemeClr val="accent1"/>
+          </a:fillRef>
+          <a:effectRef idx="1">
+            <a:schemeClr val="accent1"/>
+          </a:effectRef>
+          <a:fontRef idx="minor">
+            <a:schemeClr val="tx1"/>
+          </a:fontRef>
+        </p:style>
+      </p:cxnSp>
+      <p:cxnSp>
+        <p:nvCxnSpPr>
+          <p:cNvPr id="59" name="Straight Connector 58">
+            <a:extLst>
+              <a:ext uri="{FF2B5EF4-FFF2-40B4-BE49-F238E27FC236}">
+                <a16:creationId xmlns:a16="http://schemas.microsoft.com/office/drawing/2014/main" id="{D7D245ED-4FF4-B5B4-7D8B-2C113B280BF0}"/>
+              </a:ext>
+            </a:extLst>
+          </p:cNvPr>
+          <p:cNvCxnSpPr>
+            <a:cxnSpLocks/>
+          </p:cNvCxnSpPr>
+          <p:nvPr/>
+        </p:nvCxnSpPr>
+        <p:spPr>
+          <a:xfrm>
+            <a:off x="1857104" y="2381774"/>
+            <a:ext cx="702047" cy="0"/>
+          </a:xfrm>
+          <a:prstGeom prst="line">
+            <a:avLst/>
+          </a:prstGeom>
+          <a:ln>
+            <a:solidFill>
+              <a:srgbClr val="FFC000"/>
+            </a:solidFill>
+          </a:ln>
+        </p:spPr>
+        <p:style>
+          <a:lnRef idx="2">
+            <a:schemeClr val="accent1"/>
+          </a:lnRef>
+          <a:fillRef idx="0">
+            <a:schemeClr val="accent1"/>
+          </a:fillRef>
+          <a:effectRef idx="1">
+            <a:schemeClr val="accent1"/>
+          </a:effectRef>
+          <a:fontRef idx="minor">
+            <a:schemeClr val="tx1"/>
+          </a:fontRef>
+        </p:style>
+      </p:cxnSp>
+      <p:cxnSp>
+        <p:nvCxnSpPr>
+          <p:cNvPr id="62" name="Straight Connector 61">
+            <a:extLst>
+              <a:ext uri="{FF2B5EF4-FFF2-40B4-BE49-F238E27FC236}">
+                <a16:creationId xmlns:a16="http://schemas.microsoft.com/office/drawing/2014/main" id="{EC9474A3-CF14-0B3F-E663-A7B20474AFC0}"/>
+              </a:ext>
+            </a:extLst>
+          </p:cNvPr>
+          <p:cNvCxnSpPr>
+            <a:cxnSpLocks/>
+          </p:cNvCxnSpPr>
+          <p:nvPr/>
+        </p:nvCxnSpPr>
+        <p:spPr>
+          <a:xfrm>
+            <a:off x="2559151" y="2381774"/>
+            <a:ext cx="10269" cy="392887"/>
+          </a:xfrm>
+          <a:prstGeom prst="line">
+            <a:avLst/>
+          </a:prstGeom>
+          <a:ln>
+            <a:solidFill>
+              <a:srgbClr val="FFC000"/>
+            </a:solidFill>
+          </a:ln>
+        </p:spPr>
+        <p:style>
+          <a:lnRef idx="2">
+            <a:schemeClr val="accent1"/>
+          </a:lnRef>
+          <a:fillRef idx="0">
+            <a:schemeClr val="accent1"/>
+          </a:fillRef>
+          <a:effectRef idx="1">
+            <a:schemeClr val="accent1"/>
+          </a:effectRef>
+          <a:fontRef idx="minor">
+            <a:schemeClr val="tx1"/>
+          </a:fontRef>
+        </p:style>
+      </p:cxnSp>
+      <p:cxnSp>
+        <p:nvCxnSpPr>
+          <p:cNvPr id="66" name="Straight Connector 65">
+            <a:extLst>
+              <a:ext uri="{FF2B5EF4-FFF2-40B4-BE49-F238E27FC236}">
+                <a16:creationId xmlns:a16="http://schemas.microsoft.com/office/drawing/2014/main" id="{6A8539F7-F38D-D5BB-DA4F-937FA64827BA}"/>
+              </a:ext>
+            </a:extLst>
+          </p:cNvPr>
+          <p:cNvCxnSpPr>
+            <a:cxnSpLocks/>
+          </p:cNvCxnSpPr>
+          <p:nvPr/>
+        </p:nvCxnSpPr>
+        <p:spPr>
+          <a:xfrm flipV="1">
+            <a:off x="2610101" y="3848612"/>
+            <a:ext cx="0" cy="2383010"/>
+          </a:xfrm>
+          <a:prstGeom prst="line">
+            <a:avLst/>
+          </a:prstGeom>
+        </p:spPr>
+        <p:style>
+          <a:lnRef idx="2">
+            <a:schemeClr val="dk1"/>
+          </a:lnRef>
+          <a:fillRef idx="0">
+            <a:schemeClr val="dk1"/>
+          </a:fillRef>
+          <a:effectRef idx="1">
+            <a:schemeClr val="dk1"/>
+          </a:effectRef>
+          <a:fontRef idx="minor">
+            <a:schemeClr val="tx1"/>
+          </a:fontRef>
+        </p:style>
+      </p:cxnSp>
+      <p:sp>
+        <p:nvSpPr>
+          <p:cNvPr id="67" name="Rectangle 66">
+            <a:extLst>
+              <a:ext uri="{FF2B5EF4-FFF2-40B4-BE49-F238E27FC236}">
+                <a16:creationId xmlns:a16="http://schemas.microsoft.com/office/drawing/2014/main" id="{FB5482FA-DDEE-81AA-9222-4F20B60A4965}"/>
+              </a:ext>
+            </a:extLst>
+          </p:cNvPr>
+          <p:cNvSpPr/>
+          <p:nvPr/>
+        </p:nvSpPr>
+        <p:spPr>
+          <a:xfrm>
+            <a:off x="2039841" y="2299941"/>
+            <a:ext cx="330071" cy="151781"/>
+          </a:xfrm>
+          <a:prstGeom prst="rect">
+            <a:avLst/>
+          </a:prstGeom>
+        </p:spPr>
+        <p:style>
+          <a:lnRef idx="2">
+            <a:schemeClr val="accent1">
+              <a:shade val="15000"/>
+            </a:schemeClr>
+          </a:lnRef>
+          <a:fillRef idx="1">
+            <a:schemeClr val="accent1"/>
+          </a:fillRef>
+          <a:effectRef idx="0">
+            <a:schemeClr val="accent1"/>
+          </a:effectRef>
+          <a:fontRef idx="minor">
+            <a:schemeClr val="lt1"/>
+          </a:fontRef>
+        </p:style>
+        <p:txBody>
+          <a:bodyPr rtlCol="0" anchor="ctr"/>
+          <a:lstStyle/>
+          <a:p>
+            <a:pPr algn="ctr"/>
+            <a:endParaRPr lang="en-SG"/>
+          </a:p>
+        </p:txBody>
+      </p:sp>
+      <p:sp>
+        <p:nvSpPr>
+          <p:cNvPr id="68" name="TextBox 67">
+            <a:extLst>
+              <a:ext uri="{FF2B5EF4-FFF2-40B4-BE49-F238E27FC236}">
+                <a16:creationId xmlns:a16="http://schemas.microsoft.com/office/drawing/2014/main" id="{D3891AC4-0D70-CCD8-4BCE-7D579F3C60CB}"/>
+              </a:ext>
+            </a:extLst>
+          </p:cNvPr>
+          <p:cNvSpPr txBox="1"/>
+          <p:nvPr/>
+        </p:nvSpPr>
+        <p:spPr>
+          <a:xfrm>
+            <a:off x="1333751" y="1967093"/>
+            <a:ext cx="1120945" cy="461665"/>
+          </a:xfrm>
+          <a:prstGeom prst="rect">
+            <a:avLst/>
+          </a:prstGeom>
+          <a:noFill/>
+        </p:spPr>
+        <p:txBody>
+          <a:bodyPr wrap="square">
+            <a:spAutoFit/>
+          </a:bodyPr>
+          <a:lstStyle/>
+          <a:p>
+            <a:r>
+              <a:rPr lang="en-US" sz="1200" b="1" dirty="0"/>
+              <a:t>3.3K </a:t>
+            </a:r>
+            <a:r>
+              <a:rPr lang="en-SG" sz="1200" b="1" i="0" dirty="0">
+                <a:effectLst/>
+              </a:rPr>
+              <a:t>Ohm </a:t>
+            </a:r>
+            <a:r>
+              <a:rPr lang="el-GR" sz="1200" b="1" i="0" dirty="0">
+                <a:effectLst/>
+              </a:rPr>
+              <a:t>Ω</a:t>
+            </a:r>
+            <a:r>
+              <a:rPr lang="en-US" sz="1200" b="1" i="0" dirty="0">
+                <a:effectLst/>
+              </a:rPr>
+              <a:t> resistor</a:t>
+            </a:r>
+            <a:endParaRPr lang="en-SG" sz="1200" b="1" dirty="0"/>
+          </a:p>
+        </p:txBody>
+      </p:sp>
+      <p:cxnSp>
+        <p:nvCxnSpPr>
+          <p:cNvPr id="69" name="Straight Connector 68">
+            <a:extLst>
+              <a:ext uri="{FF2B5EF4-FFF2-40B4-BE49-F238E27FC236}">
+                <a16:creationId xmlns:a16="http://schemas.microsoft.com/office/drawing/2014/main" id="{712AFF38-6B01-2F08-5B2B-C7681B4FB9EC}"/>
+              </a:ext>
+            </a:extLst>
+          </p:cNvPr>
+          <p:cNvCxnSpPr>
+            <a:cxnSpLocks/>
+          </p:cNvCxnSpPr>
+          <p:nvPr/>
+        </p:nvCxnSpPr>
+        <p:spPr>
+          <a:xfrm flipH="1">
+            <a:off x="2559146" y="1977367"/>
+            <a:ext cx="0" cy="408738"/>
+          </a:xfrm>
+          <a:prstGeom prst="line">
+            <a:avLst/>
+          </a:prstGeom>
+          <a:ln>
+            <a:solidFill>
+              <a:srgbClr val="FFC000"/>
+            </a:solidFill>
+          </a:ln>
+        </p:spPr>
+        <p:style>
+          <a:lnRef idx="2">
+            <a:schemeClr val="accent1"/>
+          </a:lnRef>
+          <a:fillRef idx="0">
+            <a:schemeClr val="accent1"/>
+          </a:fillRef>
+          <a:effectRef idx="1">
+            <a:schemeClr val="accent1"/>
+          </a:effectRef>
+          <a:fontRef idx="minor">
+            <a:schemeClr val="tx1"/>
+          </a:fontRef>
+        </p:style>
+      </p:cxnSp>
+      <p:cxnSp>
+        <p:nvCxnSpPr>
+          <p:cNvPr id="74" name="Straight Connector 73">
+            <a:extLst>
+              <a:ext uri="{FF2B5EF4-FFF2-40B4-BE49-F238E27FC236}">
+                <a16:creationId xmlns:a16="http://schemas.microsoft.com/office/drawing/2014/main" id="{F4B1A4F8-D1EF-A4C6-A56A-CAA3DC195D4A}"/>
+              </a:ext>
+            </a:extLst>
+          </p:cNvPr>
+          <p:cNvCxnSpPr>
+            <a:cxnSpLocks/>
+          </p:cNvCxnSpPr>
+          <p:nvPr/>
+        </p:nvCxnSpPr>
+        <p:spPr>
+          <a:xfrm>
+            <a:off x="2559146" y="1977367"/>
+            <a:ext cx="6276629" cy="0"/>
+          </a:xfrm>
+          <a:prstGeom prst="line">
+            <a:avLst/>
+          </a:prstGeom>
+          <a:ln>
+            <a:solidFill>
+              <a:srgbClr val="FFC000"/>
+            </a:solidFill>
+          </a:ln>
+        </p:spPr>
+        <p:style>
+          <a:lnRef idx="2">
+            <a:schemeClr val="accent1"/>
+          </a:lnRef>
+          <a:fillRef idx="0">
+            <a:schemeClr val="accent1"/>
+          </a:fillRef>
+          <a:effectRef idx="1">
+            <a:schemeClr val="accent1"/>
+          </a:effectRef>
+          <a:fontRef idx="minor">
+            <a:schemeClr val="tx1"/>
+          </a:fontRef>
+        </p:style>
+      </p:cxnSp>
+      <p:cxnSp>
+        <p:nvCxnSpPr>
+          <p:cNvPr id="78" name="Straight Connector 77">
+            <a:extLst>
+              <a:ext uri="{FF2B5EF4-FFF2-40B4-BE49-F238E27FC236}">
+                <a16:creationId xmlns:a16="http://schemas.microsoft.com/office/drawing/2014/main" id="{A0686527-ACB9-13A2-418F-465474E5A5B5}"/>
+              </a:ext>
+            </a:extLst>
+          </p:cNvPr>
+          <p:cNvCxnSpPr>
+            <a:cxnSpLocks/>
+          </p:cNvCxnSpPr>
+          <p:nvPr/>
+        </p:nvCxnSpPr>
+        <p:spPr>
+          <a:xfrm>
+            <a:off x="8835775" y="1995458"/>
+            <a:ext cx="0" cy="521651"/>
+          </a:xfrm>
+          <a:prstGeom prst="line">
+            <a:avLst/>
+          </a:prstGeom>
+          <a:ln>
+            <a:solidFill>
+              <a:srgbClr val="FFC000"/>
+            </a:solidFill>
+          </a:ln>
+        </p:spPr>
+        <p:style>
+          <a:lnRef idx="2">
+            <a:schemeClr val="accent1"/>
+          </a:lnRef>
+          <a:fillRef idx="0">
+            <a:schemeClr val="accent1"/>
+          </a:fillRef>
+          <a:effectRef idx="1">
+            <a:schemeClr val="accent1"/>
+          </a:effectRef>
+          <a:fontRef idx="minor">
+            <a:schemeClr val="tx1"/>
+          </a:fontRef>
+        </p:style>
+      </p:cxnSp>
+      <p:cxnSp>
+        <p:nvCxnSpPr>
+          <p:cNvPr id="80" name="Straight Connector 79">
+            <a:extLst>
+              <a:ext uri="{FF2B5EF4-FFF2-40B4-BE49-F238E27FC236}">
+                <a16:creationId xmlns:a16="http://schemas.microsoft.com/office/drawing/2014/main" id="{E95DDA07-16D9-231F-9245-3CC2F7045F9B}"/>
+              </a:ext>
+            </a:extLst>
+          </p:cNvPr>
+          <p:cNvCxnSpPr>
+            <a:cxnSpLocks/>
+          </p:cNvCxnSpPr>
+          <p:nvPr/>
+        </p:nvCxnSpPr>
+        <p:spPr>
+          <a:xfrm>
+            <a:off x="7909394" y="927645"/>
+            <a:ext cx="0" cy="3141432"/>
+          </a:xfrm>
+          <a:prstGeom prst="line">
+            <a:avLst/>
+          </a:prstGeom>
+          <a:ln>
+            <a:solidFill>
+              <a:srgbClr val="C00000"/>
+            </a:solidFill>
+          </a:ln>
+        </p:spPr>
+        <p:style>
+          <a:lnRef idx="2">
+            <a:schemeClr val="accent1"/>
+          </a:lnRef>
+          <a:fillRef idx="0">
+            <a:schemeClr val="accent1"/>
+          </a:fillRef>
+          <a:effectRef idx="1">
+            <a:schemeClr val="accent1"/>
+          </a:effectRef>
+          <a:fontRef idx="minor">
+            <a:schemeClr val="tx1"/>
+          </a:fontRef>
+        </p:style>
+      </p:cxnSp>
+      <p:cxnSp>
+        <p:nvCxnSpPr>
+          <p:cNvPr id="84" name="Straight Connector 83">
+            <a:extLst>
+              <a:ext uri="{FF2B5EF4-FFF2-40B4-BE49-F238E27FC236}">
+                <a16:creationId xmlns:a16="http://schemas.microsoft.com/office/drawing/2014/main" id="{A54223BD-3DF0-E568-7A6E-B388FF7454D2}"/>
+              </a:ext>
+            </a:extLst>
+          </p:cNvPr>
+          <p:cNvCxnSpPr>
+            <a:cxnSpLocks/>
+          </p:cNvCxnSpPr>
+          <p:nvPr/>
+        </p:nvCxnSpPr>
+        <p:spPr>
+          <a:xfrm flipH="1">
+            <a:off x="7909394" y="4069077"/>
+            <a:ext cx="515415" cy="0"/>
+          </a:xfrm>
+          <a:prstGeom prst="line">
+            <a:avLst/>
+          </a:prstGeom>
+          <a:ln>
+            <a:solidFill>
+              <a:srgbClr val="C00000"/>
+            </a:solidFill>
+          </a:ln>
+        </p:spPr>
+        <p:style>
+          <a:lnRef idx="2">
+            <a:schemeClr val="accent1"/>
+          </a:lnRef>
+          <a:fillRef idx="0">
+            <a:schemeClr val="accent1"/>
+          </a:fillRef>
+          <a:effectRef idx="1">
+            <a:schemeClr val="accent1"/>
+          </a:effectRef>
+          <a:fontRef idx="minor">
+            <a:schemeClr val="tx1"/>
+          </a:fontRef>
+        </p:style>
+      </p:cxnSp>
+      <p:cxnSp>
+        <p:nvCxnSpPr>
+          <p:cNvPr id="87" name="Straight Connector 86">
+            <a:extLst>
+              <a:ext uri="{FF2B5EF4-FFF2-40B4-BE49-F238E27FC236}">
+                <a16:creationId xmlns:a16="http://schemas.microsoft.com/office/drawing/2014/main" id="{A4C7C859-92F7-C995-9ADF-F2E959EA7044}"/>
+              </a:ext>
+            </a:extLst>
+          </p:cNvPr>
+          <p:cNvCxnSpPr>
+            <a:cxnSpLocks/>
+          </p:cNvCxnSpPr>
+          <p:nvPr/>
+        </p:nvCxnSpPr>
+        <p:spPr>
+          <a:xfrm>
+            <a:off x="8424809" y="3848612"/>
+            <a:ext cx="0" cy="220465"/>
+          </a:xfrm>
+          <a:prstGeom prst="line">
+            <a:avLst/>
+          </a:prstGeom>
+          <a:ln>
+            <a:solidFill>
+              <a:srgbClr val="C00000"/>
+            </a:solidFill>
+          </a:ln>
+        </p:spPr>
+        <p:style>
+          <a:lnRef idx="2">
+            <a:schemeClr val="accent1"/>
+          </a:lnRef>
+          <a:fillRef idx="0">
+            <a:schemeClr val="accent1"/>
+          </a:fillRef>
+          <a:effectRef idx="1">
+            <a:schemeClr val="accent1"/>
+          </a:effectRef>
+          <a:fontRef idx="minor">
+            <a:schemeClr val="tx1"/>
+          </a:fontRef>
+        </p:style>
+      </p:cxnSp>
+      <p:cxnSp>
+        <p:nvCxnSpPr>
+          <p:cNvPr id="90" name="Straight Connector 89">
+            <a:extLst>
+              <a:ext uri="{FF2B5EF4-FFF2-40B4-BE49-F238E27FC236}">
+                <a16:creationId xmlns:a16="http://schemas.microsoft.com/office/drawing/2014/main" id="{8B068D85-6FA6-F1AF-D98F-3E0DDCDFE8E0}"/>
+              </a:ext>
+            </a:extLst>
+          </p:cNvPr>
+          <p:cNvCxnSpPr>
+            <a:cxnSpLocks/>
+          </p:cNvCxnSpPr>
+          <p:nvPr/>
+        </p:nvCxnSpPr>
+        <p:spPr>
+          <a:xfrm>
+            <a:off x="8020696" y="1246827"/>
+            <a:ext cx="0" cy="2719343"/>
+          </a:xfrm>
+          <a:prstGeom prst="line">
+            <a:avLst/>
+          </a:prstGeom>
+          <a:ln>
+            <a:solidFill>
+              <a:schemeClr val="tx2">
+                <a:lumMod val="75000"/>
+                <a:lumOff val="25000"/>
+              </a:schemeClr>
+            </a:solidFill>
+          </a:ln>
+        </p:spPr>
+        <p:style>
+          <a:lnRef idx="2">
+            <a:schemeClr val="accent1"/>
+          </a:lnRef>
+          <a:fillRef idx="0">
+            <a:schemeClr val="accent1"/>
+          </a:fillRef>
+          <a:effectRef idx="1">
+            <a:schemeClr val="accent1"/>
+          </a:effectRef>
+          <a:fontRef idx="minor">
+            <a:schemeClr val="tx1"/>
+          </a:fontRef>
+        </p:style>
+      </p:cxnSp>
+      <p:cxnSp>
+        <p:nvCxnSpPr>
+          <p:cNvPr id="92" name="Straight Connector 91">
+            <a:extLst>
+              <a:ext uri="{FF2B5EF4-FFF2-40B4-BE49-F238E27FC236}">
+                <a16:creationId xmlns:a16="http://schemas.microsoft.com/office/drawing/2014/main" id="{28A5D2A7-CFEF-8F67-F576-26D74B34C112}"/>
+              </a:ext>
+            </a:extLst>
+          </p:cNvPr>
+          <p:cNvCxnSpPr>
+            <a:cxnSpLocks/>
+          </p:cNvCxnSpPr>
+          <p:nvPr/>
+        </p:nvCxnSpPr>
+        <p:spPr>
+          <a:xfrm flipV="1">
+            <a:off x="8020696" y="3958844"/>
+            <a:ext cx="504090" cy="0"/>
+          </a:xfrm>
+          <a:prstGeom prst="line">
+            <a:avLst/>
+          </a:prstGeom>
+          <a:ln>
+            <a:solidFill>
+              <a:schemeClr val="tx2">
+                <a:lumMod val="75000"/>
+                <a:lumOff val="25000"/>
+              </a:schemeClr>
+            </a:solidFill>
+          </a:ln>
+        </p:spPr>
+        <p:style>
+          <a:lnRef idx="2">
+            <a:schemeClr val="accent1"/>
+          </a:lnRef>
+          <a:fillRef idx="0">
+            <a:schemeClr val="accent1"/>
+          </a:fillRef>
+          <a:effectRef idx="1">
+            <a:schemeClr val="accent1"/>
+          </a:effectRef>
+          <a:fontRef idx="minor">
+            <a:schemeClr val="tx1"/>
+          </a:fontRef>
+        </p:style>
+      </p:cxnSp>
+      <p:cxnSp>
+        <p:nvCxnSpPr>
+          <p:cNvPr id="97" name="Straight Connector 96">
+            <a:extLst>
+              <a:ext uri="{FF2B5EF4-FFF2-40B4-BE49-F238E27FC236}">
+                <a16:creationId xmlns:a16="http://schemas.microsoft.com/office/drawing/2014/main" id="{185CE74B-8527-BB67-BCBB-ACE481B0B8CA}"/>
+              </a:ext>
+            </a:extLst>
+          </p:cNvPr>
+          <p:cNvCxnSpPr>
+            <a:cxnSpLocks/>
+          </p:cNvCxnSpPr>
+          <p:nvPr/>
+        </p:nvCxnSpPr>
+        <p:spPr>
+          <a:xfrm>
+            <a:off x="8510035" y="3820283"/>
+            <a:ext cx="0" cy="123501"/>
+          </a:xfrm>
+          <a:prstGeom prst="line">
+            <a:avLst/>
+          </a:prstGeom>
+          <a:ln>
+            <a:solidFill>
+              <a:schemeClr val="tx2">
+                <a:lumMod val="75000"/>
+                <a:lumOff val="25000"/>
+              </a:schemeClr>
+            </a:solidFill>
+          </a:ln>
+        </p:spPr>
+        <p:style>
+          <a:lnRef idx="2">
+            <a:schemeClr val="accent1"/>
+          </a:lnRef>
+          <a:fillRef idx="0">
+            <a:schemeClr val="accent1"/>
+          </a:fillRef>
+          <a:effectRef idx="1">
+            <a:schemeClr val="accent1"/>
+          </a:effectRef>
+          <a:fontRef idx="minor">
+            <a:schemeClr val="tx1"/>
+          </a:fontRef>
+        </p:style>
+      </p:cxnSp>
+      <p:cxnSp>
+        <p:nvCxnSpPr>
+          <p:cNvPr id="99" name="Straight Connector 98">
+            <a:extLst>
+              <a:ext uri="{FF2B5EF4-FFF2-40B4-BE49-F238E27FC236}">
+                <a16:creationId xmlns:a16="http://schemas.microsoft.com/office/drawing/2014/main" id="{8FC07EEF-318D-3915-7563-D9E8F601A984}"/>
+              </a:ext>
+            </a:extLst>
+          </p:cNvPr>
+          <p:cNvCxnSpPr>
+            <a:cxnSpLocks/>
+          </p:cNvCxnSpPr>
+          <p:nvPr/>
+        </p:nvCxnSpPr>
+        <p:spPr>
+          <a:xfrm>
+            <a:off x="8129378" y="1626607"/>
+            <a:ext cx="0" cy="2222005"/>
+          </a:xfrm>
+          <a:prstGeom prst="line">
+            <a:avLst/>
+          </a:prstGeom>
+          <a:ln>
+            <a:solidFill>
+              <a:schemeClr val="accent6">
+                <a:lumMod val="75000"/>
+              </a:schemeClr>
+            </a:solidFill>
+          </a:ln>
+        </p:spPr>
+        <p:style>
+          <a:lnRef idx="2">
+            <a:schemeClr val="accent1"/>
+          </a:lnRef>
+          <a:fillRef idx="0">
+            <a:schemeClr val="accent1"/>
+          </a:fillRef>
+          <a:effectRef idx="1">
+            <a:schemeClr val="accent1"/>
+          </a:effectRef>
+          <a:fontRef idx="minor">
+            <a:schemeClr val="tx1"/>
+          </a:fontRef>
+        </p:style>
+      </p:cxnSp>
+      <p:cxnSp>
+        <p:nvCxnSpPr>
+          <p:cNvPr id="101" name="Straight Connector 100">
+            <a:extLst>
+              <a:ext uri="{FF2B5EF4-FFF2-40B4-BE49-F238E27FC236}">
+                <a16:creationId xmlns:a16="http://schemas.microsoft.com/office/drawing/2014/main" id="{C05237FE-640E-A85F-7D6E-5DF6F4EDDAF7}"/>
+              </a:ext>
+            </a:extLst>
+          </p:cNvPr>
+          <p:cNvCxnSpPr>
+            <a:cxnSpLocks/>
+          </p:cNvCxnSpPr>
+          <p:nvPr/>
+        </p:nvCxnSpPr>
+        <p:spPr>
+          <a:xfrm flipH="1">
+            <a:off x="8137658" y="3844927"/>
+            <a:ext cx="399650" cy="0"/>
+          </a:xfrm>
+          <a:prstGeom prst="line">
+            <a:avLst/>
+          </a:prstGeom>
+          <a:ln>
+            <a:solidFill>
+              <a:schemeClr val="accent6">
+                <a:lumMod val="75000"/>
+              </a:schemeClr>
+            </a:solidFill>
+          </a:ln>
+        </p:spPr>
+        <p:style>
+          <a:lnRef idx="2">
+            <a:schemeClr val="accent1"/>
+          </a:lnRef>
+          <a:fillRef idx="0">
+            <a:schemeClr val="accent1"/>
+          </a:fillRef>
+          <a:effectRef idx="1">
+            <a:schemeClr val="accent1"/>
+          </a:effectRef>
+          <a:fontRef idx="minor">
+            <a:schemeClr val="tx1"/>
+          </a:fontRef>
+        </p:style>
+      </p:cxnSp>
+      <p:cxnSp>
+        <p:nvCxnSpPr>
+          <p:cNvPr id="107" name="Straight Connector 106">
+            <a:extLst>
+              <a:ext uri="{FF2B5EF4-FFF2-40B4-BE49-F238E27FC236}">
+                <a16:creationId xmlns:a16="http://schemas.microsoft.com/office/drawing/2014/main" id="{7ECD2061-4CCF-561E-1F53-795D6B201A5F}"/>
+              </a:ext>
+            </a:extLst>
+          </p:cNvPr>
+          <p:cNvCxnSpPr>
+            <a:cxnSpLocks/>
+          </p:cNvCxnSpPr>
+          <p:nvPr/>
+        </p:nvCxnSpPr>
+        <p:spPr>
+          <a:xfrm>
+            <a:off x="9169406" y="3820283"/>
+            <a:ext cx="0" cy="401423"/>
+          </a:xfrm>
+          <a:prstGeom prst="line">
+            <a:avLst/>
+          </a:prstGeom>
+          <a:ln>
+            <a:solidFill>
+              <a:srgbClr val="FFC000"/>
+            </a:solidFill>
+          </a:ln>
+        </p:spPr>
+        <p:style>
+          <a:lnRef idx="2">
+            <a:schemeClr val="accent1"/>
+          </a:lnRef>
+          <a:fillRef idx="0">
+            <a:schemeClr val="accent1"/>
+          </a:fillRef>
+          <a:effectRef idx="1">
+            <a:schemeClr val="accent1"/>
+          </a:effectRef>
+          <a:fontRef idx="minor">
+            <a:schemeClr val="tx1"/>
+          </a:fontRef>
+        </p:style>
+      </p:cxnSp>
+      <p:cxnSp>
+        <p:nvCxnSpPr>
+          <p:cNvPr id="108" name="Straight Connector 107">
+            <a:extLst>
+              <a:ext uri="{FF2B5EF4-FFF2-40B4-BE49-F238E27FC236}">
+                <a16:creationId xmlns:a16="http://schemas.microsoft.com/office/drawing/2014/main" id="{5E4072E4-9766-99BF-DBF2-D951024AC9BB}"/>
+              </a:ext>
+            </a:extLst>
+          </p:cNvPr>
+          <p:cNvCxnSpPr>
+            <a:cxnSpLocks/>
+          </p:cNvCxnSpPr>
+          <p:nvPr/>
+        </p:nvCxnSpPr>
+        <p:spPr>
+          <a:xfrm flipH="1" flipV="1">
+            <a:off x="7734852" y="4221706"/>
+            <a:ext cx="1434554" cy="0"/>
+          </a:xfrm>
+          <a:prstGeom prst="line">
+            <a:avLst/>
+          </a:prstGeom>
+          <a:ln>
+            <a:solidFill>
+              <a:srgbClr val="FFC000"/>
+            </a:solidFill>
+          </a:ln>
+        </p:spPr>
+        <p:style>
+          <a:lnRef idx="2">
+            <a:schemeClr val="accent1"/>
+          </a:lnRef>
+          <a:fillRef idx="0">
+            <a:schemeClr val="accent1"/>
+          </a:fillRef>
+          <a:effectRef idx="1">
+            <a:schemeClr val="accent1"/>
+          </a:effectRef>
+          <a:fontRef idx="minor">
+            <a:schemeClr val="tx1"/>
+          </a:fontRef>
+        </p:style>
+      </p:cxnSp>
+      <p:cxnSp>
+        <p:nvCxnSpPr>
+          <p:cNvPr id="112" name="Straight Connector 111">
+            <a:extLst>
+              <a:ext uri="{FF2B5EF4-FFF2-40B4-BE49-F238E27FC236}">
+                <a16:creationId xmlns:a16="http://schemas.microsoft.com/office/drawing/2014/main" id="{28B65F69-6E09-832A-78D5-ED33A7D10C14}"/>
+              </a:ext>
+            </a:extLst>
+          </p:cNvPr>
+          <p:cNvCxnSpPr>
+            <a:cxnSpLocks/>
+          </p:cNvCxnSpPr>
+          <p:nvPr/>
+        </p:nvCxnSpPr>
+        <p:spPr>
+          <a:xfrm>
+            <a:off x="7737049" y="2411774"/>
+            <a:ext cx="0" cy="1809932"/>
+          </a:xfrm>
+          <a:prstGeom prst="line">
+            <a:avLst/>
+          </a:prstGeom>
+          <a:ln>
+            <a:solidFill>
+              <a:srgbClr val="FFC000"/>
+            </a:solidFill>
+          </a:ln>
+        </p:spPr>
+        <p:style>
+          <a:lnRef idx="2">
+            <a:schemeClr val="accent1"/>
+          </a:lnRef>
+          <a:fillRef idx="0">
+            <a:schemeClr val="accent1"/>
+          </a:fillRef>
+          <a:effectRef idx="1">
+            <a:schemeClr val="accent1"/>
+          </a:effectRef>
+          <a:fontRef idx="minor">
+            <a:schemeClr val="tx1"/>
+          </a:fontRef>
+        </p:style>
+      </p:cxnSp>
+      <p:cxnSp>
+        <p:nvCxnSpPr>
+          <p:cNvPr id="115" name="Straight Connector 114">
+            <a:extLst>
+              <a:ext uri="{FF2B5EF4-FFF2-40B4-BE49-F238E27FC236}">
+                <a16:creationId xmlns:a16="http://schemas.microsoft.com/office/drawing/2014/main" id="{60DF8802-1022-5F2B-90E8-B5A662E79055}"/>
+              </a:ext>
+            </a:extLst>
+          </p:cNvPr>
+          <p:cNvCxnSpPr>
+            <a:cxnSpLocks/>
+          </p:cNvCxnSpPr>
+          <p:nvPr/>
+        </p:nvCxnSpPr>
+        <p:spPr>
+          <a:xfrm flipV="1">
+            <a:off x="7407818" y="2428758"/>
+            <a:ext cx="327034" cy="0"/>
+          </a:xfrm>
+          <a:prstGeom prst="line">
+            <a:avLst/>
+          </a:prstGeom>
+          <a:ln>
+            <a:solidFill>
+              <a:srgbClr val="FFC000"/>
+            </a:solidFill>
+          </a:ln>
+        </p:spPr>
+        <p:style>
+          <a:lnRef idx="2">
+            <a:schemeClr val="accent1"/>
+          </a:lnRef>
+          <a:fillRef idx="0">
+            <a:schemeClr val="accent1"/>
+          </a:fillRef>
+          <a:effectRef idx="1">
+            <a:schemeClr val="accent1"/>
+          </a:effectRef>
+          <a:fontRef idx="minor">
+            <a:schemeClr val="tx1"/>
+          </a:fontRef>
+        </p:style>
+      </p:cxnSp>
+      <p:cxnSp>
+        <p:nvCxnSpPr>
+          <p:cNvPr id="119" name="Straight Connector 118">
+            <a:extLst>
+              <a:ext uri="{FF2B5EF4-FFF2-40B4-BE49-F238E27FC236}">
+                <a16:creationId xmlns:a16="http://schemas.microsoft.com/office/drawing/2014/main" id="{7D584E9D-3FC9-878E-5D0B-C2E362580F4F}"/>
+              </a:ext>
+            </a:extLst>
+          </p:cNvPr>
+          <p:cNvCxnSpPr>
+            <a:cxnSpLocks/>
+          </p:cNvCxnSpPr>
+          <p:nvPr/>
+        </p:nvCxnSpPr>
+        <p:spPr>
+          <a:xfrm>
+            <a:off x="7407818" y="2437970"/>
+            <a:ext cx="0" cy="283875"/>
+          </a:xfrm>
+          <a:prstGeom prst="line">
+            <a:avLst/>
+          </a:prstGeom>
+          <a:ln>
+            <a:solidFill>
+              <a:srgbClr val="FFC000"/>
+            </a:solidFill>
+          </a:ln>
+        </p:spPr>
+        <p:style>
+          <a:lnRef idx="2">
+            <a:schemeClr val="accent1"/>
+          </a:lnRef>
+          <a:fillRef idx="0">
+            <a:schemeClr val="accent1"/>
+          </a:fillRef>
+          <a:effectRef idx="1">
+            <a:schemeClr val="accent1"/>
+          </a:effectRef>
+          <a:fontRef idx="minor">
+            <a:schemeClr val="tx1"/>
+          </a:fontRef>
+        </p:style>
+      </p:cxnSp>
+      <p:cxnSp>
+        <p:nvCxnSpPr>
+          <p:cNvPr id="123" name="Straight Connector 122">
+            <a:extLst>
+              <a:ext uri="{FF2B5EF4-FFF2-40B4-BE49-F238E27FC236}">
+                <a16:creationId xmlns:a16="http://schemas.microsoft.com/office/drawing/2014/main" id="{04F44CB5-4CAD-D3A0-10B4-3B99D64A66E0}"/>
+              </a:ext>
+            </a:extLst>
+          </p:cNvPr>
+          <p:cNvCxnSpPr>
+            <a:cxnSpLocks/>
+          </p:cNvCxnSpPr>
+          <p:nvPr/>
+        </p:nvCxnSpPr>
+        <p:spPr>
+          <a:xfrm flipV="1">
+            <a:off x="7407818" y="3372585"/>
+            <a:ext cx="0" cy="2859037"/>
+          </a:xfrm>
+          <a:prstGeom prst="line">
+            <a:avLst/>
+          </a:prstGeom>
+        </p:spPr>
+        <p:style>
+          <a:lnRef idx="2">
+            <a:schemeClr val="dk1"/>
+          </a:lnRef>
+          <a:fillRef idx="0">
+            <a:schemeClr val="dk1"/>
+          </a:fillRef>
+          <a:effectRef idx="1">
+            <a:schemeClr val="dk1"/>
+          </a:effectRef>
+          <a:fontRef idx="minor">
+            <a:schemeClr val="tx1"/>
+          </a:fontRef>
+        </p:style>
+      </p:cxnSp>
+      <p:cxnSp>
+        <p:nvCxnSpPr>
+          <p:cNvPr id="125" name="Straight Connector 124">
+            <a:extLst>
+              <a:ext uri="{FF2B5EF4-FFF2-40B4-BE49-F238E27FC236}">
+                <a16:creationId xmlns:a16="http://schemas.microsoft.com/office/drawing/2014/main" id="{162B8D78-97DE-6E93-2428-43E8845DAD1A}"/>
+              </a:ext>
+            </a:extLst>
+          </p:cNvPr>
+          <p:cNvCxnSpPr>
+            <a:cxnSpLocks/>
+          </p:cNvCxnSpPr>
+          <p:nvPr/>
+        </p:nvCxnSpPr>
+        <p:spPr>
+          <a:xfrm flipV="1">
+            <a:off x="8669827" y="3776757"/>
+            <a:ext cx="0" cy="2475414"/>
+          </a:xfrm>
+          <a:prstGeom prst="line">
+            <a:avLst/>
+          </a:prstGeom>
+        </p:spPr>
+        <p:style>
+          <a:lnRef idx="2">
+            <a:schemeClr val="dk1"/>
+          </a:lnRef>
+          <a:fillRef idx="0">
+            <a:schemeClr val="dk1"/>
+          </a:fillRef>
+          <a:effectRef idx="1">
+            <a:schemeClr val="dk1"/>
+          </a:effectRef>
+          <a:fontRef idx="minor">
+            <a:schemeClr val="tx1"/>
+          </a:fontRef>
+        </p:style>
+      </p:cxnSp>
+      <p:pic>
+        <p:nvPicPr>
+          <p:cNvPr id="128" name="Picture 127">
+            <a:extLst>
+              <a:ext uri="{FF2B5EF4-FFF2-40B4-BE49-F238E27FC236}">
+                <a16:creationId xmlns:a16="http://schemas.microsoft.com/office/drawing/2014/main" id="{F71221A7-674A-01FC-7F20-75E65D4354BE}"/>
+              </a:ext>
+            </a:extLst>
+          </p:cNvPr>
+          <p:cNvPicPr>
+            <a:picLocks noChangeAspect="1"/>
+          </p:cNvPicPr>
+          <p:nvPr/>
+        </p:nvPicPr>
+        <p:blipFill>
+          <a:blip r:embed="rId7"/>
+          <a:stretch>
+            <a:fillRect/>
+          </a:stretch>
+        </p:blipFill>
+        <p:spPr>
+          <a:xfrm>
+            <a:off x="5256907" y="4333568"/>
+            <a:ext cx="1067399" cy="901952"/>
+          </a:xfrm>
+          <a:prstGeom prst="rect">
+            <a:avLst/>
+          </a:prstGeom>
+        </p:spPr>
+      </p:pic>
+      <p:cxnSp>
+        <p:nvCxnSpPr>
+          <p:cNvPr id="129" name="Straight Connector 128">
+            <a:extLst>
+              <a:ext uri="{FF2B5EF4-FFF2-40B4-BE49-F238E27FC236}">
+                <a16:creationId xmlns:a16="http://schemas.microsoft.com/office/drawing/2014/main" id="{FEBD53F5-4F55-CC4C-2843-9669564EA453}"/>
+              </a:ext>
+            </a:extLst>
+          </p:cNvPr>
+          <p:cNvCxnSpPr>
+            <a:cxnSpLocks/>
+          </p:cNvCxnSpPr>
+          <p:nvPr/>
+        </p:nvCxnSpPr>
+        <p:spPr>
+          <a:xfrm>
+            <a:off x="5664094" y="3882033"/>
+            <a:ext cx="0" cy="588196"/>
+          </a:xfrm>
+          <a:prstGeom prst="line">
+            <a:avLst/>
+          </a:prstGeom>
+          <a:ln>
+            <a:solidFill>
+              <a:srgbClr val="C00000"/>
+            </a:solidFill>
+          </a:ln>
+        </p:spPr>
+        <p:style>
+          <a:lnRef idx="2">
+            <a:schemeClr val="accent1"/>
+          </a:lnRef>
+          <a:fillRef idx="0">
+            <a:schemeClr val="accent1"/>
+          </a:fillRef>
+          <a:effectRef idx="1">
+            <a:schemeClr val="accent1"/>
+          </a:effectRef>
+          <a:fontRef idx="minor">
+            <a:schemeClr val="tx1"/>
+          </a:fontRef>
+        </p:style>
+      </p:cxnSp>
+      <p:cxnSp>
+        <p:nvCxnSpPr>
+          <p:cNvPr id="131" name="Straight Connector 130">
+            <a:extLst>
+              <a:ext uri="{FF2B5EF4-FFF2-40B4-BE49-F238E27FC236}">
+                <a16:creationId xmlns:a16="http://schemas.microsoft.com/office/drawing/2014/main" id="{ADE7CCFD-1A3B-A947-01C2-0DCCA55A534E}"/>
+              </a:ext>
+            </a:extLst>
+          </p:cNvPr>
+          <p:cNvCxnSpPr>
+            <a:cxnSpLocks/>
+          </p:cNvCxnSpPr>
+          <p:nvPr/>
+        </p:nvCxnSpPr>
+        <p:spPr>
+          <a:xfrm>
+            <a:off x="5441780" y="3882033"/>
+            <a:ext cx="0" cy="588196"/>
+          </a:xfrm>
+          <a:prstGeom prst="line">
+            <a:avLst/>
+          </a:prstGeom>
+          <a:ln>
+            <a:solidFill>
+              <a:schemeClr val="tx2">
+                <a:lumMod val="75000"/>
+                <a:lumOff val="25000"/>
+              </a:schemeClr>
+            </a:solidFill>
+          </a:ln>
+        </p:spPr>
+        <p:style>
+          <a:lnRef idx="2">
+            <a:schemeClr val="accent1"/>
+          </a:lnRef>
+          <a:fillRef idx="0">
+            <a:schemeClr val="accent1"/>
+          </a:fillRef>
+          <a:effectRef idx="1">
+            <a:schemeClr val="accent1"/>
+          </a:effectRef>
+          <a:fontRef idx="minor">
+            <a:schemeClr val="tx1"/>
+          </a:fontRef>
+        </p:style>
+      </p:cxnSp>
+      <p:cxnSp>
+        <p:nvCxnSpPr>
+          <p:cNvPr id="133" name="Straight Connector 132">
+            <a:extLst>
+              <a:ext uri="{FF2B5EF4-FFF2-40B4-BE49-F238E27FC236}">
+                <a16:creationId xmlns:a16="http://schemas.microsoft.com/office/drawing/2014/main" id="{090FA7C7-C9B2-531B-F59C-70648A91AB38}"/>
+              </a:ext>
+            </a:extLst>
+          </p:cNvPr>
+          <p:cNvCxnSpPr>
+            <a:cxnSpLocks/>
+          </p:cNvCxnSpPr>
+          <p:nvPr/>
+        </p:nvCxnSpPr>
+        <p:spPr>
+          <a:xfrm>
+            <a:off x="6084018" y="1646409"/>
+            <a:ext cx="11982" cy="2823820"/>
+          </a:xfrm>
+          <a:prstGeom prst="line">
+            <a:avLst/>
+          </a:prstGeom>
+          <a:ln>
+            <a:solidFill>
+              <a:schemeClr val="accent6">
+                <a:lumMod val="75000"/>
+              </a:schemeClr>
+            </a:solidFill>
+          </a:ln>
+        </p:spPr>
+        <p:style>
+          <a:lnRef idx="2">
+            <a:schemeClr val="accent1"/>
+          </a:lnRef>
+          <a:fillRef idx="0">
+            <a:schemeClr val="accent1"/>
+          </a:fillRef>
+          <a:effectRef idx="1">
+            <a:schemeClr val="accent1"/>
+          </a:effectRef>
+          <a:fontRef idx="minor">
+            <a:schemeClr val="tx1"/>
+          </a:fontRef>
+        </p:style>
+      </p:cxnSp>
+      <p:sp>
+        <p:nvSpPr>
+          <p:cNvPr id="136" name="TextBox 135">
+            <a:extLst>
+              <a:ext uri="{FF2B5EF4-FFF2-40B4-BE49-F238E27FC236}">
+                <a16:creationId xmlns:a16="http://schemas.microsoft.com/office/drawing/2014/main" id="{0F5B1C11-EF1F-E76C-50C1-349ABBBA3E62}"/>
+              </a:ext>
+            </a:extLst>
+          </p:cNvPr>
+          <p:cNvSpPr txBox="1"/>
+          <p:nvPr/>
+        </p:nvSpPr>
+        <p:spPr>
+          <a:xfrm>
+            <a:off x="8830726" y="1943618"/>
+            <a:ext cx="1120945" cy="461665"/>
+          </a:xfrm>
+          <a:prstGeom prst="rect">
+            <a:avLst/>
+          </a:prstGeom>
+          <a:noFill/>
+        </p:spPr>
+        <p:txBody>
+          <a:bodyPr wrap="square">
+            <a:spAutoFit/>
+          </a:bodyPr>
+          <a:lstStyle/>
+          <a:p>
+            <a:r>
+              <a:rPr lang="en-US" sz="1200" b="1" dirty="0"/>
+              <a:t>PLC Contact signal input </a:t>
+            </a:r>
+            <a:endParaRPr lang="en-SG" sz="1200" b="1" dirty="0"/>
+          </a:p>
+        </p:txBody>
+      </p:sp>
+      <p:sp>
+        <p:nvSpPr>
+          <p:cNvPr id="137" name="TextBox 136">
+            <a:extLst>
+              <a:ext uri="{FF2B5EF4-FFF2-40B4-BE49-F238E27FC236}">
+                <a16:creationId xmlns:a16="http://schemas.microsoft.com/office/drawing/2014/main" id="{1E8F158A-FB92-E26A-3DF2-156B54313867}"/>
+              </a:ext>
+            </a:extLst>
+          </p:cNvPr>
+          <p:cNvSpPr txBox="1"/>
+          <p:nvPr/>
+        </p:nvSpPr>
+        <p:spPr>
+          <a:xfrm>
+            <a:off x="7565483" y="4314844"/>
+            <a:ext cx="1120944" cy="461665"/>
+          </a:xfrm>
+          <a:prstGeom prst="rect">
+            <a:avLst/>
+          </a:prstGeom>
+          <a:noFill/>
+        </p:spPr>
+        <p:txBody>
+          <a:bodyPr wrap="square">
+            <a:spAutoFit/>
+          </a:bodyPr>
+          <a:lstStyle/>
+          <a:p>
+            <a:r>
+              <a:rPr lang="en-US" sz="1200" b="1" dirty="0"/>
+              <a:t>PLC Coil signal output </a:t>
+            </a:r>
+            <a:endParaRPr lang="en-SG" sz="1200" b="1" dirty="0"/>
+          </a:p>
+        </p:txBody>
+      </p:sp>
+      <p:sp>
+        <p:nvSpPr>
+          <p:cNvPr id="138" name="TextBox 137">
+            <a:extLst>
+              <a:ext uri="{FF2B5EF4-FFF2-40B4-BE49-F238E27FC236}">
+                <a16:creationId xmlns:a16="http://schemas.microsoft.com/office/drawing/2014/main" id="{63679A9A-F8B4-D854-E457-6ACFF8AB9F9F}"/>
+              </a:ext>
+            </a:extLst>
+          </p:cNvPr>
+          <p:cNvSpPr txBox="1"/>
+          <p:nvPr/>
+        </p:nvSpPr>
+        <p:spPr>
+          <a:xfrm>
+            <a:off x="4954945" y="5152149"/>
+            <a:ext cx="1863140" cy="276999"/>
+          </a:xfrm>
+          <a:prstGeom prst="rect">
+            <a:avLst/>
+          </a:prstGeom>
+          <a:noFill/>
+        </p:spPr>
+        <p:txBody>
+          <a:bodyPr wrap="square">
+            <a:spAutoFit/>
+          </a:bodyPr>
+          <a:lstStyle/>
+          <a:p>
+            <a:r>
+              <a:rPr lang="en-US" sz="1200" b="1" dirty="0"/>
+              <a:t>AC power load device</a:t>
+            </a:r>
+            <a:endParaRPr lang="en-SG" sz="1200" b="1" dirty="0"/>
+          </a:p>
+        </p:txBody>
+      </p:sp>
+      <p:sp>
+        <p:nvSpPr>
+          <p:cNvPr id="139" name="TextBox 138">
+            <a:extLst>
+              <a:ext uri="{FF2B5EF4-FFF2-40B4-BE49-F238E27FC236}">
+                <a16:creationId xmlns:a16="http://schemas.microsoft.com/office/drawing/2014/main" id="{A315BB73-8A8F-4CAB-3DB5-3196C3748835}"/>
+              </a:ext>
+            </a:extLst>
+          </p:cNvPr>
+          <p:cNvSpPr txBox="1"/>
+          <p:nvPr/>
+        </p:nvSpPr>
+        <p:spPr>
+          <a:xfrm>
+            <a:off x="3207717" y="365370"/>
+            <a:ext cx="1344985" cy="461665"/>
+          </a:xfrm>
+          <a:prstGeom prst="rect">
+            <a:avLst/>
+          </a:prstGeom>
+          <a:noFill/>
+        </p:spPr>
+        <p:txBody>
+          <a:bodyPr wrap="square">
+            <a:spAutoFit/>
+          </a:bodyPr>
+          <a:lstStyle/>
+          <a:p>
+            <a:r>
+              <a:rPr lang="en-US" sz="1200" b="1" dirty="0"/>
+              <a:t>Control motor AC power input </a:t>
+            </a:r>
+            <a:endParaRPr lang="en-SG" sz="1200" b="1" dirty="0"/>
+          </a:p>
+        </p:txBody>
+      </p:sp>
+      <p:sp>
+        <p:nvSpPr>
+          <p:cNvPr id="140" name="TextBox 139">
+            <a:extLst>
+              <a:ext uri="{FF2B5EF4-FFF2-40B4-BE49-F238E27FC236}">
+                <a16:creationId xmlns:a16="http://schemas.microsoft.com/office/drawing/2014/main" id="{E3780D62-9367-72EE-03B0-2464851872DE}"/>
+              </a:ext>
+            </a:extLst>
+          </p:cNvPr>
+          <p:cNvSpPr txBox="1"/>
+          <p:nvPr/>
+        </p:nvSpPr>
+        <p:spPr>
+          <a:xfrm>
+            <a:off x="7327678" y="547130"/>
+            <a:ext cx="1603400" cy="276999"/>
+          </a:xfrm>
+          <a:prstGeom prst="rect">
+            <a:avLst/>
+          </a:prstGeom>
+          <a:noFill/>
+        </p:spPr>
+        <p:txBody>
+          <a:bodyPr wrap="square">
+            <a:spAutoFit/>
+          </a:bodyPr>
+          <a:lstStyle/>
+          <a:p>
+            <a:r>
+              <a:rPr lang="en-US" sz="1200" b="1" dirty="0"/>
+              <a:t>PLC AC power input </a:t>
+            </a:r>
+            <a:endParaRPr lang="en-SG" sz="1200" b="1" dirty="0"/>
+          </a:p>
+        </p:txBody>
+      </p:sp>
+      <p:sp>
+        <p:nvSpPr>
+          <p:cNvPr id="141" name="TextBox 140">
+            <a:extLst>
+              <a:ext uri="{FF2B5EF4-FFF2-40B4-BE49-F238E27FC236}">
+                <a16:creationId xmlns:a16="http://schemas.microsoft.com/office/drawing/2014/main" id="{C0EA3C2E-FDA1-AB5B-4613-C5680DD052D6}"/>
+              </a:ext>
+            </a:extLst>
+          </p:cNvPr>
+          <p:cNvSpPr txBox="1"/>
+          <p:nvPr/>
+        </p:nvSpPr>
+        <p:spPr>
+          <a:xfrm>
+            <a:off x="3474747" y="3941612"/>
+            <a:ext cx="1662451" cy="461665"/>
+          </a:xfrm>
+          <a:prstGeom prst="rect">
+            <a:avLst/>
+          </a:prstGeom>
+          <a:noFill/>
+        </p:spPr>
+        <p:txBody>
+          <a:bodyPr wrap="square">
+            <a:spAutoFit/>
+          </a:bodyPr>
+          <a:lstStyle/>
+          <a:p>
+            <a:r>
+              <a:rPr lang="en-US" sz="1200" b="1" dirty="0">
+                <a:solidFill>
+                  <a:schemeClr val="bg1">
+                    <a:lumMod val="50000"/>
+                  </a:schemeClr>
+                </a:solidFill>
+              </a:rPr>
+              <a:t>Breaker Control Motor</a:t>
+            </a:r>
+            <a:endParaRPr lang="en-SG" sz="1200" b="1" dirty="0">
+              <a:solidFill>
+                <a:schemeClr val="bg1">
+                  <a:lumMod val="50000"/>
+                </a:schemeClr>
+              </a:solidFill>
+            </a:endParaRPr>
+          </a:p>
+        </p:txBody>
+      </p:sp>
+      <p:sp>
+        <p:nvSpPr>
+          <p:cNvPr id="142" name="TextBox 141">
+            <a:extLst>
+              <a:ext uri="{FF2B5EF4-FFF2-40B4-BE49-F238E27FC236}">
+                <a16:creationId xmlns:a16="http://schemas.microsoft.com/office/drawing/2014/main" id="{81EB18FF-4F46-3A2A-B5A9-C7DDC69F5C73}"/>
+              </a:ext>
+            </a:extLst>
+          </p:cNvPr>
+          <p:cNvSpPr txBox="1"/>
+          <p:nvPr/>
+        </p:nvSpPr>
+        <p:spPr>
+          <a:xfrm>
+            <a:off x="4954945" y="3917685"/>
+            <a:ext cx="1662451" cy="461665"/>
+          </a:xfrm>
+          <a:prstGeom prst="rect">
+            <a:avLst/>
+          </a:prstGeom>
+          <a:noFill/>
+        </p:spPr>
+        <p:txBody>
+          <a:bodyPr wrap="square">
+            <a:spAutoFit/>
+          </a:bodyPr>
+          <a:lstStyle/>
+          <a:p>
+            <a:r>
+              <a:rPr lang="en-US" sz="1200" b="1" dirty="0">
+                <a:solidFill>
+                  <a:schemeClr val="bg1">
+                    <a:lumMod val="50000"/>
+                  </a:schemeClr>
+                </a:solidFill>
+              </a:rPr>
+              <a:t>High Voltage AC Circuit Breaker</a:t>
+            </a:r>
+            <a:endParaRPr lang="en-SG" sz="1200" b="1" dirty="0">
+              <a:solidFill>
+                <a:schemeClr val="bg1">
+                  <a:lumMod val="50000"/>
+                </a:schemeClr>
+              </a:solidFill>
+            </a:endParaRPr>
+          </a:p>
+        </p:txBody>
+      </p:sp>
+      <p:sp>
+        <p:nvSpPr>
+          <p:cNvPr id="143" name="TextBox 142">
+            <a:extLst>
+              <a:ext uri="{FF2B5EF4-FFF2-40B4-BE49-F238E27FC236}">
+                <a16:creationId xmlns:a16="http://schemas.microsoft.com/office/drawing/2014/main" id="{F8A5D472-E8BD-F56F-8285-A6E762E5DF78}"/>
+              </a:ext>
+            </a:extLst>
+          </p:cNvPr>
+          <p:cNvSpPr txBox="1"/>
+          <p:nvPr/>
+        </p:nvSpPr>
+        <p:spPr>
+          <a:xfrm>
+            <a:off x="2099581" y="3918430"/>
+            <a:ext cx="1420270" cy="461665"/>
+          </a:xfrm>
+          <a:prstGeom prst="rect">
+            <a:avLst/>
+          </a:prstGeom>
+          <a:noFill/>
+        </p:spPr>
+        <p:txBody>
+          <a:bodyPr wrap="square">
+            <a:spAutoFit/>
+          </a:bodyPr>
+          <a:lstStyle/>
+          <a:p>
+            <a:r>
+              <a:rPr lang="en-US" sz="1200" b="1" dirty="0">
+                <a:solidFill>
+                  <a:schemeClr val="bg1">
+                    <a:lumMod val="50000"/>
+                  </a:schemeClr>
+                </a:solidFill>
+              </a:rPr>
+              <a:t>Breaker State Sensor</a:t>
+            </a:r>
+            <a:endParaRPr lang="en-SG" sz="1200" b="1" dirty="0">
+              <a:solidFill>
+                <a:schemeClr val="bg1">
+                  <a:lumMod val="50000"/>
+                </a:schemeClr>
+              </a:solidFill>
+            </a:endParaRPr>
+          </a:p>
+        </p:txBody>
+      </p:sp>
+      <p:sp>
+        <p:nvSpPr>
+          <p:cNvPr id="144" name="TextBox 143">
+            <a:extLst>
+              <a:ext uri="{FF2B5EF4-FFF2-40B4-BE49-F238E27FC236}">
+                <a16:creationId xmlns:a16="http://schemas.microsoft.com/office/drawing/2014/main" id="{8EAF807C-7D40-80AF-035C-3D74416D7B54}"/>
+              </a:ext>
+            </a:extLst>
+          </p:cNvPr>
+          <p:cNvSpPr txBox="1"/>
+          <p:nvPr/>
+        </p:nvSpPr>
+        <p:spPr>
+          <a:xfrm>
+            <a:off x="6438076" y="3853179"/>
+            <a:ext cx="1662451" cy="461665"/>
+          </a:xfrm>
+          <a:prstGeom prst="rect">
+            <a:avLst/>
+          </a:prstGeom>
+          <a:noFill/>
+        </p:spPr>
+        <p:txBody>
+          <a:bodyPr wrap="square">
+            <a:spAutoFit/>
+          </a:bodyPr>
+          <a:lstStyle/>
+          <a:p>
+            <a:r>
+              <a:rPr lang="en-US" sz="1200" b="1" dirty="0">
+                <a:solidFill>
+                  <a:schemeClr val="bg1">
+                    <a:lumMod val="50000"/>
+                  </a:schemeClr>
+                </a:solidFill>
+              </a:rPr>
+              <a:t>5V-DC Relay with 48V-DC Contact</a:t>
+            </a:r>
+            <a:endParaRPr lang="en-SG" sz="1200" b="1" dirty="0">
+              <a:solidFill>
+                <a:schemeClr val="bg1">
+                  <a:lumMod val="50000"/>
+                </a:schemeClr>
+              </a:solidFill>
+            </a:endParaRPr>
+          </a:p>
+        </p:txBody>
+      </p:sp>
+      <p:pic>
+        <p:nvPicPr>
+          <p:cNvPr id="146" name="Picture 145" descr="A computer screen shot of a computer&#10;&#10;Description automatically generated">
+            <a:extLst>
+              <a:ext uri="{FF2B5EF4-FFF2-40B4-BE49-F238E27FC236}">
+                <a16:creationId xmlns:a16="http://schemas.microsoft.com/office/drawing/2014/main" id="{E83043AB-E5D5-76D6-93B2-2232E73F034A}"/>
+              </a:ext>
+            </a:extLst>
+          </p:cNvPr>
+          <p:cNvPicPr>
+            <a:picLocks noChangeAspect="1"/>
+          </p:cNvPicPr>
+          <p:nvPr/>
+        </p:nvPicPr>
+        <p:blipFill>
+          <a:blip r:embed="rId8">
+            <a:extLst>
+              <a:ext uri="{28A0092B-C50C-407E-A947-70E740481C1C}">
+                <a14:useLocalDpi xmlns:a14="http://schemas.microsoft.com/office/drawing/2010/main" val="0"/>
+              </a:ext>
+            </a:extLst>
+          </a:blip>
+          <a:srcRect r="20360"/>
+          <a:stretch/>
+        </p:blipFill>
+        <p:spPr>
+          <a:xfrm>
+            <a:off x="8887525" y="4470229"/>
+            <a:ext cx="2460348" cy="1769531"/>
+          </a:xfrm>
+          <a:prstGeom prst="rect">
+            <a:avLst/>
+          </a:prstGeom>
+          <a:ln w="19050">
+            <a:solidFill>
+              <a:schemeClr val="tx1"/>
+            </a:solidFill>
+          </a:ln>
+        </p:spPr>
+      </p:pic>
+      <p:sp>
+        <p:nvSpPr>
+          <p:cNvPr id="151" name="TextBox 150">
+            <a:extLst>
+              <a:ext uri="{FF2B5EF4-FFF2-40B4-BE49-F238E27FC236}">
+                <a16:creationId xmlns:a16="http://schemas.microsoft.com/office/drawing/2014/main" id="{3B23985A-C5F7-4162-E1E2-56C9B125D370}"/>
+              </a:ext>
+            </a:extLst>
+          </p:cNvPr>
+          <p:cNvSpPr txBox="1"/>
+          <p:nvPr/>
+        </p:nvSpPr>
+        <p:spPr>
+          <a:xfrm>
+            <a:off x="9255727" y="3987367"/>
+            <a:ext cx="1662451" cy="461665"/>
+          </a:xfrm>
+          <a:prstGeom prst="rect">
+            <a:avLst/>
+          </a:prstGeom>
+          <a:noFill/>
+        </p:spPr>
+        <p:txBody>
+          <a:bodyPr wrap="square">
+            <a:spAutoFit/>
+          </a:bodyPr>
+          <a:lstStyle/>
+          <a:p>
+            <a:r>
+              <a:rPr lang="en-US" sz="1200" b="1" dirty="0">
+                <a:solidFill>
+                  <a:schemeClr val="bg1">
+                    <a:lumMod val="50000"/>
+                  </a:schemeClr>
+                </a:solidFill>
+              </a:rPr>
+              <a:t>Power System SCADA HMI</a:t>
+            </a:r>
+            <a:endParaRPr lang="en-SG" sz="1200" b="1" dirty="0">
+              <a:solidFill>
+                <a:schemeClr val="bg1">
+                  <a:lumMod val="50000"/>
+                </a:schemeClr>
+              </a:solidFill>
+            </a:endParaRPr>
+          </a:p>
+        </p:txBody>
+      </p:sp>
+      <p:cxnSp>
+        <p:nvCxnSpPr>
+          <p:cNvPr id="153" name="Straight Connector 152">
+            <a:extLst>
+              <a:ext uri="{FF2B5EF4-FFF2-40B4-BE49-F238E27FC236}">
+                <a16:creationId xmlns:a16="http://schemas.microsoft.com/office/drawing/2014/main" id="{D5CA14C1-B17A-B17C-7CF4-B47883ECE313}"/>
+              </a:ext>
+            </a:extLst>
+          </p:cNvPr>
+          <p:cNvCxnSpPr/>
+          <p:nvPr/>
+        </p:nvCxnSpPr>
+        <p:spPr>
+          <a:xfrm flipV="1">
+            <a:off x="8830726" y="3353243"/>
+            <a:ext cx="1761930" cy="19342"/>
+          </a:xfrm>
+          <a:prstGeom prst="line">
+            <a:avLst/>
+          </a:prstGeom>
+          <a:ln>
+            <a:solidFill>
+              <a:srgbClr val="FF0000"/>
+            </a:solidFill>
+            <a:prstDash val="sysDash"/>
+          </a:ln>
+        </p:spPr>
+        <p:style>
+          <a:lnRef idx="2">
+            <a:schemeClr val="accent1"/>
+          </a:lnRef>
+          <a:fillRef idx="0">
+            <a:schemeClr val="accent1"/>
+          </a:fillRef>
+          <a:effectRef idx="1">
+            <a:schemeClr val="accent1"/>
+          </a:effectRef>
+          <a:fontRef idx="minor">
+            <a:schemeClr val="tx1"/>
+          </a:fontRef>
+        </p:style>
+      </p:cxnSp>
+      <p:cxnSp>
+        <p:nvCxnSpPr>
+          <p:cNvPr id="154" name="Straight Connector 153">
+            <a:extLst>
+              <a:ext uri="{FF2B5EF4-FFF2-40B4-BE49-F238E27FC236}">
+                <a16:creationId xmlns:a16="http://schemas.microsoft.com/office/drawing/2014/main" id="{F40A9040-6645-5FFB-CA79-42D3A644A327}"/>
+              </a:ext>
+            </a:extLst>
+          </p:cNvPr>
+          <p:cNvCxnSpPr>
+            <a:cxnSpLocks/>
+          </p:cNvCxnSpPr>
+          <p:nvPr/>
+        </p:nvCxnSpPr>
+        <p:spPr>
+          <a:xfrm>
+            <a:off x="10592656" y="3353243"/>
+            <a:ext cx="0" cy="1095789"/>
+          </a:xfrm>
+          <a:prstGeom prst="line">
+            <a:avLst/>
+          </a:prstGeom>
+          <a:ln>
+            <a:solidFill>
+              <a:srgbClr val="FF0000"/>
+            </a:solidFill>
+            <a:prstDash val="sysDash"/>
+          </a:ln>
+        </p:spPr>
+        <p:style>
+          <a:lnRef idx="2">
+            <a:schemeClr val="accent1"/>
+          </a:lnRef>
+          <a:fillRef idx="0">
+            <a:schemeClr val="accent1"/>
+          </a:fillRef>
+          <a:effectRef idx="1">
+            <a:schemeClr val="accent1"/>
+          </a:effectRef>
+          <a:fontRef idx="minor">
+            <a:schemeClr val="tx1"/>
+          </a:fontRef>
+        </p:style>
+      </p:cxnSp>
+      <p:pic>
+        <p:nvPicPr>
+          <p:cNvPr id="158" name="Graphic 157" descr="Server with solid fill">
+            <a:extLst>
+              <a:ext uri="{FF2B5EF4-FFF2-40B4-BE49-F238E27FC236}">
+                <a16:creationId xmlns:a16="http://schemas.microsoft.com/office/drawing/2014/main" id="{D4BFDAD7-B5B6-C81A-3309-B4798989056D}"/>
+              </a:ext>
+            </a:extLst>
+          </p:cNvPr>
+          <p:cNvPicPr>
+            <a:picLocks noChangeAspect="1"/>
+          </p:cNvPicPr>
+          <p:nvPr/>
+        </p:nvPicPr>
+        <p:blipFill>
+          <a:blip r:embed="rId9">
+            <a:extLst>
+              <a:ext uri="{96DAC541-7B7A-43D3-8B79-37D633B846F1}">
+                <asvg:svgBlip xmlns:asvg="http://schemas.microsoft.com/office/drawing/2016/SVG/main" r:embed="rId10"/>
+              </a:ext>
+            </a:extLst>
+          </a:blip>
+          <a:stretch>
+            <a:fillRect/>
+          </a:stretch>
+        </p:blipFill>
+        <p:spPr>
+          <a:xfrm>
+            <a:off x="10326415" y="3020843"/>
+            <a:ext cx="532482" cy="532482"/>
+          </a:xfrm>
+          <a:prstGeom prst="rect">
+            <a:avLst/>
+          </a:prstGeom>
+        </p:spPr>
+      </p:pic>
+      <p:sp>
+        <p:nvSpPr>
+          <p:cNvPr id="159" name="TextBox 158">
+            <a:extLst>
+              <a:ext uri="{FF2B5EF4-FFF2-40B4-BE49-F238E27FC236}">
+                <a16:creationId xmlns:a16="http://schemas.microsoft.com/office/drawing/2014/main" id="{B6653712-8E25-9167-A678-BA8563D1E041}"/>
+              </a:ext>
+            </a:extLst>
+          </p:cNvPr>
+          <p:cNvSpPr txBox="1"/>
+          <p:nvPr/>
+        </p:nvSpPr>
+        <p:spPr>
+          <a:xfrm>
+            <a:off x="10242184" y="2681551"/>
+            <a:ext cx="1233425" cy="461665"/>
+          </a:xfrm>
+          <a:prstGeom prst="rect">
+            <a:avLst/>
+          </a:prstGeom>
+          <a:noFill/>
+        </p:spPr>
+        <p:txBody>
+          <a:bodyPr wrap="square">
+            <a:spAutoFit/>
+          </a:bodyPr>
+          <a:lstStyle/>
+          <a:p>
+            <a:r>
+              <a:rPr lang="en-US" sz="1200" b="1" dirty="0">
+                <a:solidFill>
+                  <a:schemeClr val="bg1">
+                    <a:lumMod val="50000"/>
+                  </a:schemeClr>
+                </a:solidFill>
+              </a:rPr>
+              <a:t>OT-ICS network</a:t>
+            </a:r>
+            <a:endParaRPr lang="en-SG" sz="1200" b="1" dirty="0">
+              <a:solidFill>
+                <a:schemeClr val="bg1">
+                  <a:lumMod val="50000"/>
+                </a:schemeClr>
+              </a:solidFill>
+            </a:endParaRPr>
+          </a:p>
+        </p:txBody>
+      </p:sp>
+      <p:sp>
+        <p:nvSpPr>
+          <p:cNvPr id="160" name="TextBox 159">
+            <a:extLst>
+              <a:ext uri="{FF2B5EF4-FFF2-40B4-BE49-F238E27FC236}">
+                <a16:creationId xmlns:a16="http://schemas.microsoft.com/office/drawing/2014/main" id="{3EB4AA25-37E1-C001-B8D7-9BABC2C3F670}"/>
+              </a:ext>
+            </a:extLst>
+          </p:cNvPr>
+          <p:cNvSpPr txBox="1"/>
+          <p:nvPr/>
+        </p:nvSpPr>
+        <p:spPr>
+          <a:xfrm>
+            <a:off x="4103477" y="1958982"/>
+            <a:ext cx="1432032" cy="461665"/>
+          </a:xfrm>
+          <a:prstGeom prst="rect">
+            <a:avLst/>
+          </a:prstGeom>
+          <a:noFill/>
+        </p:spPr>
+        <p:txBody>
+          <a:bodyPr wrap="square">
+            <a:spAutoFit/>
+          </a:bodyPr>
+          <a:lstStyle/>
+          <a:p>
+            <a:r>
+              <a:rPr lang="en-US" sz="1200" b="1" dirty="0"/>
+              <a:t>Motor control signal</a:t>
+            </a:r>
+            <a:endParaRPr lang="en-SG" sz="1200" b="1" dirty="0"/>
+          </a:p>
+        </p:txBody>
+      </p:sp>
+    </p:spTree>
+    <p:extLst>
+      <p:ext uri="{BB962C8B-B14F-4D97-AF65-F5344CB8AC3E}">
+        <p14:creationId xmlns:p14="http://schemas.microsoft.com/office/powerpoint/2010/main" val="480551244"/>
       </p:ext>
     </p:extLst>
   </p:cSld>

</xml_diff>

<commit_message>
update the ladder logic section.
</commit_message>
<xml_diff>
--- a/OT_System_Attack_Case_Study/Power_CircuitBreaker/img/designDoc.pptx
+++ b/OT_System_Attack_Case_Study/Power_CircuitBreaker/img/designDoc.pptx
@@ -7,6 +7,8 @@
   <p:sldIdLst>
     <p:sldId id="256" r:id="rId2"/>
     <p:sldId id="257" r:id="rId3"/>
+    <p:sldId id="259" r:id="rId4"/>
+    <p:sldId id="258" r:id="rId5"/>
   </p:sldIdLst>
   <p:sldSz cx="12192000" cy="6858000"/>
   <p:notesSz cx="6858000" cy="9144000"/>
@@ -262,7 +264,7 @@
           <a:p>
             <a:fld id="{F0EB0E7A-F811-45C0-9812-9E3D3D3B182F}" type="datetimeFigureOut">
               <a:rPr lang="en-SG" smtClean="0"/>
-              <a:t>18/9/2024</a:t>
+              <a:t>19/9/2024</a:t>
             </a:fld>
             <a:endParaRPr lang="en-SG"/>
           </a:p>
@@ -462,7 +464,7 @@
           <a:p>
             <a:fld id="{F0EB0E7A-F811-45C0-9812-9E3D3D3B182F}" type="datetimeFigureOut">
               <a:rPr lang="en-SG" smtClean="0"/>
-              <a:t>18/9/2024</a:t>
+              <a:t>19/9/2024</a:t>
             </a:fld>
             <a:endParaRPr lang="en-SG"/>
           </a:p>
@@ -672,7 +674,7 @@
           <a:p>
             <a:fld id="{F0EB0E7A-F811-45C0-9812-9E3D3D3B182F}" type="datetimeFigureOut">
               <a:rPr lang="en-SG" smtClean="0"/>
-              <a:t>18/9/2024</a:t>
+              <a:t>19/9/2024</a:t>
             </a:fld>
             <a:endParaRPr lang="en-SG"/>
           </a:p>
@@ -872,7 +874,7 @@
           <a:p>
             <a:fld id="{F0EB0E7A-F811-45C0-9812-9E3D3D3B182F}" type="datetimeFigureOut">
               <a:rPr lang="en-SG" smtClean="0"/>
-              <a:t>18/9/2024</a:t>
+              <a:t>19/9/2024</a:t>
             </a:fld>
             <a:endParaRPr lang="en-SG"/>
           </a:p>
@@ -1148,7 +1150,7 @@
           <a:p>
             <a:fld id="{F0EB0E7A-F811-45C0-9812-9E3D3D3B182F}" type="datetimeFigureOut">
               <a:rPr lang="en-SG" smtClean="0"/>
-              <a:t>18/9/2024</a:t>
+              <a:t>19/9/2024</a:t>
             </a:fld>
             <a:endParaRPr lang="en-SG"/>
           </a:p>
@@ -1416,7 +1418,7 @@
           <a:p>
             <a:fld id="{F0EB0E7A-F811-45C0-9812-9E3D3D3B182F}" type="datetimeFigureOut">
               <a:rPr lang="en-SG" smtClean="0"/>
-              <a:t>18/9/2024</a:t>
+              <a:t>19/9/2024</a:t>
             </a:fld>
             <a:endParaRPr lang="en-SG"/>
           </a:p>
@@ -1831,7 +1833,7 @@
           <a:p>
             <a:fld id="{F0EB0E7A-F811-45C0-9812-9E3D3D3B182F}" type="datetimeFigureOut">
               <a:rPr lang="en-SG" smtClean="0"/>
-              <a:t>18/9/2024</a:t>
+              <a:t>19/9/2024</a:t>
             </a:fld>
             <a:endParaRPr lang="en-SG"/>
           </a:p>
@@ -1973,7 +1975,7 @@
           <a:p>
             <a:fld id="{F0EB0E7A-F811-45C0-9812-9E3D3D3B182F}" type="datetimeFigureOut">
               <a:rPr lang="en-SG" smtClean="0"/>
-              <a:t>18/9/2024</a:t>
+              <a:t>19/9/2024</a:t>
             </a:fld>
             <a:endParaRPr lang="en-SG"/>
           </a:p>
@@ -2086,7 +2088,7 @@
           <a:p>
             <a:fld id="{F0EB0E7A-F811-45C0-9812-9E3D3D3B182F}" type="datetimeFigureOut">
               <a:rPr lang="en-SG" smtClean="0"/>
-              <a:t>18/9/2024</a:t>
+              <a:t>19/9/2024</a:t>
             </a:fld>
             <a:endParaRPr lang="en-SG"/>
           </a:p>
@@ -2399,7 +2401,7 @@
           <a:p>
             <a:fld id="{F0EB0E7A-F811-45C0-9812-9E3D3D3B182F}" type="datetimeFigureOut">
               <a:rPr lang="en-SG" smtClean="0"/>
-              <a:t>18/9/2024</a:t>
+              <a:t>19/9/2024</a:t>
             </a:fld>
             <a:endParaRPr lang="en-SG"/>
           </a:p>
@@ -2688,7 +2690,7 @@
           <a:p>
             <a:fld id="{F0EB0E7A-F811-45C0-9812-9E3D3D3B182F}" type="datetimeFigureOut">
               <a:rPr lang="en-SG" smtClean="0"/>
-              <a:t>18/9/2024</a:t>
+              <a:t>19/9/2024</a:t>
             </a:fld>
             <a:endParaRPr lang="en-SG"/>
           </a:p>
@@ -2931,7 +2933,7 @@
           <a:p>
             <a:fld id="{F0EB0E7A-F811-45C0-9812-9E3D3D3B182F}" type="datetimeFigureOut">
               <a:rPr lang="en-SG" smtClean="0"/>
-              <a:t>18/9/2024</a:t>
+              <a:t>19/9/2024</a:t>
             </a:fld>
             <a:endParaRPr lang="en-SG"/>
           </a:p>
@@ -7196,10 +7198,2067 @@
           </a:p>
         </p:txBody>
       </p:sp>
+      <p:sp>
+        <p:nvSpPr>
+          <p:cNvPr id="2" name="TextBox 1">
+            <a:extLst>
+              <a:ext uri="{FF2B5EF4-FFF2-40B4-BE49-F238E27FC236}">
+                <a16:creationId xmlns:a16="http://schemas.microsoft.com/office/drawing/2014/main" id="{BE509FA3-24CF-6B16-8430-2794D0ED692E}"/>
+              </a:ext>
+            </a:extLst>
+          </p:cNvPr>
+          <p:cNvSpPr txBox="1"/>
+          <p:nvPr/>
+        </p:nvSpPr>
+        <p:spPr>
+          <a:xfrm>
+            <a:off x="4744720" y="344560"/>
+            <a:ext cx="2356692" cy="461665"/>
+          </a:xfrm>
+          <a:prstGeom prst="rect">
+            <a:avLst/>
+          </a:prstGeom>
+          <a:noFill/>
+        </p:spPr>
+        <p:txBody>
+          <a:bodyPr wrap="square">
+            <a:spAutoFit/>
+          </a:bodyPr>
+          <a:lstStyle/>
+          <a:p>
+            <a:r>
+              <a:rPr lang="en-US" sz="1200" b="1" dirty="0"/>
+              <a:t>Circuit breaker input ( Can be other  high voltage AC/DC bus  )</a:t>
+            </a:r>
+            <a:endParaRPr lang="en-SG" sz="1200" b="1" dirty="0"/>
+          </a:p>
+        </p:txBody>
+      </p:sp>
     </p:spTree>
     <p:extLst>
       <p:ext uri="{BB962C8B-B14F-4D97-AF65-F5344CB8AC3E}">
         <p14:creationId xmlns:p14="http://schemas.microsoft.com/office/powerpoint/2010/main" val="480551244"/>
+      </p:ext>
+    </p:extLst>
+  </p:cSld>
+  <p:clrMapOvr>
+    <a:masterClrMapping/>
+  </p:clrMapOvr>
+</p:sld>
+</file>
+
+<file path=ppt/slides/slide3.xml><?xml version="1.0" encoding="utf-8"?>
+<p:sld xmlns:a="http://schemas.openxmlformats.org/drawingml/2006/main" xmlns:r="http://schemas.openxmlformats.org/officeDocument/2006/relationships" xmlns:p="http://schemas.openxmlformats.org/presentationml/2006/main">
+  <p:cSld>
+    <p:spTree>
+      <p:nvGrpSpPr>
+        <p:cNvPr id="1" name=""/>
+        <p:cNvGrpSpPr/>
+        <p:nvPr/>
+      </p:nvGrpSpPr>
+      <p:grpSpPr>
+        <a:xfrm>
+          <a:off x="0" y="0"/>
+          <a:ext cx="0" cy="0"/>
+          <a:chOff x="0" y="0"/>
+          <a:chExt cx="0" cy="0"/>
+        </a:xfrm>
+      </p:grpSpPr>
+      <p:pic>
+        <p:nvPicPr>
+          <p:cNvPr id="5" name="Picture 4">
+            <a:extLst>
+              <a:ext uri="{FF2B5EF4-FFF2-40B4-BE49-F238E27FC236}">
+                <a16:creationId xmlns:a16="http://schemas.microsoft.com/office/drawing/2014/main" id="{DE2869AE-975D-E084-A91A-72214B92AC5D}"/>
+              </a:ext>
+            </a:extLst>
+          </p:cNvPr>
+          <p:cNvPicPr>
+            <a:picLocks noChangeAspect="1"/>
+          </p:cNvPicPr>
+          <p:nvPr/>
+        </p:nvPicPr>
+        <p:blipFill>
+          <a:blip r:embed="rId2">
+            <a:extLst>
+              <a:ext uri="{28A0092B-C50C-407E-A947-70E740481C1C}">
+                <a14:useLocalDpi xmlns:a14="http://schemas.microsoft.com/office/drawing/2010/main" val="0"/>
+              </a:ext>
+            </a:extLst>
+          </a:blip>
+          <a:stretch>
+            <a:fillRect/>
+          </a:stretch>
+        </p:blipFill>
+        <p:spPr>
+          <a:xfrm>
+            <a:off x="1929333" y="667095"/>
+            <a:ext cx="8333333" cy="5523809"/>
+          </a:xfrm>
+          <a:prstGeom prst="rect">
+            <a:avLst/>
+          </a:prstGeom>
+        </p:spPr>
+      </p:pic>
+      <p:cxnSp>
+        <p:nvCxnSpPr>
+          <p:cNvPr id="7" name="Straight Arrow Connector 6">
+            <a:extLst>
+              <a:ext uri="{FF2B5EF4-FFF2-40B4-BE49-F238E27FC236}">
+                <a16:creationId xmlns:a16="http://schemas.microsoft.com/office/drawing/2014/main" id="{EF40129D-1FD5-3120-347B-655401EF0601}"/>
+              </a:ext>
+            </a:extLst>
+          </p:cNvPr>
+          <p:cNvCxnSpPr>
+            <a:cxnSpLocks/>
+          </p:cNvCxnSpPr>
+          <p:nvPr/>
+        </p:nvCxnSpPr>
+        <p:spPr>
+          <a:xfrm flipV="1">
+            <a:off x="7687340" y="3429000"/>
+            <a:ext cx="0" cy="592758"/>
+          </a:xfrm>
+          <a:prstGeom prst="straightConnector1">
+            <a:avLst/>
+          </a:prstGeom>
+          <a:ln>
+            <a:solidFill>
+              <a:srgbClr val="C00000"/>
+            </a:solidFill>
+            <a:tailEnd type="triangle"/>
+          </a:ln>
+        </p:spPr>
+        <p:style>
+          <a:lnRef idx="2">
+            <a:schemeClr val="accent1"/>
+          </a:lnRef>
+          <a:fillRef idx="0">
+            <a:schemeClr val="accent1"/>
+          </a:fillRef>
+          <a:effectRef idx="1">
+            <a:schemeClr val="accent1"/>
+          </a:effectRef>
+          <a:fontRef idx="minor">
+            <a:schemeClr val="tx1"/>
+          </a:fontRef>
+        </p:style>
+      </p:cxnSp>
+      <p:sp>
+        <p:nvSpPr>
+          <p:cNvPr id="8" name="TextBox 7">
+            <a:extLst>
+              <a:ext uri="{FF2B5EF4-FFF2-40B4-BE49-F238E27FC236}">
+                <a16:creationId xmlns:a16="http://schemas.microsoft.com/office/drawing/2014/main" id="{95062F1D-6586-F59F-7153-65FB56FAAA47}"/>
+              </a:ext>
+            </a:extLst>
+          </p:cNvPr>
+          <p:cNvSpPr txBox="1"/>
+          <p:nvPr/>
+        </p:nvSpPr>
+        <p:spPr>
+          <a:xfrm>
+            <a:off x="7419967" y="4021758"/>
+            <a:ext cx="1662451" cy="954107"/>
+          </a:xfrm>
+          <a:prstGeom prst="rect">
+            <a:avLst/>
+          </a:prstGeom>
+          <a:noFill/>
+        </p:spPr>
+        <p:txBody>
+          <a:bodyPr wrap="square">
+            <a:spAutoFit/>
+          </a:bodyPr>
+          <a:lstStyle/>
+          <a:p>
+            <a:r>
+              <a:rPr lang="en-US" sz="1400" b="1" dirty="0">
+                <a:solidFill>
+                  <a:srgbClr val="C00000"/>
+                </a:solidFill>
+              </a:rPr>
+              <a:t>[2] Circuit breaker Motor handle used to flip the breaker  </a:t>
+            </a:r>
+            <a:endParaRPr lang="en-SG" sz="1400" b="1" dirty="0">
+              <a:solidFill>
+                <a:srgbClr val="C00000"/>
+              </a:solidFill>
+            </a:endParaRPr>
+          </a:p>
+        </p:txBody>
+      </p:sp>
+      <p:cxnSp>
+        <p:nvCxnSpPr>
+          <p:cNvPr id="11" name="Straight Arrow Connector 10">
+            <a:extLst>
+              <a:ext uri="{FF2B5EF4-FFF2-40B4-BE49-F238E27FC236}">
+                <a16:creationId xmlns:a16="http://schemas.microsoft.com/office/drawing/2014/main" id="{8DD5BAB3-E4E4-4A3A-E3FC-B5B52F3710F3}"/>
+              </a:ext>
+            </a:extLst>
+          </p:cNvPr>
+          <p:cNvCxnSpPr>
+            <a:cxnSpLocks/>
+          </p:cNvCxnSpPr>
+          <p:nvPr/>
+        </p:nvCxnSpPr>
+        <p:spPr>
+          <a:xfrm flipV="1">
+            <a:off x="9158177" y="3015662"/>
+            <a:ext cx="0" cy="592758"/>
+          </a:xfrm>
+          <a:prstGeom prst="straightConnector1">
+            <a:avLst/>
+          </a:prstGeom>
+          <a:ln>
+            <a:solidFill>
+              <a:srgbClr val="C00000"/>
+            </a:solidFill>
+            <a:tailEnd type="triangle"/>
+          </a:ln>
+        </p:spPr>
+        <p:style>
+          <a:lnRef idx="2">
+            <a:schemeClr val="accent1"/>
+          </a:lnRef>
+          <a:fillRef idx="0">
+            <a:schemeClr val="accent1"/>
+          </a:fillRef>
+          <a:effectRef idx="1">
+            <a:schemeClr val="accent1"/>
+          </a:effectRef>
+          <a:fontRef idx="minor">
+            <a:schemeClr val="tx1"/>
+          </a:fontRef>
+        </p:style>
+      </p:cxnSp>
+      <p:sp>
+        <p:nvSpPr>
+          <p:cNvPr id="13" name="TextBox 12">
+            <a:extLst>
+              <a:ext uri="{FF2B5EF4-FFF2-40B4-BE49-F238E27FC236}">
+                <a16:creationId xmlns:a16="http://schemas.microsoft.com/office/drawing/2014/main" id="{6FAA3ECB-5A9D-AE87-562E-F4D9DED56B75}"/>
+              </a:ext>
+            </a:extLst>
+          </p:cNvPr>
+          <p:cNvSpPr txBox="1"/>
+          <p:nvPr/>
+        </p:nvSpPr>
+        <p:spPr>
+          <a:xfrm>
+            <a:off x="9082418" y="3608420"/>
+            <a:ext cx="1447621" cy="1169551"/>
+          </a:xfrm>
+          <a:prstGeom prst="rect">
+            <a:avLst/>
+          </a:prstGeom>
+          <a:noFill/>
+        </p:spPr>
+        <p:txBody>
+          <a:bodyPr wrap="square">
+            <a:spAutoFit/>
+          </a:bodyPr>
+          <a:lstStyle/>
+          <a:p>
+            <a:r>
+              <a:rPr lang="en-US" sz="1400" b="1" dirty="0">
+                <a:solidFill>
+                  <a:srgbClr val="C00000"/>
+                </a:solidFill>
+              </a:rPr>
+              <a:t>[1] Circuit breaker handle used to control the breaker on and off</a:t>
+            </a:r>
+            <a:endParaRPr lang="en-SG" sz="1400" b="1" dirty="0">
+              <a:solidFill>
+                <a:srgbClr val="C00000"/>
+              </a:solidFill>
+            </a:endParaRPr>
+          </a:p>
+        </p:txBody>
+      </p:sp>
+      <p:cxnSp>
+        <p:nvCxnSpPr>
+          <p:cNvPr id="17" name="Straight Arrow Connector 16">
+            <a:extLst>
+              <a:ext uri="{FF2B5EF4-FFF2-40B4-BE49-F238E27FC236}">
+                <a16:creationId xmlns:a16="http://schemas.microsoft.com/office/drawing/2014/main" id="{26DAC631-7F7C-920E-29EC-18A25F176C61}"/>
+              </a:ext>
+            </a:extLst>
+          </p:cNvPr>
+          <p:cNvCxnSpPr>
+            <a:cxnSpLocks/>
+          </p:cNvCxnSpPr>
+          <p:nvPr/>
+        </p:nvCxnSpPr>
+        <p:spPr>
+          <a:xfrm flipH="1">
+            <a:off x="4593266" y="4975865"/>
+            <a:ext cx="435935" cy="10632"/>
+          </a:xfrm>
+          <a:prstGeom prst="straightConnector1">
+            <a:avLst/>
+          </a:prstGeom>
+          <a:ln>
+            <a:solidFill>
+              <a:srgbClr val="C00000"/>
+            </a:solidFill>
+            <a:tailEnd type="triangle"/>
+          </a:ln>
+        </p:spPr>
+        <p:style>
+          <a:lnRef idx="2">
+            <a:schemeClr val="accent1"/>
+          </a:lnRef>
+          <a:fillRef idx="0">
+            <a:schemeClr val="accent1"/>
+          </a:fillRef>
+          <a:effectRef idx="1">
+            <a:schemeClr val="accent1"/>
+          </a:effectRef>
+          <a:fontRef idx="minor">
+            <a:schemeClr val="tx1"/>
+          </a:fontRef>
+        </p:style>
+      </p:cxnSp>
+      <p:sp>
+        <p:nvSpPr>
+          <p:cNvPr id="23" name="Oval 22">
+            <a:extLst>
+              <a:ext uri="{FF2B5EF4-FFF2-40B4-BE49-F238E27FC236}">
+                <a16:creationId xmlns:a16="http://schemas.microsoft.com/office/drawing/2014/main" id="{DFED6787-7CAA-571E-93CA-CAECE12365A2}"/>
+              </a:ext>
+            </a:extLst>
+          </p:cNvPr>
+          <p:cNvSpPr/>
+          <p:nvPr/>
+        </p:nvSpPr>
+        <p:spPr>
+          <a:xfrm>
+            <a:off x="4082902" y="4777971"/>
+            <a:ext cx="510364" cy="495778"/>
+          </a:xfrm>
+          <a:prstGeom prst="ellipse">
+            <a:avLst/>
+          </a:prstGeom>
+          <a:noFill/>
+          <a:ln>
+            <a:solidFill>
+              <a:srgbClr val="C00000"/>
+            </a:solidFill>
+            <a:prstDash val="sysDash"/>
+          </a:ln>
+        </p:spPr>
+        <p:style>
+          <a:lnRef idx="2">
+            <a:schemeClr val="accent1">
+              <a:shade val="15000"/>
+            </a:schemeClr>
+          </a:lnRef>
+          <a:fillRef idx="1">
+            <a:schemeClr val="accent1"/>
+          </a:fillRef>
+          <a:effectRef idx="0">
+            <a:schemeClr val="accent1"/>
+          </a:effectRef>
+          <a:fontRef idx="minor">
+            <a:schemeClr val="lt1"/>
+          </a:fontRef>
+        </p:style>
+        <p:txBody>
+          <a:bodyPr rtlCol="0" anchor="ctr"/>
+          <a:lstStyle/>
+          <a:p>
+            <a:pPr algn="ctr"/>
+            <a:endParaRPr lang="en-SG" dirty="0"/>
+          </a:p>
+        </p:txBody>
+      </p:sp>
+      <p:sp>
+        <p:nvSpPr>
+          <p:cNvPr id="25" name="TextBox 24">
+            <a:extLst>
+              <a:ext uri="{FF2B5EF4-FFF2-40B4-BE49-F238E27FC236}">
+                <a16:creationId xmlns:a16="http://schemas.microsoft.com/office/drawing/2014/main" id="{F0F4C083-BCD0-D28D-B960-28BA31F706F1}"/>
+              </a:ext>
+            </a:extLst>
+          </p:cNvPr>
+          <p:cNvSpPr txBox="1"/>
+          <p:nvPr/>
+        </p:nvSpPr>
+        <p:spPr>
+          <a:xfrm>
+            <a:off x="5095210" y="4509443"/>
+            <a:ext cx="1774529" cy="954107"/>
+          </a:xfrm>
+          <a:prstGeom prst="rect">
+            <a:avLst/>
+          </a:prstGeom>
+          <a:noFill/>
+        </p:spPr>
+        <p:txBody>
+          <a:bodyPr wrap="square">
+            <a:spAutoFit/>
+          </a:bodyPr>
+          <a:lstStyle/>
+          <a:p>
+            <a:r>
+              <a:rPr lang="en-US" sz="1400" b="1" dirty="0">
+                <a:solidFill>
+                  <a:srgbClr val="C00000"/>
+                </a:solidFill>
+              </a:rPr>
+              <a:t>[3]  Sensor handle used to detect breaker and motor handle position   </a:t>
+            </a:r>
+            <a:endParaRPr lang="en-SG" sz="1400" b="1" dirty="0">
+              <a:solidFill>
+                <a:srgbClr val="C00000"/>
+              </a:solidFill>
+            </a:endParaRPr>
+          </a:p>
+        </p:txBody>
+      </p:sp>
+      <p:cxnSp>
+        <p:nvCxnSpPr>
+          <p:cNvPr id="26" name="Straight Arrow Connector 25">
+            <a:extLst>
+              <a:ext uri="{FF2B5EF4-FFF2-40B4-BE49-F238E27FC236}">
+                <a16:creationId xmlns:a16="http://schemas.microsoft.com/office/drawing/2014/main" id="{B443B918-D6B4-6098-FA5E-0E5FF1D2A737}"/>
+              </a:ext>
+            </a:extLst>
+          </p:cNvPr>
+          <p:cNvCxnSpPr>
+            <a:cxnSpLocks/>
+          </p:cNvCxnSpPr>
+          <p:nvPr/>
+        </p:nvCxnSpPr>
+        <p:spPr>
+          <a:xfrm>
+            <a:off x="4338084" y="2528395"/>
+            <a:ext cx="2244768" cy="1063893"/>
+          </a:xfrm>
+          <a:prstGeom prst="straightConnector1">
+            <a:avLst/>
+          </a:prstGeom>
+          <a:ln>
+            <a:solidFill>
+              <a:srgbClr val="C00000"/>
+            </a:solidFill>
+            <a:prstDash val="sysDash"/>
+            <a:tailEnd type="triangle"/>
+          </a:ln>
+        </p:spPr>
+        <p:style>
+          <a:lnRef idx="2">
+            <a:schemeClr val="accent1"/>
+          </a:lnRef>
+          <a:fillRef idx="0">
+            <a:schemeClr val="accent1"/>
+          </a:fillRef>
+          <a:effectRef idx="1">
+            <a:schemeClr val="accent1"/>
+          </a:effectRef>
+          <a:fontRef idx="minor">
+            <a:schemeClr val="tx1"/>
+          </a:fontRef>
+        </p:style>
+      </p:cxnSp>
+      <p:cxnSp>
+        <p:nvCxnSpPr>
+          <p:cNvPr id="32" name="Straight Arrow Connector 31">
+            <a:extLst>
+              <a:ext uri="{FF2B5EF4-FFF2-40B4-BE49-F238E27FC236}">
+                <a16:creationId xmlns:a16="http://schemas.microsoft.com/office/drawing/2014/main" id="{13453A58-95E5-D83E-5AFA-739C4693F0CC}"/>
+              </a:ext>
+            </a:extLst>
+          </p:cNvPr>
+          <p:cNvCxnSpPr>
+            <a:cxnSpLocks/>
+          </p:cNvCxnSpPr>
+          <p:nvPr/>
+        </p:nvCxnSpPr>
+        <p:spPr>
+          <a:xfrm flipV="1">
+            <a:off x="7900815" y="3015662"/>
+            <a:ext cx="899231" cy="251700"/>
+          </a:xfrm>
+          <a:prstGeom prst="straightConnector1">
+            <a:avLst/>
+          </a:prstGeom>
+          <a:ln>
+            <a:solidFill>
+              <a:srgbClr val="C00000"/>
+            </a:solidFill>
+            <a:prstDash val="sysDash"/>
+            <a:tailEnd type="triangle"/>
+          </a:ln>
+        </p:spPr>
+        <p:style>
+          <a:lnRef idx="2">
+            <a:schemeClr val="accent1"/>
+          </a:lnRef>
+          <a:fillRef idx="0">
+            <a:schemeClr val="accent1"/>
+          </a:fillRef>
+          <a:effectRef idx="1">
+            <a:schemeClr val="accent1"/>
+          </a:effectRef>
+          <a:fontRef idx="minor">
+            <a:schemeClr val="tx1"/>
+          </a:fontRef>
+        </p:style>
+      </p:cxnSp>
+    </p:spTree>
+    <p:extLst>
+      <p:ext uri="{BB962C8B-B14F-4D97-AF65-F5344CB8AC3E}">
+        <p14:creationId xmlns:p14="http://schemas.microsoft.com/office/powerpoint/2010/main" val="3216281257"/>
+      </p:ext>
+    </p:extLst>
+  </p:cSld>
+  <p:clrMapOvr>
+    <a:masterClrMapping/>
+  </p:clrMapOvr>
+</p:sld>
+</file>
+
+<file path=ppt/slides/slide4.xml><?xml version="1.0" encoding="utf-8"?>
+<p:sld xmlns:a="http://schemas.openxmlformats.org/drawingml/2006/main" xmlns:r="http://schemas.openxmlformats.org/officeDocument/2006/relationships" xmlns:p="http://schemas.openxmlformats.org/presentationml/2006/main">
+  <p:cSld>
+    <p:spTree>
+      <p:nvGrpSpPr>
+        <p:cNvPr id="1" name=""/>
+        <p:cNvGrpSpPr/>
+        <p:nvPr/>
+      </p:nvGrpSpPr>
+      <p:grpSpPr>
+        <a:xfrm>
+          <a:off x="0" y="0"/>
+          <a:ext cx="0" cy="0"/>
+          <a:chOff x="0" y="0"/>
+          <a:chExt cx="0" cy="0"/>
+        </a:xfrm>
+      </p:grpSpPr>
+      <p:pic>
+        <p:nvPicPr>
+          <p:cNvPr id="4" name="Picture 3">
+            <a:extLst>
+              <a:ext uri="{FF2B5EF4-FFF2-40B4-BE49-F238E27FC236}">
+                <a16:creationId xmlns:a16="http://schemas.microsoft.com/office/drawing/2014/main" id="{8491E59E-C9EF-9875-2BFF-C1BF1C231815}"/>
+              </a:ext>
+            </a:extLst>
+          </p:cNvPr>
+          <p:cNvPicPr>
+            <a:picLocks noChangeAspect="1"/>
+          </p:cNvPicPr>
+          <p:nvPr/>
+        </p:nvPicPr>
+        <p:blipFill>
+          <a:blip r:embed="rId2">
+            <a:extLst>
+              <a:ext uri="{28A0092B-C50C-407E-A947-70E740481C1C}">
+                <a14:useLocalDpi xmlns:a14="http://schemas.microsoft.com/office/drawing/2010/main" val="0"/>
+              </a:ext>
+            </a:extLst>
+          </a:blip>
+          <a:stretch>
+            <a:fillRect/>
+          </a:stretch>
+        </p:blipFill>
+        <p:spPr>
+          <a:xfrm>
+            <a:off x="2539497" y="623432"/>
+            <a:ext cx="476190" cy="466667"/>
+          </a:xfrm>
+          <a:prstGeom prst="rect">
+            <a:avLst/>
+          </a:prstGeom>
+        </p:spPr>
+      </p:pic>
+      <p:cxnSp>
+        <p:nvCxnSpPr>
+          <p:cNvPr id="5" name="Straight Connector 4">
+            <a:extLst>
+              <a:ext uri="{FF2B5EF4-FFF2-40B4-BE49-F238E27FC236}">
+                <a16:creationId xmlns:a16="http://schemas.microsoft.com/office/drawing/2014/main" id="{77695D49-EB3D-704D-F190-44B4BC31290D}"/>
+              </a:ext>
+            </a:extLst>
+          </p:cNvPr>
+          <p:cNvCxnSpPr/>
+          <p:nvPr/>
+        </p:nvCxnSpPr>
+        <p:spPr>
+          <a:xfrm>
+            <a:off x="2156078" y="856765"/>
+            <a:ext cx="383419" cy="0"/>
+          </a:xfrm>
+          <a:prstGeom prst="line">
+            <a:avLst/>
+          </a:prstGeom>
+        </p:spPr>
+        <p:style>
+          <a:lnRef idx="2">
+            <a:schemeClr val="accent1"/>
+          </a:lnRef>
+          <a:fillRef idx="0">
+            <a:schemeClr val="accent1"/>
+          </a:fillRef>
+          <a:effectRef idx="1">
+            <a:schemeClr val="accent1"/>
+          </a:effectRef>
+          <a:fontRef idx="minor">
+            <a:schemeClr val="tx1"/>
+          </a:fontRef>
+        </p:style>
+      </p:cxnSp>
+      <p:cxnSp>
+        <p:nvCxnSpPr>
+          <p:cNvPr id="6" name="Straight Connector 5">
+            <a:extLst>
+              <a:ext uri="{FF2B5EF4-FFF2-40B4-BE49-F238E27FC236}">
+                <a16:creationId xmlns:a16="http://schemas.microsoft.com/office/drawing/2014/main" id="{CB8FD692-3D15-40F1-5DCE-074EDE931702}"/>
+              </a:ext>
+            </a:extLst>
+          </p:cNvPr>
+          <p:cNvCxnSpPr>
+            <a:cxnSpLocks/>
+          </p:cNvCxnSpPr>
+          <p:nvPr/>
+        </p:nvCxnSpPr>
+        <p:spPr>
+          <a:xfrm>
+            <a:off x="3015687" y="856765"/>
+            <a:ext cx="383419" cy="0"/>
+          </a:xfrm>
+          <a:prstGeom prst="line">
+            <a:avLst/>
+          </a:prstGeom>
+        </p:spPr>
+        <p:style>
+          <a:lnRef idx="2">
+            <a:schemeClr val="accent1"/>
+          </a:lnRef>
+          <a:fillRef idx="0">
+            <a:schemeClr val="accent1"/>
+          </a:fillRef>
+          <a:effectRef idx="1">
+            <a:schemeClr val="accent1"/>
+          </a:effectRef>
+          <a:fontRef idx="minor">
+            <a:schemeClr val="tx1"/>
+          </a:fontRef>
+        </p:style>
+      </p:cxnSp>
+      <p:cxnSp>
+        <p:nvCxnSpPr>
+          <p:cNvPr id="8" name="Straight Connector 7">
+            <a:extLst>
+              <a:ext uri="{FF2B5EF4-FFF2-40B4-BE49-F238E27FC236}">
+                <a16:creationId xmlns:a16="http://schemas.microsoft.com/office/drawing/2014/main" id="{A7FAC259-3A8A-3AA0-479A-F690ECE00087}"/>
+              </a:ext>
+            </a:extLst>
+          </p:cNvPr>
+          <p:cNvCxnSpPr>
+            <a:cxnSpLocks/>
+          </p:cNvCxnSpPr>
+          <p:nvPr/>
+        </p:nvCxnSpPr>
+        <p:spPr>
+          <a:xfrm>
+            <a:off x="2156078" y="1389308"/>
+            <a:ext cx="1243028" cy="0"/>
+          </a:xfrm>
+          <a:prstGeom prst="line">
+            <a:avLst/>
+          </a:prstGeom>
+        </p:spPr>
+        <p:style>
+          <a:lnRef idx="2">
+            <a:schemeClr val="accent1"/>
+          </a:lnRef>
+          <a:fillRef idx="0">
+            <a:schemeClr val="accent1"/>
+          </a:fillRef>
+          <a:effectRef idx="1">
+            <a:schemeClr val="accent1"/>
+          </a:effectRef>
+          <a:fontRef idx="minor">
+            <a:schemeClr val="tx1"/>
+          </a:fontRef>
+        </p:style>
+      </p:cxnSp>
+      <p:pic>
+        <p:nvPicPr>
+          <p:cNvPr id="10" name="Picture 9">
+            <a:extLst>
+              <a:ext uri="{FF2B5EF4-FFF2-40B4-BE49-F238E27FC236}">
+                <a16:creationId xmlns:a16="http://schemas.microsoft.com/office/drawing/2014/main" id="{A3F5A7F4-6B5A-919F-BC97-D5682C01A2EC}"/>
+              </a:ext>
+            </a:extLst>
+          </p:cNvPr>
+          <p:cNvPicPr>
+            <a:picLocks noChangeAspect="1"/>
+          </p:cNvPicPr>
+          <p:nvPr/>
+        </p:nvPicPr>
+        <p:blipFill>
+          <a:blip r:embed="rId3">
+            <a:extLst>
+              <a:ext uri="{28A0092B-C50C-407E-A947-70E740481C1C}">
+                <a14:useLocalDpi xmlns:a14="http://schemas.microsoft.com/office/drawing/2010/main" val="0"/>
+              </a:ext>
+            </a:extLst>
+          </a:blip>
+          <a:stretch>
+            <a:fillRect/>
+          </a:stretch>
+        </p:blipFill>
+        <p:spPr>
+          <a:xfrm>
+            <a:off x="3699500" y="906999"/>
+            <a:ext cx="476190" cy="428571"/>
+          </a:xfrm>
+          <a:prstGeom prst="rect">
+            <a:avLst/>
+          </a:prstGeom>
+          <a:ln w="6350">
+            <a:solidFill>
+              <a:schemeClr val="tx1"/>
+            </a:solidFill>
+          </a:ln>
+        </p:spPr>
+      </p:pic>
+      <p:cxnSp>
+        <p:nvCxnSpPr>
+          <p:cNvPr id="11" name="Straight Connector 10">
+            <a:extLst>
+              <a:ext uri="{FF2B5EF4-FFF2-40B4-BE49-F238E27FC236}">
+                <a16:creationId xmlns:a16="http://schemas.microsoft.com/office/drawing/2014/main" id="{B9F1487E-D997-68FC-2EB1-0285E8702259}"/>
+              </a:ext>
+            </a:extLst>
+          </p:cNvPr>
+          <p:cNvCxnSpPr>
+            <a:cxnSpLocks/>
+          </p:cNvCxnSpPr>
+          <p:nvPr/>
+        </p:nvCxnSpPr>
+        <p:spPr>
+          <a:xfrm>
+            <a:off x="3388832" y="865539"/>
+            <a:ext cx="0" cy="180548"/>
+          </a:xfrm>
+          <a:prstGeom prst="line">
+            <a:avLst/>
+          </a:prstGeom>
+        </p:spPr>
+        <p:style>
+          <a:lnRef idx="2">
+            <a:schemeClr val="accent1"/>
+          </a:lnRef>
+          <a:fillRef idx="0">
+            <a:schemeClr val="accent1"/>
+          </a:fillRef>
+          <a:effectRef idx="1">
+            <a:schemeClr val="accent1"/>
+          </a:effectRef>
+          <a:fontRef idx="minor">
+            <a:schemeClr val="tx1"/>
+          </a:fontRef>
+        </p:style>
+      </p:cxnSp>
+      <p:cxnSp>
+        <p:nvCxnSpPr>
+          <p:cNvPr id="14" name="Straight Connector 13">
+            <a:extLst>
+              <a:ext uri="{FF2B5EF4-FFF2-40B4-BE49-F238E27FC236}">
+                <a16:creationId xmlns:a16="http://schemas.microsoft.com/office/drawing/2014/main" id="{AA90DA1A-FFA0-5F5C-F051-EE020113245D}"/>
+              </a:ext>
+            </a:extLst>
+          </p:cNvPr>
+          <p:cNvCxnSpPr>
+            <a:cxnSpLocks/>
+          </p:cNvCxnSpPr>
+          <p:nvPr/>
+        </p:nvCxnSpPr>
+        <p:spPr>
+          <a:xfrm>
+            <a:off x="3399106" y="1046087"/>
+            <a:ext cx="290121" cy="0"/>
+          </a:xfrm>
+          <a:prstGeom prst="line">
+            <a:avLst/>
+          </a:prstGeom>
+        </p:spPr>
+        <p:style>
+          <a:lnRef idx="2">
+            <a:schemeClr val="accent1"/>
+          </a:lnRef>
+          <a:fillRef idx="0">
+            <a:schemeClr val="accent1"/>
+          </a:fillRef>
+          <a:effectRef idx="1">
+            <a:schemeClr val="accent1"/>
+          </a:effectRef>
+          <a:fontRef idx="minor">
+            <a:schemeClr val="tx1"/>
+          </a:fontRef>
+        </p:style>
+      </p:cxnSp>
+      <p:cxnSp>
+        <p:nvCxnSpPr>
+          <p:cNvPr id="17" name="Straight Connector 16">
+            <a:extLst>
+              <a:ext uri="{FF2B5EF4-FFF2-40B4-BE49-F238E27FC236}">
+                <a16:creationId xmlns:a16="http://schemas.microsoft.com/office/drawing/2014/main" id="{3FBCB2BC-0376-65CE-2C45-FD05911C5130}"/>
+              </a:ext>
+            </a:extLst>
+          </p:cNvPr>
+          <p:cNvCxnSpPr>
+            <a:cxnSpLocks/>
+          </p:cNvCxnSpPr>
+          <p:nvPr/>
+        </p:nvCxnSpPr>
+        <p:spPr>
+          <a:xfrm>
+            <a:off x="3399106" y="1204321"/>
+            <a:ext cx="0" cy="180548"/>
+          </a:xfrm>
+          <a:prstGeom prst="line">
+            <a:avLst/>
+          </a:prstGeom>
+        </p:spPr>
+        <p:style>
+          <a:lnRef idx="2">
+            <a:schemeClr val="accent1"/>
+          </a:lnRef>
+          <a:fillRef idx="0">
+            <a:schemeClr val="accent1"/>
+          </a:fillRef>
+          <a:effectRef idx="1">
+            <a:schemeClr val="accent1"/>
+          </a:effectRef>
+          <a:fontRef idx="minor">
+            <a:schemeClr val="tx1"/>
+          </a:fontRef>
+        </p:style>
+      </p:cxnSp>
+      <p:cxnSp>
+        <p:nvCxnSpPr>
+          <p:cNvPr id="18" name="Straight Connector 17">
+            <a:extLst>
+              <a:ext uri="{FF2B5EF4-FFF2-40B4-BE49-F238E27FC236}">
+                <a16:creationId xmlns:a16="http://schemas.microsoft.com/office/drawing/2014/main" id="{0C92AA6A-B61B-3F04-F7B3-258174DAD530}"/>
+              </a:ext>
+            </a:extLst>
+          </p:cNvPr>
+          <p:cNvCxnSpPr>
+            <a:cxnSpLocks/>
+          </p:cNvCxnSpPr>
+          <p:nvPr/>
+        </p:nvCxnSpPr>
+        <p:spPr>
+          <a:xfrm>
+            <a:off x="3399105" y="1204321"/>
+            <a:ext cx="290121" cy="0"/>
+          </a:xfrm>
+          <a:prstGeom prst="line">
+            <a:avLst/>
+          </a:prstGeom>
+        </p:spPr>
+        <p:style>
+          <a:lnRef idx="2">
+            <a:schemeClr val="accent1"/>
+          </a:lnRef>
+          <a:fillRef idx="0">
+            <a:schemeClr val="accent1"/>
+          </a:fillRef>
+          <a:effectRef idx="1">
+            <a:schemeClr val="accent1"/>
+          </a:effectRef>
+          <a:fontRef idx="minor">
+            <a:schemeClr val="tx1"/>
+          </a:fontRef>
+        </p:style>
+      </p:cxnSp>
+      <p:cxnSp>
+        <p:nvCxnSpPr>
+          <p:cNvPr id="19" name="Straight Connector 18">
+            <a:extLst>
+              <a:ext uri="{FF2B5EF4-FFF2-40B4-BE49-F238E27FC236}">
+                <a16:creationId xmlns:a16="http://schemas.microsoft.com/office/drawing/2014/main" id="{0AE39687-1A2C-A2C0-3A9E-4037971BA2EF}"/>
+              </a:ext>
+            </a:extLst>
+          </p:cNvPr>
+          <p:cNvCxnSpPr>
+            <a:cxnSpLocks/>
+          </p:cNvCxnSpPr>
+          <p:nvPr/>
+        </p:nvCxnSpPr>
+        <p:spPr>
+          <a:xfrm>
+            <a:off x="4175690" y="1121284"/>
+            <a:ext cx="290121" cy="0"/>
+          </a:xfrm>
+          <a:prstGeom prst="line">
+            <a:avLst/>
+          </a:prstGeom>
+        </p:spPr>
+        <p:style>
+          <a:lnRef idx="2">
+            <a:schemeClr val="accent1"/>
+          </a:lnRef>
+          <a:fillRef idx="0">
+            <a:schemeClr val="accent1"/>
+          </a:fillRef>
+          <a:effectRef idx="1">
+            <a:schemeClr val="accent1"/>
+          </a:effectRef>
+          <a:fontRef idx="minor">
+            <a:schemeClr val="tx1"/>
+          </a:fontRef>
+        </p:style>
+      </p:cxnSp>
+      <p:cxnSp>
+        <p:nvCxnSpPr>
+          <p:cNvPr id="20" name="Straight Connector 19">
+            <a:extLst>
+              <a:ext uri="{FF2B5EF4-FFF2-40B4-BE49-F238E27FC236}">
+                <a16:creationId xmlns:a16="http://schemas.microsoft.com/office/drawing/2014/main" id="{9661BE41-1D03-B75D-D636-6DE46F9335C4}"/>
+              </a:ext>
+            </a:extLst>
+          </p:cNvPr>
+          <p:cNvCxnSpPr>
+            <a:cxnSpLocks/>
+          </p:cNvCxnSpPr>
+          <p:nvPr/>
+        </p:nvCxnSpPr>
+        <p:spPr>
+          <a:xfrm>
+            <a:off x="2156078" y="1716368"/>
+            <a:ext cx="2309733" cy="0"/>
+          </a:xfrm>
+          <a:prstGeom prst="line">
+            <a:avLst/>
+          </a:prstGeom>
+        </p:spPr>
+        <p:style>
+          <a:lnRef idx="2">
+            <a:schemeClr val="accent1"/>
+          </a:lnRef>
+          <a:fillRef idx="0">
+            <a:schemeClr val="accent1"/>
+          </a:fillRef>
+          <a:effectRef idx="1">
+            <a:schemeClr val="accent1"/>
+          </a:effectRef>
+          <a:fontRef idx="minor">
+            <a:schemeClr val="tx1"/>
+          </a:fontRef>
+        </p:style>
+      </p:cxnSp>
+      <p:cxnSp>
+        <p:nvCxnSpPr>
+          <p:cNvPr id="22" name="Straight Connector 21">
+            <a:extLst>
+              <a:ext uri="{FF2B5EF4-FFF2-40B4-BE49-F238E27FC236}">
+                <a16:creationId xmlns:a16="http://schemas.microsoft.com/office/drawing/2014/main" id="{8CC1AD2C-6408-AA45-DC38-50CA9BD6C57E}"/>
+              </a:ext>
+            </a:extLst>
+          </p:cNvPr>
+          <p:cNvCxnSpPr>
+            <a:cxnSpLocks/>
+          </p:cNvCxnSpPr>
+          <p:nvPr/>
+        </p:nvCxnSpPr>
+        <p:spPr>
+          <a:xfrm>
+            <a:off x="4465811" y="1111010"/>
+            <a:ext cx="0" cy="224560"/>
+          </a:xfrm>
+          <a:prstGeom prst="line">
+            <a:avLst/>
+          </a:prstGeom>
+        </p:spPr>
+        <p:style>
+          <a:lnRef idx="2">
+            <a:schemeClr val="accent1"/>
+          </a:lnRef>
+          <a:fillRef idx="0">
+            <a:schemeClr val="accent1"/>
+          </a:fillRef>
+          <a:effectRef idx="1">
+            <a:schemeClr val="accent1"/>
+          </a:effectRef>
+          <a:fontRef idx="minor">
+            <a:schemeClr val="tx1"/>
+          </a:fontRef>
+        </p:style>
+      </p:cxnSp>
+      <p:cxnSp>
+        <p:nvCxnSpPr>
+          <p:cNvPr id="23" name="Straight Connector 22">
+            <a:extLst>
+              <a:ext uri="{FF2B5EF4-FFF2-40B4-BE49-F238E27FC236}">
+                <a16:creationId xmlns:a16="http://schemas.microsoft.com/office/drawing/2014/main" id="{229BF7E3-677A-B16F-D1F8-BB419D88BD1C}"/>
+              </a:ext>
+            </a:extLst>
+          </p:cNvPr>
+          <p:cNvCxnSpPr>
+            <a:cxnSpLocks/>
+          </p:cNvCxnSpPr>
+          <p:nvPr/>
+        </p:nvCxnSpPr>
+        <p:spPr>
+          <a:xfrm>
+            <a:off x="4465811" y="1486895"/>
+            <a:ext cx="0" cy="229473"/>
+          </a:xfrm>
+          <a:prstGeom prst="line">
+            <a:avLst/>
+          </a:prstGeom>
+        </p:spPr>
+        <p:style>
+          <a:lnRef idx="2">
+            <a:schemeClr val="accent1"/>
+          </a:lnRef>
+          <a:fillRef idx="0">
+            <a:schemeClr val="accent1"/>
+          </a:fillRef>
+          <a:effectRef idx="1">
+            <a:schemeClr val="accent1"/>
+          </a:effectRef>
+          <a:fontRef idx="minor">
+            <a:schemeClr val="tx1"/>
+          </a:fontRef>
+        </p:style>
+      </p:cxnSp>
+      <p:cxnSp>
+        <p:nvCxnSpPr>
+          <p:cNvPr id="26" name="Straight Connector 25">
+            <a:extLst>
+              <a:ext uri="{FF2B5EF4-FFF2-40B4-BE49-F238E27FC236}">
+                <a16:creationId xmlns:a16="http://schemas.microsoft.com/office/drawing/2014/main" id="{5BB43B91-0664-E722-69EE-27CDA8A66577}"/>
+              </a:ext>
+            </a:extLst>
+          </p:cNvPr>
+          <p:cNvCxnSpPr>
+            <a:cxnSpLocks/>
+          </p:cNvCxnSpPr>
+          <p:nvPr/>
+        </p:nvCxnSpPr>
+        <p:spPr>
+          <a:xfrm>
+            <a:off x="4465811" y="1335570"/>
+            <a:ext cx="290121" cy="0"/>
+          </a:xfrm>
+          <a:prstGeom prst="line">
+            <a:avLst/>
+          </a:prstGeom>
+        </p:spPr>
+        <p:style>
+          <a:lnRef idx="2">
+            <a:schemeClr val="accent1"/>
+          </a:lnRef>
+          <a:fillRef idx="0">
+            <a:schemeClr val="accent1"/>
+          </a:fillRef>
+          <a:effectRef idx="1">
+            <a:schemeClr val="accent1"/>
+          </a:effectRef>
+          <a:fontRef idx="minor">
+            <a:schemeClr val="tx1"/>
+          </a:fontRef>
+        </p:style>
+      </p:cxnSp>
+      <p:cxnSp>
+        <p:nvCxnSpPr>
+          <p:cNvPr id="28" name="Straight Connector 27">
+            <a:extLst>
+              <a:ext uri="{FF2B5EF4-FFF2-40B4-BE49-F238E27FC236}">
+                <a16:creationId xmlns:a16="http://schemas.microsoft.com/office/drawing/2014/main" id="{1BB1C046-3A8D-2146-17FB-1AC2C5D1B743}"/>
+              </a:ext>
+            </a:extLst>
+          </p:cNvPr>
+          <p:cNvCxnSpPr>
+            <a:cxnSpLocks/>
+          </p:cNvCxnSpPr>
+          <p:nvPr/>
+        </p:nvCxnSpPr>
+        <p:spPr>
+          <a:xfrm>
+            <a:off x="4465811" y="1486895"/>
+            <a:ext cx="290121" cy="0"/>
+          </a:xfrm>
+          <a:prstGeom prst="line">
+            <a:avLst/>
+          </a:prstGeom>
+        </p:spPr>
+        <p:style>
+          <a:lnRef idx="2">
+            <a:schemeClr val="accent1"/>
+          </a:lnRef>
+          <a:fillRef idx="0">
+            <a:schemeClr val="accent1"/>
+          </a:fillRef>
+          <a:effectRef idx="1">
+            <a:schemeClr val="accent1"/>
+          </a:effectRef>
+          <a:fontRef idx="minor">
+            <a:schemeClr val="tx1"/>
+          </a:fontRef>
+        </p:style>
+      </p:cxnSp>
+      <p:pic>
+        <p:nvPicPr>
+          <p:cNvPr id="31" name="Picture 30">
+            <a:extLst>
+              <a:ext uri="{FF2B5EF4-FFF2-40B4-BE49-F238E27FC236}">
+                <a16:creationId xmlns:a16="http://schemas.microsoft.com/office/drawing/2014/main" id="{FD8109CC-D668-D303-1A97-BBF364E8A9FE}"/>
+              </a:ext>
+            </a:extLst>
+          </p:cNvPr>
+          <p:cNvPicPr>
+            <a:picLocks noChangeAspect="1"/>
+          </p:cNvPicPr>
+          <p:nvPr/>
+        </p:nvPicPr>
+        <p:blipFill>
+          <a:blip r:embed="rId4">
+            <a:extLst>
+              <a:ext uri="{28A0092B-C50C-407E-A947-70E740481C1C}">
+                <a14:useLocalDpi xmlns:a14="http://schemas.microsoft.com/office/drawing/2010/main" val="0"/>
+              </a:ext>
+            </a:extLst>
+          </a:blip>
+          <a:stretch>
+            <a:fillRect/>
+          </a:stretch>
+        </p:blipFill>
+        <p:spPr>
+          <a:xfrm>
+            <a:off x="4755930" y="1204321"/>
+            <a:ext cx="476190" cy="409524"/>
+          </a:xfrm>
+          <a:prstGeom prst="rect">
+            <a:avLst/>
+          </a:prstGeom>
+          <a:ln w="6350">
+            <a:solidFill>
+              <a:schemeClr val="tx1"/>
+            </a:solidFill>
+          </a:ln>
+        </p:spPr>
+      </p:pic>
+      <p:cxnSp>
+        <p:nvCxnSpPr>
+          <p:cNvPr id="34" name="Straight Connector 33">
+            <a:extLst>
+              <a:ext uri="{FF2B5EF4-FFF2-40B4-BE49-F238E27FC236}">
+                <a16:creationId xmlns:a16="http://schemas.microsoft.com/office/drawing/2014/main" id="{ACAF5493-CB5F-F718-9A83-D6047FAF2403}"/>
+              </a:ext>
+            </a:extLst>
+          </p:cNvPr>
+          <p:cNvCxnSpPr>
+            <a:cxnSpLocks/>
+          </p:cNvCxnSpPr>
+          <p:nvPr/>
+        </p:nvCxnSpPr>
+        <p:spPr>
+          <a:xfrm>
+            <a:off x="5232120" y="1410198"/>
+            <a:ext cx="572333" cy="0"/>
+          </a:xfrm>
+          <a:prstGeom prst="line">
+            <a:avLst/>
+          </a:prstGeom>
+        </p:spPr>
+        <p:style>
+          <a:lnRef idx="2">
+            <a:schemeClr val="accent1"/>
+          </a:lnRef>
+          <a:fillRef idx="0">
+            <a:schemeClr val="accent1"/>
+          </a:fillRef>
+          <a:effectRef idx="1">
+            <a:schemeClr val="accent1"/>
+          </a:effectRef>
+          <a:fontRef idx="minor">
+            <a:schemeClr val="tx1"/>
+          </a:fontRef>
+        </p:style>
+      </p:cxnSp>
+      <p:sp>
+        <p:nvSpPr>
+          <p:cNvPr id="36" name="TextBox 35">
+            <a:extLst>
+              <a:ext uri="{FF2B5EF4-FFF2-40B4-BE49-F238E27FC236}">
+                <a16:creationId xmlns:a16="http://schemas.microsoft.com/office/drawing/2014/main" id="{8BB1A7B4-0FCF-8BF1-FEB0-C27DC3506D73}"/>
+              </a:ext>
+            </a:extLst>
+          </p:cNvPr>
+          <p:cNvSpPr txBox="1"/>
+          <p:nvPr/>
+        </p:nvSpPr>
+        <p:spPr>
+          <a:xfrm>
+            <a:off x="693514" y="709986"/>
+            <a:ext cx="1472838" cy="276999"/>
+          </a:xfrm>
+          <a:prstGeom prst="rect">
+            <a:avLst/>
+          </a:prstGeom>
+          <a:noFill/>
+          <a:ln w="12700">
+            <a:solidFill>
+              <a:schemeClr val="tx1"/>
+            </a:solidFill>
+          </a:ln>
+        </p:spPr>
+        <p:txBody>
+          <a:bodyPr wrap="square">
+            <a:spAutoFit/>
+          </a:bodyPr>
+          <a:lstStyle/>
+          <a:p>
+            <a:r>
+              <a:rPr lang="en-US" sz="1200" b="1" dirty="0"/>
+              <a:t>PLC first scan bit</a:t>
+            </a:r>
+            <a:endParaRPr lang="en-SG" sz="1200" b="1" dirty="0"/>
+          </a:p>
+        </p:txBody>
+      </p:sp>
+      <p:sp>
+        <p:nvSpPr>
+          <p:cNvPr id="37" name="TextBox 36">
+            <a:extLst>
+              <a:ext uri="{FF2B5EF4-FFF2-40B4-BE49-F238E27FC236}">
+                <a16:creationId xmlns:a16="http://schemas.microsoft.com/office/drawing/2014/main" id="{7CB9D284-D92B-12F4-9485-B8F68BD4C9C7}"/>
+              </a:ext>
+            </a:extLst>
+          </p:cNvPr>
+          <p:cNvSpPr txBox="1"/>
+          <p:nvPr/>
+        </p:nvSpPr>
+        <p:spPr>
+          <a:xfrm>
+            <a:off x="684327" y="1158094"/>
+            <a:ext cx="1482025" cy="276999"/>
+          </a:xfrm>
+          <a:prstGeom prst="rect">
+            <a:avLst/>
+          </a:prstGeom>
+          <a:noFill/>
+          <a:ln w="12700">
+            <a:solidFill>
+              <a:schemeClr val="tx1"/>
+            </a:solidFill>
+          </a:ln>
+        </p:spPr>
+        <p:txBody>
+          <a:bodyPr wrap="square">
+            <a:spAutoFit/>
+          </a:bodyPr>
+          <a:lstStyle/>
+          <a:p>
+            <a:r>
+              <a:rPr lang="en-US" sz="1200" b="1" dirty="0"/>
+              <a:t>PLC Contact state </a:t>
+            </a:r>
+            <a:endParaRPr lang="en-SG" sz="1200" b="1" dirty="0"/>
+          </a:p>
+        </p:txBody>
+      </p:sp>
+      <p:sp>
+        <p:nvSpPr>
+          <p:cNvPr id="39" name="TextBox 38">
+            <a:extLst>
+              <a:ext uri="{FF2B5EF4-FFF2-40B4-BE49-F238E27FC236}">
+                <a16:creationId xmlns:a16="http://schemas.microsoft.com/office/drawing/2014/main" id="{066FC2D4-4B70-4BFC-290D-2ECA6D0E6355}"/>
+              </a:ext>
+            </a:extLst>
+          </p:cNvPr>
+          <p:cNvSpPr txBox="1"/>
+          <p:nvPr/>
+        </p:nvSpPr>
+        <p:spPr>
+          <a:xfrm>
+            <a:off x="674053" y="1601631"/>
+            <a:ext cx="1482024" cy="276999"/>
+          </a:xfrm>
+          <a:prstGeom prst="rect">
+            <a:avLst/>
+          </a:prstGeom>
+          <a:noFill/>
+          <a:ln w="12700">
+            <a:solidFill>
+              <a:schemeClr val="tx1"/>
+            </a:solidFill>
+          </a:ln>
+        </p:spPr>
+        <p:txBody>
+          <a:bodyPr wrap="square">
+            <a:spAutoFit/>
+          </a:bodyPr>
+          <a:lstStyle/>
+          <a:p>
+            <a:r>
+              <a:rPr lang="en-US" sz="1200" b="1" dirty="0"/>
+              <a:t>PLC coil state</a:t>
+            </a:r>
+            <a:endParaRPr lang="en-SG" sz="1200" b="1" dirty="0"/>
+          </a:p>
+        </p:txBody>
+      </p:sp>
+      <p:sp>
+        <p:nvSpPr>
+          <p:cNvPr id="40" name="TextBox 39">
+            <a:extLst>
+              <a:ext uri="{FF2B5EF4-FFF2-40B4-BE49-F238E27FC236}">
+                <a16:creationId xmlns:a16="http://schemas.microsoft.com/office/drawing/2014/main" id="{70937261-3537-FC15-B662-38058068BB2F}"/>
+              </a:ext>
+            </a:extLst>
+          </p:cNvPr>
+          <p:cNvSpPr txBox="1"/>
+          <p:nvPr/>
+        </p:nvSpPr>
+        <p:spPr>
+          <a:xfrm>
+            <a:off x="5822634" y="1270583"/>
+            <a:ext cx="1826517" cy="276999"/>
+          </a:xfrm>
+          <a:prstGeom prst="rect">
+            <a:avLst/>
+          </a:prstGeom>
+          <a:noFill/>
+          <a:ln w="12700">
+            <a:solidFill>
+              <a:schemeClr val="tx1"/>
+            </a:solidFill>
+          </a:ln>
+        </p:spPr>
+        <p:txBody>
+          <a:bodyPr wrap="square">
+            <a:spAutoFit/>
+          </a:bodyPr>
+          <a:lstStyle/>
+          <a:p>
+            <a:r>
+              <a:rPr lang="en-US" sz="1200" b="1" dirty="0"/>
+              <a:t>PLC coil output [motor]</a:t>
+            </a:r>
+            <a:endParaRPr lang="en-SG" sz="1200" b="1" dirty="0"/>
+          </a:p>
+        </p:txBody>
+      </p:sp>
+      <p:pic>
+        <p:nvPicPr>
+          <p:cNvPr id="41" name="Picture 40">
+            <a:extLst>
+              <a:ext uri="{FF2B5EF4-FFF2-40B4-BE49-F238E27FC236}">
+                <a16:creationId xmlns:a16="http://schemas.microsoft.com/office/drawing/2014/main" id="{69BFB43F-BA47-F333-6B34-A38CCE2D2826}"/>
+              </a:ext>
+            </a:extLst>
+          </p:cNvPr>
+          <p:cNvPicPr>
+            <a:picLocks noChangeAspect="1"/>
+          </p:cNvPicPr>
+          <p:nvPr/>
+        </p:nvPicPr>
+        <p:blipFill>
+          <a:blip r:embed="rId5">
+            <a:extLst>
+              <a:ext uri="{28A0092B-C50C-407E-A947-70E740481C1C}">
+                <a14:useLocalDpi xmlns:a14="http://schemas.microsoft.com/office/drawing/2010/main" val="0"/>
+              </a:ext>
+            </a:extLst>
+          </a:blip>
+          <a:stretch>
+            <a:fillRect/>
+          </a:stretch>
+        </p:blipFill>
+        <p:spPr>
+          <a:xfrm>
+            <a:off x="2986662" y="2910413"/>
+            <a:ext cx="409524" cy="323810"/>
+          </a:xfrm>
+          <a:prstGeom prst="rect">
+            <a:avLst/>
+          </a:prstGeom>
+        </p:spPr>
+      </p:pic>
+      <p:sp>
+        <p:nvSpPr>
+          <p:cNvPr id="42" name="TextBox 41">
+            <a:extLst>
+              <a:ext uri="{FF2B5EF4-FFF2-40B4-BE49-F238E27FC236}">
+                <a16:creationId xmlns:a16="http://schemas.microsoft.com/office/drawing/2014/main" id="{E021AD73-3F01-FE93-4A33-AB6901B58E55}"/>
+              </a:ext>
+            </a:extLst>
+          </p:cNvPr>
+          <p:cNvSpPr txBox="1"/>
+          <p:nvPr/>
+        </p:nvSpPr>
+        <p:spPr>
+          <a:xfrm>
+            <a:off x="2931003" y="2648803"/>
+            <a:ext cx="646455" cy="261610"/>
+          </a:xfrm>
+          <a:prstGeom prst="rect">
+            <a:avLst/>
+          </a:prstGeom>
+          <a:noFill/>
+        </p:spPr>
+        <p:txBody>
+          <a:bodyPr wrap="square" rtlCol="0">
+            <a:spAutoFit/>
+          </a:bodyPr>
+          <a:lstStyle/>
+          <a:p>
+            <a:r>
+              <a:rPr lang="en-US" sz="1100" b="1" dirty="0"/>
+              <a:t>%S13</a:t>
+            </a:r>
+            <a:endParaRPr lang="en-SG" sz="1100" b="1" dirty="0"/>
+          </a:p>
+        </p:txBody>
+      </p:sp>
+      <p:pic>
+        <p:nvPicPr>
+          <p:cNvPr id="43" name="Picture 42">
+            <a:extLst>
+              <a:ext uri="{FF2B5EF4-FFF2-40B4-BE49-F238E27FC236}">
+                <a16:creationId xmlns:a16="http://schemas.microsoft.com/office/drawing/2014/main" id="{282DABCD-EE9C-EF77-3575-4624FCB7282D}"/>
+              </a:ext>
+            </a:extLst>
+          </p:cNvPr>
+          <p:cNvPicPr>
+            <a:picLocks noChangeAspect="1"/>
+          </p:cNvPicPr>
+          <p:nvPr/>
+        </p:nvPicPr>
+        <p:blipFill>
+          <a:blip r:embed="rId6">
+            <a:extLst>
+              <a:ext uri="{28A0092B-C50C-407E-A947-70E740481C1C}">
+                <a14:useLocalDpi xmlns:a14="http://schemas.microsoft.com/office/drawing/2010/main" val="0"/>
+              </a:ext>
+            </a:extLst>
+          </a:blip>
+          <a:stretch>
+            <a:fillRect/>
+          </a:stretch>
+        </p:blipFill>
+        <p:spPr>
+          <a:xfrm>
+            <a:off x="4104967" y="2926315"/>
+            <a:ext cx="409524" cy="323810"/>
+          </a:xfrm>
+          <a:prstGeom prst="rect">
+            <a:avLst/>
+          </a:prstGeom>
+        </p:spPr>
+      </p:pic>
+      <p:sp>
+        <p:nvSpPr>
+          <p:cNvPr id="44" name="TextBox 43">
+            <a:extLst>
+              <a:ext uri="{FF2B5EF4-FFF2-40B4-BE49-F238E27FC236}">
+                <a16:creationId xmlns:a16="http://schemas.microsoft.com/office/drawing/2014/main" id="{A8BDA5BA-379D-44B3-CBFA-233C1C937B0D}"/>
+              </a:ext>
+            </a:extLst>
+          </p:cNvPr>
+          <p:cNvSpPr txBox="1"/>
+          <p:nvPr/>
+        </p:nvSpPr>
+        <p:spPr>
+          <a:xfrm>
+            <a:off x="4079658" y="2648803"/>
+            <a:ext cx="646455" cy="261610"/>
+          </a:xfrm>
+          <a:prstGeom prst="rect">
+            <a:avLst/>
+          </a:prstGeom>
+          <a:noFill/>
+        </p:spPr>
+        <p:txBody>
+          <a:bodyPr wrap="square" rtlCol="0">
+            <a:spAutoFit/>
+          </a:bodyPr>
+          <a:lstStyle/>
+          <a:p>
+            <a:r>
+              <a:rPr lang="en-US" sz="1100" b="1" dirty="0"/>
+              <a:t>%I0.0</a:t>
+            </a:r>
+            <a:endParaRPr lang="en-SG" sz="1100" b="1" dirty="0"/>
+          </a:p>
+        </p:txBody>
+      </p:sp>
+      <p:cxnSp>
+        <p:nvCxnSpPr>
+          <p:cNvPr id="45" name="Straight Connector 44">
+            <a:extLst>
+              <a:ext uri="{FF2B5EF4-FFF2-40B4-BE49-F238E27FC236}">
+                <a16:creationId xmlns:a16="http://schemas.microsoft.com/office/drawing/2014/main" id="{4E1D30DC-9AAF-804D-55E7-AA785EF87580}"/>
+              </a:ext>
+            </a:extLst>
+          </p:cNvPr>
+          <p:cNvCxnSpPr>
+            <a:cxnSpLocks/>
+          </p:cNvCxnSpPr>
+          <p:nvPr/>
+        </p:nvCxnSpPr>
+        <p:spPr>
+          <a:xfrm flipV="1">
+            <a:off x="3396186" y="3088220"/>
+            <a:ext cx="716732" cy="2765"/>
+          </a:xfrm>
+          <a:prstGeom prst="line">
+            <a:avLst/>
+          </a:prstGeom>
+        </p:spPr>
+        <p:style>
+          <a:lnRef idx="2">
+            <a:schemeClr val="dk1"/>
+          </a:lnRef>
+          <a:fillRef idx="0">
+            <a:schemeClr val="dk1"/>
+          </a:fillRef>
+          <a:effectRef idx="1">
+            <a:schemeClr val="dk1"/>
+          </a:effectRef>
+          <a:fontRef idx="minor">
+            <a:schemeClr val="tx1"/>
+          </a:fontRef>
+        </p:style>
+      </p:cxnSp>
+      <p:cxnSp>
+        <p:nvCxnSpPr>
+          <p:cNvPr id="47" name="Straight Connector 46">
+            <a:extLst>
+              <a:ext uri="{FF2B5EF4-FFF2-40B4-BE49-F238E27FC236}">
+                <a16:creationId xmlns:a16="http://schemas.microsoft.com/office/drawing/2014/main" id="{A7D2A843-CBFF-4A31-A11C-8F19AED3204B}"/>
+              </a:ext>
+            </a:extLst>
+          </p:cNvPr>
+          <p:cNvCxnSpPr>
+            <a:cxnSpLocks/>
+          </p:cNvCxnSpPr>
+          <p:nvPr/>
+        </p:nvCxnSpPr>
+        <p:spPr>
+          <a:xfrm flipV="1">
+            <a:off x="4506540" y="3080269"/>
+            <a:ext cx="2062133" cy="4439"/>
+          </a:xfrm>
+          <a:prstGeom prst="line">
+            <a:avLst/>
+          </a:prstGeom>
+        </p:spPr>
+        <p:style>
+          <a:lnRef idx="2">
+            <a:schemeClr val="dk1"/>
+          </a:lnRef>
+          <a:fillRef idx="0">
+            <a:schemeClr val="dk1"/>
+          </a:fillRef>
+          <a:effectRef idx="1">
+            <a:schemeClr val="dk1"/>
+          </a:effectRef>
+          <a:fontRef idx="minor">
+            <a:schemeClr val="tx1"/>
+          </a:fontRef>
+        </p:style>
+      </p:cxnSp>
+      <p:pic>
+        <p:nvPicPr>
+          <p:cNvPr id="49" name="Picture 48">
+            <a:extLst>
+              <a:ext uri="{FF2B5EF4-FFF2-40B4-BE49-F238E27FC236}">
+                <a16:creationId xmlns:a16="http://schemas.microsoft.com/office/drawing/2014/main" id="{68F9F272-374B-C373-5A16-19DDADF1DEB0}"/>
+              </a:ext>
+            </a:extLst>
+          </p:cNvPr>
+          <p:cNvPicPr>
+            <a:picLocks noChangeAspect="1"/>
+          </p:cNvPicPr>
+          <p:nvPr/>
+        </p:nvPicPr>
+        <p:blipFill>
+          <a:blip r:embed="rId7">
+            <a:extLst>
+              <a:ext uri="{28A0092B-C50C-407E-A947-70E740481C1C}">
+                <a14:useLocalDpi xmlns:a14="http://schemas.microsoft.com/office/drawing/2010/main" val="0"/>
+              </a:ext>
+            </a:extLst>
+          </a:blip>
+          <a:stretch>
+            <a:fillRect/>
+          </a:stretch>
+        </p:blipFill>
+        <p:spPr>
+          <a:xfrm>
+            <a:off x="6516249" y="2907268"/>
+            <a:ext cx="438095" cy="342857"/>
+          </a:xfrm>
+          <a:prstGeom prst="rect">
+            <a:avLst/>
+          </a:prstGeom>
+        </p:spPr>
+      </p:pic>
+      <p:sp>
+        <p:nvSpPr>
+          <p:cNvPr id="50" name="TextBox 49">
+            <a:extLst>
+              <a:ext uri="{FF2B5EF4-FFF2-40B4-BE49-F238E27FC236}">
+                <a16:creationId xmlns:a16="http://schemas.microsoft.com/office/drawing/2014/main" id="{F3EA0F1B-9707-EDEB-77E4-F408A58D148A}"/>
+              </a:ext>
+            </a:extLst>
+          </p:cNvPr>
+          <p:cNvSpPr txBox="1"/>
+          <p:nvPr/>
+        </p:nvSpPr>
+        <p:spPr>
+          <a:xfrm>
+            <a:off x="6381223" y="2675144"/>
+            <a:ext cx="646455" cy="261610"/>
+          </a:xfrm>
+          <a:prstGeom prst="rect">
+            <a:avLst/>
+          </a:prstGeom>
+          <a:noFill/>
+        </p:spPr>
+        <p:txBody>
+          <a:bodyPr wrap="square" rtlCol="0">
+            <a:spAutoFit/>
+          </a:bodyPr>
+          <a:lstStyle/>
+          <a:p>
+            <a:r>
+              <a:rPr lang="en-US" sz="1100" b="1" dirty="0"/>
+              <a:t>%Q0.0</a:t>
+            </a:r>
+            <a:endParaRPr lang="en-SG" sz="1100" b="1" dirty="0"/>
+          </a:p>
+        </p:txBody>
+      </p:sp>
+      <p:pic>
+        <p:nvPicPr>
+          <p:cNvPr id="51" name="Picture 50">
+            <a:extLst>
+              <a:ext uri="{FF2B5EF4-FFF2-40B4-BE49-F238E27FC236}">
+                <a16:creationId xmlns:a16="http://schemas.microsoft.com/office/drawing/2014/main" id="{35D91635-A625-BA1F-28DE-E90C686B7E6D}"/>
+              </a:ext>
+            </a:extLst>
+          </p:cNvPr>
+          <p:cNvPicPr>
+            <a:picLocks noChangeAspect="1"/>
+          </p:cNvPicPr>
+          <p:nvPr/>
+        </p:nvPicPr>
+        <p:blipFill>
+          <a:blip r:embed="rId7">
+            <a:extLst>
+              <a:ext uri="{28A0092B-C50C-407E-A947-70E740481C1C}">
+                <a14:useLocalDpi xmlns:a14="http://schemas.microsoft.com/office/drawing/2010/main" val="0"/>
+              </a:ext>
+            </a:extLst>
+          </a:blip>
+          <a:stretch>
+            <a:fillRect/>
+          </a:stretch>
+        </p:blipFill>
+        <p:spPr>
+          <a:xfrm>
+            <a:off x="2986662" y="3495833"/>
+            <a:ext cx="438095" cy="342857"/>
+          </a:xfrm>
+          <a:prstGeom prst="rect">
+            <a:avLst/>
+          </a:prstGeom>
+        </p:spPr>
+      </p:pic>
+      <p:sp>
+        <p:nvSpPr>
+          <p:cNvPr id="52" name="TextBox 51">
+            <a:extLst>
+              <a:ext uri="{FF2B5EF4-FFF2-40B4-BE49-F238E27FC236}">
+                <a16:creationId xmlns:a16="http://schemas.microsoft.com/office/drawing/2014/main" id="{866A6076-5CC5-35D8-1A09-488D1A48DC4B}"/>
+              </a:ext>
+            </a:extLst>
+          </p:cNvPr>
+          <p:cNvSpPr txBox="1"/>
+          <p:nvPr/>
+        </p:nvSpPr>
+        <p:spPr>
+          <a:xfrm>
+            <a:off x="2868196" y="3262196"/>
+            <a:ext cx="646455" cy="261610"/>
+          </a:xfrm>
+          <a:prstGeom prst="rect">
+            <a:avLst/>
+          </a:prstGeom>
+          <a:noFill/>
+        </p:spPr>
+        <p:txBody>
+          <a:bodyPr wrap="square" rtlCol="0">
+            <a:spAutoFit/>
+          </a:bodyPr>
+          <a:lstStyle/>
+          <a:p>
+            <a:r>
+              <a:rPr lang="en-US" sz="1100" b="1" dirty="0"/>
+              <a:t>%Q0.0</a:t>
+            </a:r>
+            <a:endParaRPr lang="en-SG" sz="1100" b="1" dirty="0"/>
+          </a:p>
+        </p:txBody>
+      </p:sp>
+      <p:cxnSp>
+        <p:nvCxnSpPr>
+          <p:cNvPr id="53" name="Straight Connector 52">
+            <a:extLst>
+              <a:ext uri="{FF2B5EF4-FFF2-40B4-BE49-F238E27FC236}">
+                <a16:creationId xmlns:a16="http://schemas.microsoft.com/office/drawing/2014/main" id="{A8FE4352-23FF-9564-0DD4-C367F7AD405F}"/>
+              </a:ext>
+            </a:extLst>
+          </p:cNvPr>
+          <p:cNvCxnSpPr>
+            <a:cxnSpLocks/>
+          </p:cNvCxnSpPr>
+          <p:nvPr/>
+        </p:nvCxnSpPr>
+        <p:spPr>
+          <a:xfrm>
+            <a:off x="3424757" y="3665345"/>
+            <a:ext cx="1493065" cy="0"/>
+          </a:xfrm>
+          <a:prstGeom prst="line">
+            <a:avLst/>
+          </a:prstGeom>
+        </p:spPr>
+        <p:style>
+          <a:lnRef idx="2">
+            <a:schemeClr val="dk1"/>
+          </a:lnRef>
+          <a:fillRef idx="0">
+            <a:schemeClr val="dk1"/>
+          </a:fillRef>
+          <a:effectRef idx="1">
+            <a:schemeClr val="dk1"/>
+          </a:effectRef>
+          <a:fontRef idx="minor">
+            <a:schemeClr val="tx1"/>
+          </a:fontRef>
+        </p:style>
+      </p:cxnSp>
+      <p:cxnSp>
+        <p:nvCxnSpPr>
+          <p:cNvPr id="55" name="Straight Connector 54">
+            <a:extLst>
+              <a:ext uri="{FF2B5EF4-FFF2-40B4-BE49-F238E27FC236}">
+                <a16:creationId xmlns:a16="http://schemas.microsoft.com/office/drawing/2014/main" id="{CD775161-9286-F184-1652-815B496B63FB}"/>
+              </a:ext>
+            </a:extLst>
+          </p:cNvPr>
+          <p:cNvCxnSpPr>
+            <a:cxnSpLocks/>
+          </p:cNvCxnSpPr>
+          <p:nvPr/>
+        </p:nvCxnSpPr>
+        <p:spPr>
+          <a:xfrm>
+            <a:off x="4917822" y="3080269"/>
+            <a:ext cx="0" cy="586649"/>
+          </a:xfrm>
+          <a:prstGeom prst="line">
+            <a:avLst/>
+          </a:prstGeom>
+        </p:spPr>
+        <p:style>
+          <a:lnRef idx="2">
+            <a:schemeClr val="dk1"/>
+          </a:lnRef>
+          <a:fillRef idx="0">
+            <a:schemeClr val="dk1"/>
+          </a:fillRef>
+          <a:effectRef idx="1">
+            <a:schemeClr val="dk1"/>
+          </a:effectRef>
+          <a:fontRef idx="minor">
+            <a:schemeClr val="tx1"/>
+          </a:fontRef>
+        </p:style>
+      </p:cxnSp>
+      <p:cxnSp>
+        <p:nvCxnSpPr>
+          <p:cNvPr id="58" name="Straight Connector 57">
+            <a:extLst>
+              <a:ext uri="{FF2B5EF4-FFF2-40B4-BE49-F238E27FC236}">
+                <a16:creationId xmlns:a16="http://schemas.microsoft.com/office/drawing/2014/main" id="{3085C039-BF62-AC88-DA9B-1F5924689BC7}"/>
+              </a:ext>
+            </a:extLst>
+          </p:cNvPr>
+          <p:cNvCxnSpPr>
+            <a:cxnSpLocks/>
+          </p:cNvCxnSpPr>
+          <p:nvPr/>
+        </p:nvCxnSpPr>
+        <p:spPr>
+          <a:xfrm>
+            <a:off x="1296869" y="2479615"/>
+            <a:ext cx="6288675" cy="0"/>
+          </a:xfrm>
+          <a:prstGeom prst="line">
+            <a:avLst/>
+          </a:prstGeom>
+          <a:ln>
+            <a:solidFill>
+              <a:schemeClr val="bg1">
+                <a:lumMod val="75000"/>
+              </a:schemeClr>
+            </a:solidFill>
+            <a:prstDash val="sysDash"/>
+          </a:ln>
+        </p:spPr>
+        <p:style>
+          <a:lnRef idx="2">
+            <a:schemeClr val="accent1"/>
+          </a:lnRef>
+          <a:fillRef idx="0">
+            <a:schemeClr val="accent1"/>
+          </a:fillRef>
+          <a:effectRef idx="1">
+            <a:schemeClr val="accent1"/>
+          </a:effectRef>
+          <a:fontRef idx="minor">
+            <a:schemeClr val="tx1"/>
+          </a:fontRef>
+        </p:style>
+      </p:cxnSp>
+      <p:cxnSp>
+        <p:nvCxnSpPr>
+          <p:cNvPr id="59" name="Straight Connector 58">
+            <a:extLst>
+              <a:ext uri="{FF2B5EF4-FFF2-40B4-BE49-F238E27FC236}">
+                <a16:creationId xmlns:a16="http://schemas.microsoft.com/office/drawing/2014/main" id="{C0989FF8-E07A-0AD9-5A87-6EF44B5FC886}"/>
+              </a:ext>
+            </a:extLst>
+          </p:cNvPr>
+          <p:cNvCxnSpPr>
+            <a:cxnSpLocks/>
+          </p:cNvCxnSpPr>
+          <p:nvPr/>
+        </p:nvCxnSpPr>
+        <p:spPr>
+          <a:xfrm>
+            <a:off x="1307592" y="4033432"/>
+            <a:ext cx="6341559" cy="0"/>
+          </a:xfrm>
+          <a:prstGeom prst="line">
+            <a:avLst/>
+          </a:prstGeom>
+          <a:ln>
+            <a:solidFill>
+              <a:schemeClr val="bg1">
+                <a:lumMod val="75000"/>
+              </a:schemeClr>
+            </a:solidFill>
+            <a:prstDash val="sysDash"/>
+          </a:ln>
+        </p:spPr>
+        <p:style>
+          <a:lnRef idx="2">
+            <a:schemeClr val="accent1"/>
+          </a:lnRef>
+          <a:fillRef idx="0">
+            <a:schemeClr val="accent1"/>
+          </a:fillRef>
+          <a:effectRef idx="1">
+            <a:schemeClr val="accent1"/>
+          </a:effectRef>
+          <a:fontRef idx="minor">
+            <a:schemeClr val="tx1"/>
+          </a:fontRef>
+        </p:style>
+      </p:cxnSp>
+      <p:cxnSp>
+        <p:nvCxnSpPr>
+          <p:cNvPr id="60" name="Straight Connector 59">
+            <a:extLst>
+              <a:ext uri="{FF2B5EF4-FFF2-40B4-BE49-F238E27FC236}">
+                <a16:creationId xmlns:a16="http://schemas.microsoft.com/office/drawing/2014/main" id="{CBDC7D17-8BF7-5AC9-1F94-9B156171A007}"/>
+              </a:ext>
+            </a:extLst>
+          </p:cNvPr>
+          <p:cNvCxnSpPr>
+            <a:cxnSpLocks/>
+          </p:cNvCxnSpPr>
+          <p:nvPr/>
+        </p:nvCxnSpPr>
+        <p:spPr>
+          <a:xfrm>
+            <a:off x="1307592" y="2479615"/>
+            <a:ext cx="0" cy="1553817"/>
+          </a:xfrm>
+          <a:prstGeom prst="line">
+            <a:avLst/>
+          </a:prstGeom>
+          <a:ln>
+            <a:solidFill>
+              <a:schemeClr val="bg1">
+                <a:lumMod val="75000"/>
+              </a:schemeClr>
+            </a:solidFill>
+            <a:prstDash val="sysDash"/>
+          </a:ln>
+        </p:spPr>
+        <p:style>
+          <a:lnRef idx="2">
+            <a:schemeClr val="accent1"/>
+          </a:lnRef>
+          <a:fillRef idx="0">
+            <a:schemeClr val="accent1"/>
+          </a:fillRef>
+          <a:effectRef idx="1">
+            <a:schemeClr val="accent1"/>
+          </a:effectRef>
+          <a:fontRef idx="minor">
+            <a:schemeClr val="tx1"/>
+          </a:fontRef>
+        </p:style>
+      </p:cxnSp>
+      <p:cxnSp>
+        <p:nvCxnSpPr>
+          <p:cNvPr id="61" name="Straight Connector 60">
+            <a:extLst>
+              <a:ext uri="{FF2B5EF4-FFF2-40B4-BE49-F238E27FC236}">
+                <a16:creationId xmlns:a16="http://schemas.microsoft.com/office/drawing/2014/main" id="{8A5E6532-1F4F-5168-8EE6-802C2A41D73E}"/>
+              </a:ext>
+            </a:extLst>
+          </p:cNvPr>
+          <p:cNvCxnSpPr>
+            <a:cxnSpLocks/>
+          </p:cNvCxnSpPr>
+          <p:nvPr/>
+        </p:nvCxnSpPr>
+        <p:spPr>
+          <a:xfrm>
+            <a:off x="7584376" y="2504257"/>
+            <a:ext cx="1168" cy="1529175"/>
+          </a:xfrm>
+          <a:prstGeom prst="line">
+            <a:avLst/>
+          </a:prstGeom>
+          <a:ln>
+            <a:solidFill>
+              <a:schemeClr val="bg1">
+                <a:lumMod val="75000"/>
+              </a:schemeClr>
+            </a:solidFill>
+            <a:prstDash val="sysDash"/>
+          </a:ln>
+        </p:spPr>
+        <p:style>
+          <a:lnRef idx="2">
+            <a:schemeClr val="accent1"/>
+          </a:lnRef>
+          <a:fillRef idx="0">
+            <a:schemeClr val="accent1"/>
+          </a:fillRef>
+          <a:effectRef idx="1">
+            <a:schemeClr val="accent1"/>
+          </a:effectRef>
+          <a:fontRef idx="minor">
+            <a:schemeClr val="tx1"/>
+          </a:fontRef>
+        </p:style>
+      </p:cxnSp>
+      <p:cxnSp>
+        <p:nvCxnSpPr>
+          <p:cNvPr id="62" name="Straight Connector 61">
+            <a:extLst>
+              <a:ext uri="{FF2B5EF4-FFF2-40B4-BE49-F238E27FC236}">
+                <a16:creationId xmlns:a16="http://schemas.microsoft.com/office/drawing/2014/main" id="{E161A3B3-9F49-77D8-B063-97C0A1E3DB1C}"/>
+              </a:ext>
+            </a:extLst>
+          </p:cNvPr>
+          <p:cNvCxnSpPr>
+            <a:cxnSpLocks/>
+          </p:cNvCxnSpPr>
+          <p:nvPr/>
+        </p:nvCxnSpPr>
+        <p:spPr>
+          <a:xfrm>
+            <a:off x="2576205" y="2504257"/>
+            <a:ext cx="21870" cy="1566123"/>
+          </a:xfrm>
+          <a:prstGeom prst="line">
+            <a:avLst/>
+          </a:prstGeom>
+          <a:ln>
+            <a:solidFill>
+              <a:schemeClr val="bg1">
+                <a:lumMod val="75000"/>
+              </a:schemeClr>
+            </a:solidFill>
+            <a:prstDash val="sysDash"/>
+          </a:ln>
+        </p:spPr>
+        <p:style>
+          <a:lnRef idx="2">
+            <a:schemeClr val="accent1"/>
+          </a:lnRef>
+          <a:fillRef idx="0">
+            <a:schemeClr val="accent1"/>
+          </a:fillRef>
+          <a:effectRef idx="1">
+            <a:schemeClr val="accent1"/>
+          </a:effectRef>
+          <a:fontRef idx="minor">
+            <a:schemeClr val="tx1"/>
+          </a:fontRef>
+        </p:style>
+      </p:cxnSp>
+      <p:sp>
+        <p:nvSpPr>
+          <p:cNvPr id="73" name="TextBox 72">
+            <a:extLst>
+              <a:ext uri="{FF2B5EF4-FFF2-40B4-BE49-F238E27FC236}">
+                <a16:creationId xmlns:a16="http://schemas.microsoft.com/office/drawing/2014/main" id="{2D4E8159-7786-2F58-538C-278EBB5D33BE}"/>
+              </a:ext>
+            </a:extLst>
+          </p:cNvPr>
+          <p:cNvSpPr txBox="1"/>
+          <p:nvPr/>
+        </p:nvSpPr>
+        <p:spPr>
+          <a:xfrm>
+            <a:off x="1535848" y="3023052"/>
+            <a:ext cx="728433" cy="307777"/>
+          </a:xfrm>
+          <a:prstGeom prst="rect">
+            <a:avLst/>
+          </a:prstGeom>
+          <a:noFill/>
+        </p:spPr>
+        <p:txBody>
+          <a:bodyPr wrap="square" rtlCol="0">
+            <a:spAutoFit/>
+          </a:bodyPr>
+          <a:lstStyle/>
+          <a:p>
+            <a:r>
+              <a:rPr lang="en-US" sz="1400" b="1" dirty="0"/>
+              <a:t>Rung0</a:t>
+            </a:r>
+            <a:endParaRPr lang="en-SG" sz="1400" b="1" dirty="0"/>
+          </a:p>
+        </p:txBody>
+      </p:sp>
+    </p:spTree>
+    <p:extLst>
+      <p:ext uri="{BB962C8B-B14F-4D97-AF65-F5344CB8AC3E}">
+        <p14:creationId xmlns:p14="http://schemas.microsoft.com/office/powerpoint/2010/main" val="637755307"/>
       </p:ext>
     </p:extLst>
   </p:cSld>

</xml_diff>

<commit_message>
update the hmi integration part.
</commit_message>
<xml_diff>
--- a/OT_System_Attack_Case_Study/Power_CircuitBreaker/img/designDoc.pptx
+++ b/OT_System_Attack_Case_Study/Power_CircuitBreaker/img/designDoc.pptx
@@ -9,6 +9,8 @@
     <p:sldId id="257" r:id="rId3"/>
     <p:sldId id="259" r:id="rId4"/>
     <p:sldId id="258" r:id="rId5"/>
+    <p:sldId id="260" r:id="rId6"/>
+    <p:sldId id="261" r:id="rId7"/>
   </p:sldIdLst>
   <p:sldSz cx="12192000" cy="6858000"/>
   <p:notesSz cx="6858000" cy="9144000"/>
@@ -9268,6 +9270,1507 @@
 </p:sld>
 </file>
 
+<file path=ppt/slides/slide5.xml><?xml version="1.0" encoding="utf-8"?>
+<p:sld xmlns:a="http://schemas.openxmlformats.org/drawingml/2006/main" xmlns:r="http://schemas.openxmlformats.org/officeDocument/2006/relationships" xmlns:p="http://schemas.openxmlformats.org/presentationml/2006/main">
+  <p:cSld>
+    <p:spTree>
+      <p:nvGrpSpPr>
+        <p:cNvPr id="1" name=""/>
+        <p:cNvGrpSpPr/>
+        <p:nvPr/>
+      </p:nvGrpSpPr>
+      <p:grpSpPr>
+        <a:xfrm>
+          <a:off x="0" y="0"/>
+          <a:ext cx="0" cy="0"/>
+          <a:chOff x="0" y="0"/>
+          <a:chExt cx="0" cy="0"/>
+        </a:xfrm>
+      </p:grpSpPr>
+      <p:pic>
+        <p:nvPicPr>
+          <p:cNvPr id="5" name="Picture 4">
+            <a:extLst>
+              <a:ext uri="{FF2B5EF4-FFF2-40B4-BE49-F238E27FC236}">
+                <a16:creationId xmlns:a16="http://schemas.microsoft.com/office/drawing/2014/main" id="{62214919-F59A-8C08-7431-1153237C1765}"/>
+              </a:ext>
+            </a:extLst>
+          </p:cNvPr>
+          <p:cNvPicPr>
+            <a:picLocks noChangeAspect="1"/>
+          </p:cNvPicPr>
+          <p:nvPr/>
+        </p:nvPicPr>
+        <p:blipFill>
+          <a:blip r:embed="rId2"/>
+          <a:stretch>
+            <a:fillRect/>
+          </a:stretch>
+        </p:blipFill>
+        <p:spPr>
+          <a:xfrm>
+            <a:off x="4103403" y="490825"/>
+            <a:ext cx="5495238" cy="5104762"/>
+          </a:xfrm>
+          <a:prstGeom prst="rect">
+            <a:avLst/>
+          </a:prstGeom>
+        </p:spPr>
+      </p:pic>
+      <p:pic>
+        <p:nvPicPr>
+          <p:cNvPr id="6" name="Picture 5" descr="A close-up of a device&#10;&#10;Description automatically generated">
+            <a:extLst>
+              <a:ext uri="{FF2B5EF4-FFF2-40B4-BE49-F238E27FC236}">
+                <a16:creationId xmlns:a16="http://schemas.microsoft.com/office/drawing/2014/main" id="{D6B03FCA-137A-0512-D921-F69A3487DB30}"/>
+              </a:ext>
+            </a:extLst>
+          </p:cNvPr>
+          <p:cNvPicPr>
+            <a:picLocks noChangeAspect="1"/>
+          </p:cNvPicPr>
+          <p:nvPr/>
+        </p:nvPicPr>
+        <p:blipFill>
+          <a:blip r:embed="rId3">
+            <a:extLst>
+              <a:ext uri="{28A0092B-C50C-407E-A947-70E740481C1C}">
+                <a14:useLocalDpi xmlns:a14="http://schemas.microsoft.com/office/drawing/2010/main" val="0"/>
+              </a:ext>
+            </a:extLst>
+          </a:blip>
+          <a:stretch>
+            <a:fillRect/>
+          </a:stretch>
+        </p:blipFill>
+        <p:spPr>
+          <a:xfrm>
+            <a:off x="1293542" y="4100209"/>
+            <a:ext cx="1495378" cy="1495378"/>
+          </a:xfrm>
+          <a:prstGeom prst="rect">
+            <a:avLst/>
+          </a:prstGeom>
+        </p:spPr>
+      </p:pic>
+      <p:cxnSp>
+        <p:nvCxnSpPr>
+          <p:cNvPr id="10" name="Connector: Elbow 9">
+            <a:extLst>
+              <a:ext uri="{FF2B5EF4-FFF2-40B4-BE49-F238E27FC236}">
+                <a16:creationId xmlns:a16="http://schemas.microsoft.com/office/drawing/2014/main" id="{0F77505D-0B0D-388F-2951-E656D46BA80B}"/>
+              </a:ext>
+            </a:extLst>
+          </p:cNvPr>
+          <p:cNvCxnSpPr>
+            <a:cxnSpLocks/>
+          </p:cNvCxnSpPr>
+          <p:nvPr/>
+        </p:nvCxnSpPr>
+        <p:spPr>
+          <a:xfrm>
+            <a:off x="2547991" y="4417888"/>
+            <a:ext cx="1859622" cy="430010"/>
+          </a:xfrm>
+          <a:prstGeom prst="bentConnector3">
+            <a:avLst/>
+          </a:prstGeom>
+          <a:ln>
+            <a:solidFill>
+              <a:srgbClr val="FF0000"/>
+            </a:solidFill>
+            <a:prstDash val="sysDash"/>
+          </a:ln>
+        </p:spPr>
+        <p:style>
+          <a:lnRef idx="2">
+            <a:schemeClr val="accent1"/>
+          </a:lnRef>
+          <a:fillRef idx="0">
+            <a:schemeClr val="accent1"/>
+          </a:fillRef>
+          <a:effectRef idx="1">
+            <a:schemeClr val="accent1"/>
+          </a:effectRef>
+          <a:fontRef idx="minor">
+            <a:schemeClr val="tx1"/>
+          </a:fontRef>
+        </p:style>
+      </p:cxnSp>
+      <p:cxnSp>
+        <p:nvCxnSpPr>
+          <p:cNvPr id="15" name="Straight Connector 14">
+            <a:extLst>
+              <a:ext uri="{FF2B5EF4-FFF2-40B4-BE49-F238E27FC236}">
+                <a16:creationId xmlns:a16="http://schemas.microsoft.com/office/drawing/2014/main" id="{1E44195B-98A3-39A3-B8FC-3940F3FD4953}"/>
+              </a:ext>
+            </a:extLst>
+          </p:cNvPr>
+          <p:cNvCxnSpPr>
+            <a:cxnSpLocks/>
+          </p:cNvCxnSpPr>
+          <p:nvPr/>
+        </p:nvCxnSpPr>
+        <p:spPr>
+          <a:xfrm>
+            <a:off x="2424701" y="5465852"/>
+            <a:ext cx="0" cy="410966"/>
+          </a:xfrm>
+          <a:prstGeom prst="line">
+            <a:avLst/>
+          </a:prstGeom>
+          <a:ln>
+            <a:solidFill>
+              <a:srgbClr val="C00000"/>
+            </a:solidFill>
+            <a:prstDash val="sysDash"/>
+          </a:ln>
+        </p:spPr>
+        <p:style>
+          <a:lnRef idx="2">
+            <a:schemeClr val="accent1"/>
+          </a:lnRef>
+          <a:fillRef idx="0">
+            <a:schemeClr val="accent1"/>
+          </a:fillRef>
+          <a:effectRef idx="1">
+            <a:schemeClr val="accent1"/>
+          </a:effectRef>
+          <a:fontRef idx="minor">
+            <a:schemeClr val="tx1"/>
+          </a:fontRef>
+        </p:style>
+      </p:cxnSp>
+      <p:cxnSp>
+        <p:nvCxnSpPr>
+          <p:cNvPr id="17" name="Straight Connector 16">
+            <a:extLst>
+              <a:ext uri="{FF2B5EF4-FFF2-40B4-BE49-F238E27FC236}">
+                <a16:creationId xmlns:a16="http://schemas.microsoft.com/office/drawing/2014/main" id="{B27D317B-857E-5960-1F37-E5033D0457CB}"/>
+              </a:ext>
+            </a:extLst>
+          </p:cNvPr>
+          <p:cNvCxnSpPr>
+            <a:cxnSpLocks/>
+          </p:cNvCxnSpPr>
+          <p:nvPr/>
+        </p:nvCxnSpPr>
+        <p:spPr>
+          <a:xfrm>
+            <a:off x="2424701" y="5876818"/>
+            <a:ext cx="4107950" cy="0"/>
+          </a:xfrm>
+          <a:prstGeom prst="line">
+            <a:avLst/>
+          </a:prstGeom>
+          <a:ln>
+            <a:solidFill>
+              <a:srgbClr val="C00000"/>
+            </a:solidFill>
+            <a:prstDash val="sysDash"/>
+          </a:ln>
+        </p:spPr>
+        <p:style>
+          <a:lnRef idx="2">
+            <a:schemeClr val="accent1"/>
+          </a:lnRef>
+          <a:fillRef idx="0">
+            <a:schemeClr val="accent1"/>
+          </a:fillRef>
+          <a:effectRef idx="1">
+            <a:schemeClr val="accent1"/>
+          </a:effectRef>
+          <a:fontRef idx="minor">
+            <a:schemeClr val="tx1"/>
+          </a:fontRef>
+        </p:style>
+      </p:cxnSp>
+      <p:cxnSp>
+        <p:nvCxnSpPr>
+          <p:cNvPr id="20" name="Straight Connector 19">
+            <a:extLst>
+              <a:ext uri="{FF2B5EF4-FFF2-40B4-BE49-F238E27FC236}">
+                <a16:creationId xmlns:a16="http://schemas.microsoft.com/office/drawing/2014/main" id="{29695216-F89D-97EB-D7EC-4F485C26601C}"/>
+              </a:ext>
+            </a:extLst>
+          </p:cNvPr>
+          <p:cNvCxnSpPr>
+            <a:cxnSpLocks/>
+          </p:cNvCxnSpPr>
+          <p:nvPr/>
+        </p:nvCxnSpPr>
+        <p:spPr>
+          <a:xfrm>
+            <a:off x="6532651" y="4847898"/>
+            <a:ext cx="0" cy="1028920"/>
+          </a:xfrm>
+          <a:prstGeom prst="line">
+            <a:avLst/>
+          </a:prstGeom>
+          <a:ln>
+            <a:solidFill>
+              <a:srgbClr val="C00000"/>
+            </a:solidFill>
+            <a:prstDash val="sysDash"/>
+          </a:ln>
+        </p:spPr>
+        <p:style>
+          <a:lnRef idx="2">
+            <a:schemeClr val="accent1"/>
+          </a:lnRef>
+          <a:fillRef idx="0">
+            <a:schemeClr val="accent1"/>
+          </a:fillRef>
+          <a:effectRef idx="1">
+            <a:schemeClr val="accent1"/>
+          </a:effectRef>
+          <a:fontRef idx="minor">
+            <a:schemeClr val="tx1"/>
+          </a:fontRef>
+        </p:style>
+      </p:cxnSp>
+      <p:cxnSp>
+        <p:nvCxnSpPr>
+          <p:cNvPr id="24" name="Connector: Elbow 23">
+            <a:extLst>
+              <a:ext uri="{FF2B5EF4-FFF2-40B4-BE49-F238E27FC236}">
+                <a16:creationId xmlns:a16="http://schemas.microsoft.com/office/drawing/2014/main" id="{8699D966-9052-112E-BBE6-5F0520598519}"/>
+              </a:ext>
+            </a:extLst>
+          </p:cNvPr>
+          <p:cNvCxnSpPr>
+            <a:cxnSpLocks/>
+          </p:cNvCxnSpPr>
+          <p:nvPr/>
+        </p:nvCxnSpPr>
+        <p:spPr>
+          <a:xfrm rot="5400000" flipH="1" flipV="1">
+            <a:off x="5070299" y="3046288"/>
+            <a:ext cx="1715786" cy="1684962"/>
+          </a:xfrm>
+          <a:prstGeom prst="bentConnector3">
+            <a:avLst>
+              <a:gd name="adj1" fmla="val 88323"/>
+            </a:avLst>
+          </a:prstGeom>
+          <a:ln>
+            <a:solidFill>
+              <a:srgbClr val="FF0000"/>
+            </a:solidFill>
+            <a:prstDash val="sysDash"/>
+            <a:tailEnd type="triangle"/>
+          </a:ln>
+        </p:spPr>
+        <p:style>
+          <a:lnRef idx="2">
+            <a:schemeClr val="accent1"/>
+          </a:lnRef>
+          <a:fillRef idx="0">
+            <a:schemeClr val="accent1"/>
+          </a:fillRef>
+          <a:effectRef idx="1">
+            <a:schemeClr val="accent1"/>
+          </a:effectRef>
+          <a:fontRef idx="minor">
+            <a:schemeClr val="tx1"/>
+          </a:fontRef>
+        </p:style>
+      </p:cxnSp>
+      <p:pic>
+        <p:nvPicPr>
+          <p:cNvPr id="31" name="Picture 30">
+            <a:extLst>
+              <a:ext uri="{FF2B5EF4-FFF2-40B4-BE49-F238E27FC236}">
+                <a16:creationId xmlns:a16="http://schemas.microsoft.com/office/drawing/2014/main" id="{2CDFF3E7-408A-F356-5991-D844ADEBB963}"/>
+              </a:ext>
+            </a:extLst>
+          </p:cNvPr>
+          <p:cNvPicPr>
+            <a:picLocks noChangeAspect="1"/>
+          </p:cNvPicPr>
+          <p:nvPr/>
+        </p:nvPicPr>
+        <p:blipFill>
+          <a:blip r:embed="rId4"/>
+          <a:stretch>
+            <a:fillRect/>
+          </a:stretch>
+        </p:blipFill>
+        <p:spPr>
+          <a:xfrm>
+            <a:off x="1275435" y="1987461"/>
+            <a:ext cx="1804042" cy="1365059"/>
+          </a:xfrm>
+          <a:prstGeom prst="rect">
+            <a:avLst/>
+          </a:prstGeom>
+          <a:ln w="19050">
+            <a:solidFill>
+              <a:schemeClr val="tx1"/>
+            </a:solidFill>
+          </a:ln>
+        </p:spPr>
+      </p:pic>
+      <p:sp>
+        <p:nvSpPr>
+          <p:cNvPr id="32" name="TextBox 31">
+            <a:extLst>
+              <a:ext uri="{FF2B5EF4-FFF2-40B4-BE49-F238E27FC236}">
+                <a16:creationId xmlns:a16="http://schemas.microsoft.com/office/drawing/2014/main" id="{AF47CB3A-2F1A-C2E4-E852-10DCE97A3C9D}"/>
+              </a:ext>
+            </a:extLst>
+          </p:cNvPr>
+          <p:cNvSpPr txBox="1"/>
+          <p:nvPr/>
+        </p:nvSpPr>
+        <p:spPr>
+          <a:xfrm>
+            <a:off x="1168820" y="1576571"/>
+            <a:ext cx="2166408" cy="369332"/>
+          </a:xfrm>
+          <a:prstGeom prst="rect">
+            <a:avLst/>
+          </a:prstGeom>
+          <a:noFill/>
+        </p:spPr>
+        <p:txBody>
+          <a:bodyPr wrap="square" rtlCol="0">
+            <a:spAutoFit/>
+          </a:bodyPr>
+          <a:lstStyle/>
+          <a:p>
+            <a:r>
+              <a:rPr lang="en-US" b="1" dirty="0"/>
+              <a:t>Hardware device</a:t>
+            </a:r>
+            <a:endParaRPr lang="en-SG" b="1" dirty="0"/>
+          </a:p>
+        </p:txBody>
+      </p:sp>
+      <p:sp>
+        <p:nvSpPr>
+          <p:cNvPr id="34" name="TextBox 33">
+            <a:extLst>
+              <a:ext uri="{FF2B5EF4-FFF2-40B4-BE49-F238E27FC236}">
+                <a16:creationId xmlns:a16="http://schemas.microsoft.com/office/drawing/2014/main" id="{9C5A1A05-D95F-0BDF-2329-079CAC12140E}"/>
+              </a:ext>
+            </a:extLst>
+          </p:cNvPr>
+          <p:cNvSpPr txBox="1"/>
+          <p:nvPr/>
+        </p:nvSpPr>
+        <p:spPr>
+          <a:xfrm>
+            <a:off x="1956048" y="3413620"/>
+            <a:ext cx="1123429" cy="523220"/>
+          </a:xfrm>
+          <a:prstGeom prst="rect">
+            <a:avLst/>
+          </a:prstGeom>
+          <a:noFill/>
+        </p:spPr>
+        <p:txBody>
+          <a:bodyPr wrap="square" rtlCol="0">
+            <a:spAutoFit/>
+          </a:bodyPr>
+          <a:lstStyle/>
+          <a:p>
+            <a:r>
+              <a:rPr lang="en-US" sz="1400" b="1" dirty="0"/>
+              <a:t>Electrical signal </a:t>
+            </a:r>
+            <a:endParaRPr lang="en-SG" sz="1400" b="1" dirty="0"/>
+          </a:p>
+        </p:txBody>
+      </p:sp>
+      <p:sp>
+        <p:nvSpPr>
+          <p:cNvPr id="35" name="Arrow: Up-Down 34">
+            <a:extLst>
+              <a:ext uri="{FF2B5EF4-FFF2-40B4-BE49-F238E27FC236}">
+                <a16:creationId xmlns:a16="http://schemas.microsoft.com/office/drawing/2014/main" id="{86C3B769-4465-A940-A9BF-CD26A1437AAD}"/>
+              </a:ext>
+            </a:extLst>
+          </p:cNvPr>
+          <p:cNvSpPr/>
+          <p:nvPr/>
+        </p:nvSpPr>
+        <p:spPr>
+          <a:xfrm>
+            <a:off x="1787703" y="3429000"/>
+            <a:ext cx="184935" cy="671209"/>
+          </a:xfrm>
+          <a:prstGeom prst="upDownArrow">
+            <a:avLst/>
+          </a:prstGeom>
+        </p:spPr>
+        <p:style>
+          <a:lnRef idx="2">
+            <a:schemeClr val="accent1">
+              <a:shade val="15000"/>
+            </a:schemeClr>
+          </a:lnRef>
+          <a:fillRef idx="1">
+            <a:schemeClr val="accent1"/>
+          </a:fillRef>
+          <a:effectRef idx="0">
+            <a:schemeClr val="accent1"/>
+          </a:effectRef>
+          <a:fontRef idx="minor">
+            <a:schemeClr val="lt1"/>
+          </a:fontRef>
+        </p:style>
+        <p:txBody>
+          <a:bodyPr rtlCol="0" anchor="ctr"/>
+          <a:lstStyle/>
+          <a:p>
+            <a:pPr algn="ctr"/>
+            <a:endParaRPr lang="en-SG"/>
+          </a:p>
+        </p:txBody>
+      </p:sp>
+      <p:sp>
+        <p:nvSpPr>
+          <p:cNvPr id="36" name="TextBox 35">
+            <a:extLst>
+              <a:ext uri="{FF2B5EF4-FFF2-40B4-BE49-F238E27FC236}">
+                <a16:creationId xmlns:a16="http://schemas.microsoft.com/office/drawing/2014/main" id="{8E49076E-904C-5C19-F39A-991DA835F53B}"/>
+              </a:ext>
+            </a:extLst>
+          </p:cNvPr>
+          <p:cNvSpPr txBox="1"/>
+          <p:nvPr/>
+        </p:nvSpPr>
+        <p:spPr>
+          <a:xfrm>
+            <a:off x="2677103" y="3804968"/>
+            <a:ext cx="1316250" cy="646331"/>
+          </a:xfrm>
+          <a:prstGeom prst="rect">
+            <a:avLst/>
+          </a:prstGeom>
+          <a:noFill/>
+        </p:spPr>
+        <p:txBody>
+          <a:bodyPr wrap="square" rtlCol="0">
+            <a:spAutoFit/>
+          </a:bodyPr>
+          <a:lstStyle/>
+          <a:p>
+            <a:r>
+              <a:rPr lang="en-US" sz="1200" b="1" dirty="0">
+                <a:solidFill>
+                  <a:srgbClr val="C00000"/>
+                </a:solidFill>
+              </a:rPr>
+              <a:t>Fetch sensor data from PLC holding register </a:t>
+            </a:r>
+            <a:endParaRPr lang="en-SG" sz="1200" b="1" dirty="0">
+              <a:solidFill>
+                <a:srgbClr val="C00000"/>
+              </a:solidFill>
+            </a:endParaRPr>
+          </a:p>
+        </p:txBody>
+      </p:sp>
+      <p:sp>
+        <p:nvSpPr>
+          <p:cNvPr id="37" name="TextBox 36">
+            <a:extLst>
+              <a:ext uri="{FF2B5EF4-FFF2-40B4-BE49-F238E27FC236}">
+                <a16:creationId xmlns:a16="http://schemas.microsoft.com/office/drawing/2014/main" id="{39D1310B-4DA6-C3F5-D7CB-6E5F9A5FEEA5}"/>
+              </a:ext>
+            </a:extLst>
+          </p:cNvPr>
+          <p:cNvSpPr txBox="1"/>
+          <p:nvPr/>
+        </p:nvSpPr>
+        <p:spPr>
+          <a:xfrm>
+            <a:off x="2497135" y="5586686"/>
+            <a:ext cx="3732484" cy="276999"/>
+          </a:xfrm>
+          <a:prstGeom prst="rect">
+            <a:avLst/>
+          </a:prstGeom>
+          <a:noFill/>
+        </p:spPr>
+        <p:txBody>
+          <a:bodyPr wrap="square" rtlCol="0">
+            <a:spAutoFit/>
+          </a:bodyPr>
+          <a:lstStyle/>
+          <a:p>
+            <a:r>
+              <a:rPr lang="en-US" sz="1200" b="1" dirty="0">
+                <a:solidFill>
+                  <a:srgbClr val="C00000"/>
+                </a:solidFill>
+              </a:rPr>
+              <a:t>Set motor state by change the state of the coils </a:t>
+            </a:r>
+            <a:endParaRPr lang="en-SG" sz="1200" b="1" dirty="0">
+              <a:solidFill>
+                <a:srgbClr val="C00000"/>
+              </a:solidFill>
+            </a:endParaRPr>
+          </a:p>
+        </p:txBody>
+      </p:sp>
+      <p:sp>
+        <p:nvSpPr>
+          <p:cNvPr id="38" name="TextBox 37">
+            <a:extLst>
+              <a:ext uri="{FF2B5EF4-FFF2-40B4-BE49-F238E27FC236}">
+                <a16:creationId xmlns:a16="http://schemas.microsoft.com/office/drawing/2014/main" id="{CA4E8AA7-460F-0362-817D-602F6CF88AE6}"/>
+              </a:ext>
+            </a:extLst>
+          </p:cNvPr>
+          <p:cNvSpPr txBox="1"/>
+          <p:nvPr/>
+        </p:nvSpPr>
+        <p:spPr>
+          <a:xfrm>
+            <a:off x="4284324" y="2912236"/>
+            <a:ext cx="2486349" cy="276999"/>
+          </a:xfrm>
+          <a:prstGeom prst="rect">
+            <a:avLst/>
+          </a:prstGeom>
+          <a:noFill/>
+        </p:spPr>
+        <p:txBody>
+          <a:bodyPr wrap="square" rtlCol="0">
+            <a:spAutoFit/>
+          </a:bodyPr>
+          <a:lstStyle/>
+          <a:p>
+            <a:r>
+              <a:rPr lang="en-US" sz="1200" b="1" dirty="0">
+                <a:solidFill>
+                  <a:srgbClr val="FF0000"/>
+                </a:solidFill>
+              </a:rPr>
+              <a:t>Show breaker state on the HMI UI</a:t>
+            </a:r>
+            <a:endParaRPr lang="en-SG" sz="1200" b="1" dirty="0">
+              <a:solidFill>
+                <a:srgbClr val="FF0000"/>
+              </a:solidFill>
+            </a:endParaRPr>
+          </a:p>
+        </p:txBody>
+      </p:sp>
+      <p:cxnSp>
+        <p:nvCxnSpPr>
+          <p:cNvPr id="40" name="Straight Arrow Connector 39">
+            <a:extLst>
+              <a:ext uri="{FF2B5EF4-FFF2-40B4-BE49-F238E27FC236}">
+                <a16:creationId xmlns:a16="http://schemas.microsoft.com/office/drawing/2014/main" id="{E56FCA43-3209-B3A5-62DC-BC7A32FC6BC6}"/>
+              </a:ext>
+            </a:extLst>
+          </p:cNvPr>
+          <p:cNvCxnSpPr>
+            <a:cxnSpLocks/>
+          </p:cNvCxnSpPr>
+          <p:nvPr/>
+        </p:nvCxnSpPr>
+        <p:spPr>
+          <a:xfrm flipV="1">
+            <a:off x="7058346" y="5586686"/>
+            <a:ext cx="0" cy="272768"/>
+          </a:xfrm>
+          <a:prstGeom prst="straightConnector1">
+            <a:avLst/>
+          </a:prstGeom>
+          <a:ln>
+            <a:tailEnd type="triangle"/>
+          </a:ln>
+        </p:spPr>
+        <p:style>
+          <a:lnRef idx="2">
+            <a:schemeClr val="accent1"/>
+          </a:lnRef>
+          <a:fillRef idx="0">
+            <a:schemeClr val="accent1"/>
+          </a:fillRef>
+          <a:effectRef idx="1">
+            <a:schemeClr val="accent1"/>
+          </a:effectRef>
+          <a:fontRef idx="minor">
+            <a:schemeClr val="tx1"/>
+          </a:fontRef>
+        </p:style>
+      </p:cxnSp>
+      <p:cxnSp>
+        <p:nvCxnSpPr>
+          <p:cNvPr id="42" name="Straight Connector 41">
+            <a:extLst>
+              <a:ext uri="{FF2B5EF4-FFF2-40B4-BE49-F238E27FC236}">
+                <a16:creationId xmlns:a16="http://schemas.microsoft.com/office/drawing/2014/main" id="{566F8D23-1B80-52CA-3922-FDE1EF235C34}"/>
+              </a:ext>
+            </a:extLst>
+          </p:cNvPr>
+          <p:cNvCxnSpPr>
+            <a:cxnSpLocks/>
+          </p:cNvCxnSpPr>
+          <p:nvPr/>
+        </p:nvCxnSpPr>
+        <p:spPr>
+          <a:xfrm flipV="1">
+            <a:off x="7058346" y="5859454"/>
+            <a:ext cx="2778271" cy="4231"/>
+          </a:xfrm>
+          <a:prstGeom prst="line">
+            <a:avLst/>
+          </a:prstGeom>
+        </p:spPr>
+        <p:style>
+          <a:lnRef idx="2">
+            <a:schemeClr val="accent1"/>
+          </a:lnRef>
+          <a:fillRef idx="0">
+            <a:schemeClr val="accent1"/>
+          </a:fillRef>
+          <a:effectRef idx="1">
+            <a:schemeClr val="accent1"/>
+          </a:effectRef>
+          <a:fontRef idx="minor">
+            <a:schemeClr val="tx1"/>
+          </a:fontRef>
+        </p:style>
+      </p:cxnSp>
+      <p:sp>
+        <p:nvSpPr>
+          <p:cNvPr id="43" name="TextBox 42">
+            <a:extLst>
+              <a:ext uri="{FF2B5EF4-FFF2-40B4-BE49-F238E27FC236}">
+                <a16:creationId xmlns:a16="http://schemas.microsoft.com/office/drawing/2014/main" id="{DDD67190-9E8B-9446-283E-3229E7EC13F7}"/>
+              </a:ext>
+            </a:extLst>
+          </p:cNvPr>
+          <p:cNvSpPr txBox="1"/>
+          <p:nvPr/>
+        </p:nvSpPr>
+        <p:spPr>
+          <a:xfrm>
+            <a:off x="9836617" y="5409725"/>
+            <a:ext cx="1607965" cy="523220"/>
+          </a:xfrm>
+          <a:prstGeom prst="rect">
+            <a:avLst/>
+          </a:prstGeom>
+          <a:noFill/>
+        </p:spPr>
+        <p:txBody>
+          <a:bodyPr wrap="square" rtlCol="0">
+            <a:spAutoFit/>
+          </a:bodyPr>
+          <a:lstStyle/>
+          <a:p>
+            <a:r>
+              <a:rPr lang="en-US" sz="1400" b="1" dirty="0"/>
+              <a:t>PLC Contacts </a:t>
+            </a:r>
+          </a:p>
+          <a:p>
+            <a:r>
+              <a:rPr lang="en-US" sz="1400" b="1" dirty="0"/>
+              <a:t>Pin Index</a:t>
+            </a:r>
+            <a:endParaRPr lang="en-SG" sz="1400" b="1" dirty="0"/>
+          </a:p>
+        </p:txBody>
+      </p:sp>
+      <p:cxnSp>
+        <p:nvCxnSpPr>
+          <p:cNvPr id="47" name="Connector: Elbow 46">
+            <a:extLst>
+              <a:ext uri="{FF2B5EF4-FFF2-40B4-BE49-F238E27FC236}">
+                <a16:creationId xmlns:a16="http://schemas.microsoft.com/office/drawing/2014/main" id="{0015BD29-B03D-B7BF-E75E-78AE4E47E21F}"/>
+              </a:ext>
+            </a:extLst>
+          </p:cNvPr>
+          <p:cNvCxnSpPr>
+            <a:cxnSpLocks/>
+          </p:cNvCxnSpPr>
+          <p:nvPr/>
+        </p:nvCxnSpPr>
+        <p:spPr>
+          <a:xfrm rot="10800000" flipV="1">
+            <a:off x="7787813" y="4993240"/>
+            <a:ext cx="2048804" cy="369118"/>
+          </a:xfrm>
+          <a:prstGeom prst="bentConnector3">
+            <a:avLst/>
+          </a:prstGeom>
+          <a:ln>
+            <a:tailEnd type="triangle"/>
+          </a:ln>
+        </p:spPr>
+        <p:style>
+          <a:lnRef idx="2">
+            <a:schemeClr val="accent1"/>
+          </a:lnRef>
+          <a:fillRef idx="0">
+            <a:schemeClr val="accent1"/>
+          </a:fillRef>
+          <a:effectRef idx="1">
+            <a:schemeClr val="accent1"/>
+          </a:effectRef>
+          <a:fontRef idx="minor">
+            <a:schemeClr val="tx1"/>
+          </a:fontRef>
+        </p:style>
+      </p:cxnSp>
+      <p:sp>
+        <p:nvSpPr>
+          <p:cNvPr id="49" name="TextBox 48">
+            <a:extLst>
+              <a:ext uri="{FF2B5EF4-FFF2-40B4-BE49-F238E27FC236}">
+                <a16:creationId xmlns:a16="http://schemas.microsoft.com/office/drawing/2014/main" id="{40721CDF-E66C-A572-F649-35DD38FD5D9E}"/>
+              </a:ext>
+            </a:extLst>
+          </p:cNvPr>
+          <p:cNvSpPr txBox="1"/>
+          <p:nvPr/>
+        </p:nvSpPr>
+        <p:spPr>
+          <a:xfrm>
+            <a:off x="9873402" y="4580625"/>
+            <a:ext cx="1407623" cy="738664"/>
+          </a:xfrm>
+          <a:prstGeom prst="rect">
+            <a:avLst/>
+          </a:prstGeom>
+          <a:noFill/>
+        </p:spPr>
+        <p:txBody>
+          <a:bodyPr wrap="square" rtlCol="0">
+            <a:spAutoFit/>
+          </a:bodyPr>
+          <a:lstStyle/>
+          <a:p>
+            <a:r>
+              <a:rPr lang="en-US" sz="1400" b="1" dirty="0"/>
+              <a:t>PLC Holding Register index and state </a:t>
+            </a:r>
+            <a:endParaRPr lang="en-SG" sz="1400" b="1" dirty="0"/>
+          </a:p>
+        </p:txBody>
+      </p:sp>
+      <p:cxnSp>
+        <p:nvCxnSpPr>
+          <p:cNvPr id="50" name="Connector: Elbow 49">
+            <a:extLst>
+              <a:ext uri="{FF2B5EF4-FFF2-40B4-BE49-F238E27FC236}">
+                <a16:creationId xmlns:a16="http://schemas.microsoft.com/office/drawing/2014/main" id="{C4A7EBC4-EC00-8262-A9C8-A0D7579FA2EB}"/>
+              </a:ext>
+            </a:extLst>
+          </p:cNvPr>
+          <p:cNvCxnSpPr>
+            <a:cxnSpLocks/>
+          </p:cNvCxnSpPr>
+          <p:nvPr/>
+        </p:nvCxnSpPr>
+        <p:spPr>
+          <a:xfrm rot="10800000" flipV="1">
+            <a:off x="8761321" y="4267560"/>
+            <a:ext cx="1075296" cy="531594"/>
+          </a:xfrm>
+          <a:prstGeom prst="bentConnector3">
+            <a:avLst/>
+          </a:prstGeom>
+          <a:ln>
+            <a:tailEnd type="triangle"/>
+          </a:ln>
+        </p:spPr>
+        <p:style>
+          <a:lnRef idx="2">
+            <a:schemeClr val="accent1"/>
+          </a:lnRef>
+          <a:fillRef idx="0">
+            <a:schemeClr val="accent1"/>
+          </a:fillRef>
+          <a:effectRef idx="1">
+            <a:schemeClr val="accent1"/>
+          </a:effectRef>
+          <a:fontRef idx="minor">
+            <a:schemeClr val="tx1"/>
+          </a:fontRef>
+        </p:style>
+      </p:cxnSp>
+      <p:sp>
+        <p:nvSpPr>
+          <p:cNvPr id="52" name="TextBox 51">
+            <a:extLst>
+              <a:ext uri="{FF2B5EF4-FFF2-40B4-BE49-F238E27FC236}">
+                <a16:creationId xmlns:a16="http://schemas.microsoft.com/office/drawing/2014/main" id="{7DF88ADA-EFED-B9A9-242F-2B75B1856D23}"/>
+              </a:ext>
+            </a:extLst>
+          </p:cNvPr>
+          <p:cNvSpPr txBox="1"/>
+          <p:nvPr/>
+        </p:nvSpPr>
+        <p:spPr>
+          <a:xfrm>
+            <a:off x="9857638" y="3804968"/>
+            <a:ext cx="1143056" cy="738664"/>
+          </a:xfrm>
+          <a:prstGeom prst="rect">
+            <a:avLst/>
+          </a:prstGeom>
+          <a:noFill/>
+        </p:spPr>
+        <p:txBody>
+          <a:bodyPr wrap="square" rtlCol="0">
+            <a:spAutoFit/>
+          </a:bodyPr>
+          <a:lstStyle/>
+          <a:p>
+            <a:r>
+              <a:rPr lang="en-US" sz="1400" b="1" dirty="0"/>
+              <a:t>PLC Coils State and Control</a:t>
+            </a:r>
+            <a:endParaRPr lang="en-SG" sz="1400" b="1" dirty="0"/>
+          </a:p>
+        </p:txBody>
+      </p:sp>
+      <p:cxnSp>
+        <p:nvCxnSpPr>
+          <p:cNvPr id="53" name="Connector: Elbow 52">
+            <a:extLst>
+              <a:ext uri="{FF2B5EF4-FFF2-40B4-BE49-F238E27FC236}">
+                <a16:creationId xmlns:a16="http://schemas.microsoft.com/office/drawing/2014/main" id="{08944C47-09C6-CB2F-46D0-289A0BCDD33F}"/>
+              </a:ext>
+            </a:extLst>
+          </p:cNvPr>
+          <p:cNvCxnSpPr>
+            <a:cxnSpLocks/>
+          </p:cNvCxnSpPr>
+          <p:nvPr/>
+        </p:nvCxnSpPr>
+        <p:spPr>
+          <a:xfrm rot="5400000">
+            <a:off x="9001635" y="3555306"/>
+            <a:ext cx="885826" cy="826179"/>
+          </a:xfrm>
+          <a:prstGeom prst="bentConnector3">
+            <a:avLst>
+              <a:gd name="adj1" fmla="val -1033"/>
+            </a:avLst>
+          </a:prstGeom>
+          <a:ln>
+            <a:tailEnd type="triangle"/>
+          </a:ln>
+        </p:spPr>
+        <p:style>
+          <a:lnRef idx="2">
+            <a:schemeClr val="accent1"/>
+          </a:lnRef>
+          <a:fillRef idx="0">
+            <a:schemeClr val="accent1"/>
+          </a:fillRef>
+          <a:effectRef idx="1">
+            <a:schemeClr val="accent1"/>
+          </a:effectRef>
+          <a:fontRef idx="minor">
+            <a:schemeClr val="tx1"/>
+          </a:fontRef>
+        </p:style>
+      </p:cxnSp>
+      <p:sp>
+        <p:nvSpPr>
+          <p:cNvPr id="58" name="TextBox 57">
+            <a:extLst>
+              <a:ext uri="{FF2B5EF4-FFF2-40B4-BE49-F238E27FC236}">
+                <a16:creationId xmlns:a16="http://schemas.microsoft.com/office/drawing/2014/main" id="{480D7CD3-B867-6538-2BD0-254F4383D411}"/>
+              </a:ext>
+            </a:extLst>
+          </p:cNvPr>
+          <p:cNvSpPr txBox="1"/>
+          <p:nvPr/>
+        </p:nvSpPr>
+        <p:spPr>
+          <a:xfrm>
+            <a:off x="9878605" y="3152010"/>
+            <a:ext cx="1042846" cy="523220"/>
+          </a:xfrm>
+          <a:prstGeom prst="rect">
+            <a:avLst/>
+          </a:prstGeom>
+          <a:noFill/>
+        </p:spPr>
+        <p:txBody>
+          <a:bodyPr wrap="square" rtlCol="0">
+            <a:spAutoFit/>
+          </a:bodyPr>
+          <a:lstStyle/>
+          <a:p>
+            <a:r>
+              <a:rPr lang="en-US" sz="1400" b="1" dirty="0"/>
+              <a:t>PLC Coils  Pin Index</a:t>
+            </a:r>
+            <a:endParaRPr lang="en-SG" sz="1400" b="1" dirty="0"/>
+          </a:p>
+        </p:txBody>
+      </p:sp>
+      <p:cxnSp>
+        <p:nvCxnSpPr>
+          <p:cNvPr id="59" name="Connector: Elbow 58">
+            <a:extLst>
+              <a:ext uri="{FF2B5EF4-FFF2-40B4-BE49-F238E27FC236}">
+                <a16:creationId xmlns:a16="http://schemas.microsoft.com/office/drawing/2014/main" id="{81D85D96-E650-1F2A-B6EC-6FC3D00565C8}"/>
+              </a:ext>
+            </a:extLst>
+          </p:cNvPr>
+          <p:cNvCxnSpPr>
+            <a:cxnSpLocks/>
+          </p:cNvCxnSpPr>
+          <p:nvPr/>
+        </p:nvCxnSpPr>
+        <p:spPr>
+          <a:xfrm rot="10800000" flipV="1">
+            <a:off x="8342617" y="976045"/>
+            <a:ext cx="1645607" cy="583334"/>
+          </a:xfrm>
+          <a:prstGeom prst="bentConnector3">
+            <a:avLst>
+              <a:gd name="adj1" fmla="val 50000"/>
+            </a:avLst>
+          </a:prstGeom>
+          <a:ln>
+            <a:solidFill>
+              <a:schemeClr val="accent1">
+                <a:lumMod val="60000"/>
+                <a:lumOff val="40000"/>
+              </a:schemeClr>
+            </a:solidFill>
+            <a:tailEnd type="triangle"/>
+          </a:ln>
+        </p:spPr>
+        <p:style>
+          <a:lnRef idx="2">
+            <a:schemeClr val="accent1"/>
+          </a:lnRef>
+          <a:fillRef idx="0">
+            <a:schemeClr val="accent1"/>
+          </a:fillRef>
+          <a:effectRef idx="1">
+            <a:schemeClr val="accent1"/>
+          </a:effectRef>
+          <a:fontRef idx="minor">
+            <a:schemeClr val="tx1"/>
+          </a:fontRef>
+        </p:style>
+      </p:cxnSp>
+      <p:sp>
+        <p:nvSpPr>
+          <p:cNvPr id="62" name="TextBox 61">
+            <a:extLst>
+              <a:ext uri="{FF2B5EF4-FFF2-40B4-BE49-F238E27FC236}">
+                <a16:creationId xmlns:a16="http://schemas.microsoft.com/office/drawing/2014/main" id="{F0282E4B-660D-DF8E-BFF2-31536AC19695}"/>
+              </a:ext>
+            </a:extLst>
+          </p:cNvPr>
+          <p:cNvSpPr txBox="1"/>
+          <p:nvPr/>
+        </p:nvSpPr>
+        <p:spPr>
+          <a:xfrm>
+            <a:off x="9911052" y="713564"/>
+            <a:ext cx="1272253" cy="523220"/>
+          </a:xfrm>
+          <a:prstGeom prst="rect">
+            <a:avLst/>
+          </a:prstGeom>
+          <a:noFill/>
+        </p:spPr>
+        <p:txBody>
+          <a:bodyPr wrap="square" rtlCol="0">
+            <a:spAutoFit/>
+          </a:bodyPr>
+          <a:lstStyle/>
+          <a:p>
+            <a:r>
+              <a:rPr lang="en-US" sz="1400" b="1" dirty="0"/>
+              <a:t>Circuit break is turned [on]</a:t>
+            </a:r>
+            <a:endParaRPr lang="en-SG" sz="1400" b="1" dirty="0"/>
+          </a:p>
+        </p:txBody>
+      </p:sp>
+      <p:cxnSp>
+        <p:nvCxnSpPr>
+          <p:cNvPr id="63" name="Connector: Elbow 62">
+            <a:extLst>
+              <a:ext uri="{FF2B5EF4-FFF2-40B4-BE49-F238E27FC236}">
+                <a16:creationId xmlns:a16="http://schemas.microsoft.com/office/drawing/2014/main" id="{107C5C10-4940-7164-E1CB-CF6D0E6BC424}"/>
+              </a:ext>
+            </a:extLst>
+          </p:cNvPr>
+          <p:cNvCxnSpPr>
+            <a:cxnSpLocks/>
+          </p:cNvCxnSpPr>
+          <p:nvPr/>
+        </p:nvCxnSpPr>
+        <p:spPr>
+          <a:xfrm rot="10800000">
+            <a:off x="7279526" y="1767056"/>
+            <a:ext cx="2557091" cy="195407"/>
+          </a:xfrm>
+          <a:prstGeom prst="bentConnector3">
+            <a:avLst>
+              <a:gd name="adj1" fmla="val 100224"/>
+            </a:avLst>
+          </a:prstGeom>
+          <a:ln>
+            <a:solidFill>
+              <a:schemeClr val="accent1">
+                <a:lumMod val="60000"/>
+                <a:lumOff val="40000"/>
+              </a:schemeClr>
+            </a:solidFill>
+            <a:tailEnd type="triangle"/>
+          </a:ln>
+        </p:spPr>
+        <p:style>
+          <a:lnRef idx="2">
+            <a:schemeClr val="accent1"/>
+          </a:lnRef>
+          <a:fillRef idx="0">
+            <a:schemeClr val="accent1"/>
+          </a:fillRef>
+          <a:effectRef idx="1">
+            <a:schemeClr val="accent1"/>
+          </a:effectRef>
+          <a:fontRef idx="minor">
+            <a:schemeClr val="tx1"/>
+          </a:fontRef>
+        </p:style>
+      </p:cxnSp>
+      <p:sp>
+        <p:nvSpPr>
+          <p:cNvPr id="70" name="TextBox 69">
+            <a:extLst>
+              <a:ext uri="{FF2B5EF4-FFF2-40B4-BE49-F238E27FC236}">
+                <a16:creationId xmlns:a16="http://schemas.microsoft.com/office/drawing/2014/main" id="{9A435125-E76F-E7BF-4BF1-82FB65F92D8F}"/>
+              </a:ext>
+            </a:extLst>
+          </p:cNvPr>
+          <p:cNvSpPr txBox="1"/>
+          <p:nvPr/>
+        </p:nvSpPr>
+        <p:spPr>
+          <a:xfrm>
+            <a:off x="9857638" y="1675630"/>
+            <a:ext cx="1325667" cy="523220"/>
+          </a:xfrm>
+          <a:prstGeom prst="rect">
+            <a:avLst/>
+          </a:prstGeom>
+          <a:noFill/>
+        </p:spPr>
+        <p:txBody>
+          <a:bodyPr wrap="square" rtlCol="0">
+            <a:spAutoFit/>
+          </a:bodyPr>
+          <a:lstStyle/>
+          <a:p>
+            <a:r>
+              <a:rPr lang="en-US" sz="1400" b="1" dirty="0"/>
+              <a:t>Circuit break is turned [off]</a:t>
+            </a:r>
+            <a:endParaRPr lang="en-SG" sz="1400" b="1" dirty="0"/>
+          </a:p>
+        </p:txBody>
+      </p:sp>
+      <p:sp>
+        <p:nvSpPr>
+          <p:cNvPr id="75" name="TextBox 74">
+            <a:extLst>
+              <a:ext uri="{FF2B5EF4-FFF2-40B4-BE49-F238E27FC236}">
+                <a16:creationId xmlns:a16="http://schemas.microsoft.com/office/drawing/2014/main" id="{71E74D9F-32D3-394F-4B0F-7BA272AB1619}"/>
+              </a:ext>
+            </a:extLst>
+          </p:cNvPr>
+          <p:cNvSpPr txBox="1"/>
+          <p:nvPr/>
+        </p:nvSpPr>
+        <p:spPr>
+          <a:xfrm>
+            <a:off x="1292702" y="5582314"/>
+            <a:ext cx="717086" cy="369332"/>
+          </a:xfrm>
+          <a:prstGeom prst="rect">
+            <a:avLst/>
+          </a:prstGeom>
+          <a:noFill/>
+        </p:spPr>
+        <p:txBody>
+          <a:bodyPr wrap="square" rtlCol="0">
+            <a:spAutoFit/>
+          </a:bodyPr>
+          <a:lstStyle/>
+          <a:p>
+            <a:r>
+              <a:rPr lang="en-US" b="1" dirty="0"/>
+              <a:t>PLC</a:t>
+            </a:r>
+            <a:endParaRPr lang="en-SG" b="1" dirty="0"/>
+          </a:p>
+        </p:txBody>
+      </p:sp>
+      <p:sp>
+        <p:nvSpPr>
+          <p:cNvPr id="76" name="TextBox 75">
+            <a:extLst>
+              <a:ext uri="{FF2B5EF4-FFF2-40B4-BE49-F238E27FC236}">
+                <a16:creationId xmlns:a16="http://schemas.microsoft.com/office/drawing/2014/main" id="{90439045-F04A-6AE6-0D24-B3A07D9AAE71}"/>
+              </a:ext>
+            </a:extLst>
+          </p:cNvPr>
+          <p:cNvSpPr txBox="1"/>
+          <p:nvPr/>
+        </p:nvSpPr>
+        <p:spPr>
+          <a:xfrm>
+            <a:off x="1996261" y="516641"/>
+            <a:ext cx="2166408" cy="369332"/>
+          </a:xfrm>
+          <a:prstGeom prst="rect">
+            <a:avLst/>
+          </a:prstGeom>
+          <a:noFill/>
+          <a:ln w="19050">
+            <a:solidFill>
+              <a:schemeClr val="tx1"/>
+            </a:solidFill>
+          </a:ln>
+        </p:spPr>
+        <p:txBody>
+          <a:bodyPr wrap="square" rtlCol="0">
+            <a:spAutoFit/>
+          </a:bodyPr>
+          <a:lstStyle/>
+          <a:p>
+            <a:r>
+              <a:rPr lang="en-US" b="1" dirty="0"/>
+              <a:t>Power system HMI</a:t>
+            </a:r>
+            <a:endParaRPr lang="en-SG" b="1" dirty="0"/>
+          </a:p>
+        </p:txBody>
+      </p:sp>
+    </p:spTree>
+    <p:extLst>
+      <p:ext uri="{BB962C8B-B14F-4D97-AF65-F5344CB8AC3E}">
+        <p14:creationId xmlns:p14="http://schemas.microsoft.com/office/powerpoint/2010/main" val="1159949893"/>
+      </p:ext>
+    </p:extLst>
+  </p:cSld>
+  <p:clrMapOvr>
+    <a:masterClrMapping/>
+  </p:clrMapOvr>
+</p:sld>
+</file>
+
+<file path=ppt/slides/slide6.xml><?xml version="1.0" encoding="utf-8"?>
+<p:sld xmlns:a="http://schemas.openxmlformats.org/drawingml/2006/main" xmlns:r="http://schemas.openxmlformats.org/officeDocument/2006/relationships" xmlns:p="http://schemas.openxmlformats.org/presentationml/2006/main">
+  <p:cSld>
+    <p:spTree>
+      <p:nvGrpSpPr>
+        <p:cNvPr id="1" name=""/>
+        <p:cNvGrpSpPr/>
+        <p:nvPr/>
+      </p:nvGrpSpPr>
+      <p:grpSpPr>
+        <a:xfrm>
+          <a:off x="0" y="0"/>
+          <a:ext cx="0" cy="0"/>
+          <a:chOff x="0" y="0"/>
+          <a:chExt cx="0" cy="0"/>
+        </a:xfrm>
+      </p:grpSpPr>
+      <p:pic>
+        <p:nvPicPr>
+          <p:cNvPr id="5" name="Picture 4">
+            <a:extLst>
+              <a:ext uri="{FF2B5EF4-FFF2-40B4-BE49-F238E27FC236}">
+                <a16:creationId xmlns:a16="http://schemas.microsoft.com/office/drawing/2014/main" id="{0D44F592-F655-12FB-3CE1-387E7971BFE0}"/>
+              </a:ext>
+            </a:extLst>
+          </p:cNvPr>
+          <p:cNvPicPr>
+            <a:picLocks noChangeAspect="1"/>
+          </p:cNvPicPr>
+          <p:nvPr/>
+        </p:nvPicPr>
+        <p:blipFill>
+          <a:blip r:embed="rId2"/>
+          <a:srcRect b="28800"/>
+          <a:stretch/>
+        </p:blipFill>
+        <p:spPr>
+          <a:xfrm>
+            <a:off x="1767163" y="3331737"/>
+            <a:ext cx="5723809" cy="1702002"/>
+          </a:xfrm>
+          <a:prstGeom prst="rect">
+            <a:avLst/>
+          </a:prstGeom>
+        </p:spPr>
+      </p:pic>
+      <p:pic>
+        <p:nvPicPr>
+          <p:cNvPr id="9" name="Picture 8">
+            <a:extLst>
+              <a:ext uri="{FF2B5EF4-FFF2-40B4-BE49-F238E27FC236}">
+                <a16:creationId xmlns:a16="http://schemas.microsoft.com/office/drawing/2014/main" id="{738A64AD-640D-A7C9-EFCA-0D7246718249}"/>
+              </a:ext>
+            </a:extLst>
+          </p:cNvPr>
+          <p:cNvPicPr>
+            <a:picLocks noChangeAspect="1"/>
+          </p:cNvPicPr>
+          <p:nvPr/>
+        </p:nvPicPr>
+        <p:blipFill>
+          <a:blip r:embed="rId3"/>
+          <a:stretch>
+            <a:fillRect/>
+          </a:stretch>
+        </p:blipFill>
+        <p:spPr>
+          <a:xfrm>
+            <a:off x="1767164" y="716406"/>
+            <a:ext cx="4428571" cy="2019048"/>
+          </a:xfrm>
+          <a:prstGeom prst="rect">
+            <a:avLst/>
+          </a:prstGeom>
+        </p:spPr>
+      </p:pic>
+      <p:pic>
+        <p:nvPicPr>
+          <p:cNvPr id="11" name="Picture 10">
+            <a:extLst>
+              <a:ext uri="{FF2B5EF4-FFF2-40B4-BE49-F238E27FC236}">
+                <a16:creationId xmlns:a16="http://schemas.microsoft.com/office/drawing/2014/main" id="{4089B9D7-1C20-0E8A-2EB8-EBAEB0707C06}"/>
+              </a:ext>
+            </a:extLst>
+          </p:cNvPr>
+          <p:cNvPicPr>
+            <a:picLocks noChangeAspect="1"/>
+          </p:cNvPicPr>
+          <p:nvPr/>
+        </p:nvPicPr>
+        <p:blipFill>
+          <a:blip r:embed="rId4">
+            <a:extLst>
+              <a:ext uri="{28A0092B-C50C-407E-A947-70E740481C1C}">
+                <a14:useLocalDpi xmlns:a14="http://schemas.microsoft.com/office/drawing/2010/main" val="0"/>
+              </a:ext>
+            </a:extLst>
+          </a:blip>
+          <a:stretch>
+            <a:fillRect/>
+          </a:stretch>
+        </p:blipFill>
+        <p:spPr>
+          <a:xfrm>
+            <a:off x="4867293" y="1845963"/>
+            <a:ext cx="356217" cy="356217"/>
+          </a:xfrm>
+          <a:prstGeom prst="rect">
+            <a:avLst/>
+          </a:prstGeom>
+          <a:ln w="19050">
+            <a:solidFill>
+              <a:srgbClr val="0000FF"/>
+            </a:solidFill>
+          </a:ln>
+        </p:spPr>
+      </p:pic>
+      <p:cxnSp>
+        <p:nvCxnSpPr>
+          <p:cNvPr id="13" name="Straight Connector 12">
+            <a:extLst>
+              <a:ext uri="{FF2B5EF4-FFF2-40B4-BE49-F238E27FC236}">
+                <a16:creationId xmlns:a16="http://schemas.microsoft.com/office/drawing/2014/main" id="{9C97F7ED-CBF4-0695-93DF-825ED00CAB61}"/>
+              </a:ext>
+            </a:extLst>
+          </p:cNvPr>
+          <p:cNvCxnSpPr>
+            <a:cxnSpLocks/>
+          </p:cNvCxnSpPr>
+          <p:nvPr/>
+        </p:nvCxnSpPr>
+        <p:spPr>
+          <a:xfrm>
+            <a:off x="5013789" y="1643865"/>
+            <a:ext cx="0" cy="202098"/>
+          </a:xfrm>
+          <a:prstGeom prst="line">
+            <a:avLst/>
+          </a:prstGeom>
+          <a:ln w="28575">
+            <a:solidFill>
+              <a:srgbClr val="00B0F0"/>
+            </a:solidFill>
+          </a:ln>
+        </p:spPr>
+        <p:style>
+          <a:lnRef idx="2">
+            <a:schemeClr val="accent1"/>
+          </a:lnRef>
+          <a:fillRef idx="0">
+            <a:schemeClr val="accent1"/>
+          </a:fillRef>
+          <a:effectRef idx="1">
+            <a:schemeClr val="accent1"/>
+          </a:effectRef>
+          <a:fontRef idx="minor">
+            <a:schemeClr val="tx1"/>
+          </a:fontRef>
+        </p:style>
+      </p:cxnSp>
+      <p:cxnSp>
+        <p:nvCxnSpPr>
+          <p:cNvPr id="16" name="Connector: Elbow 15">
+            <a:extLst>
+              <a:ext uri="{FF2B5EF4-FFF2-40B4-BE49-F238E27FC236}">
+                <a16:creationId xmlns:a16="http://schemas.microsoft.com/office/drawing/2014/main" id="{11D7682D-867E-1609-1CD9-B6F3DA0E097A}"/>
+              </a:ext>
+            </a:extLst>
+          </p:cNvPr>
+          <p:cNvCxnSpPr>
+            <a:cxnSpLocks/>
+          </p:cNvCxnSpPr>
+          <p:nvPr/>
+        </p:nvCxnSpPr>
+        <p:spPr>
+          <a:xfrm rot="16200000" flipH="1">
+            <a:off x="4981272" y="2268898"/>
+            <a:ext cx="1893834" cy="1212350"/>
+          </a:xfrm>
+          <a:prstGeom prst="bentConnector3">
+            <a:avLst>
+              <a:gd name="adj1" fmla="val 89"/>
+            </a:avLst>
+          </a:prstGeom>
+          <a:ln>
+            <a:solidFill>
+              <a:srgbClr val="C00000"/>
+            </a:solidFill>
+            <a:prstDash val="sysDash"/>
+            <a:tailEnd type="triangle"/>
+          </a:ln>
+        </p:spPr>
+        <p:style>
+          <a:lnRef idx="2">
+            <a:schemeClr val="accent1"/>
+          </a:lnRef>
+          <a:fillRef idx="0">
+            <a:schemeClr val="accent1"/>
+          </a:fillRef>
+          <a:effectRef idx="1">
+            <a:schemeClr val="accent1"/>
+          </a:effectRef>
+          <a:fontRef idx="minor">
+            <a:schemeClr val="tx1"/>
+          </a:fontRef>
+        </p:style>
+      </p:cxnSp>
+      <p:sp>
+        <p:nvSpPr>
+          <p:cNvPr id="20" name="TextBox 19">
+            <a:extLst>
+              <a:ext uri="{FF2B5EF4-FFF2-40B4-BE49-F238E27FC236}">
+                <a16:creationId xmlns:a16="http://schemas.microsoft.com/office/drawing/2014/main" id="{FB3932EA-8F90-0ADF-7466-4AB35FAE056E}"/>
+              </a:ext>
+            </a:extLst>
+          </p:cNvPr>
+          <p:cNvSpPr txBox="1"/>
+          <p:nvPr/>
+        </p:nvSpPr>
+        <p:spPr>
+          <a:xfrm>
+            <a:off x="1767163" y="2759061"/>
+            <a:ext cx="4695282" cy="523220"/>
+          </a:xfrm>
+          <a:prstGeom prst="rect">
+            <a:avLst/>
+          </a:prstGeom>
+          <a:noFill/>
+        </p:spPr>
+        <p:txBody>
+          <a:bodyPr wrap="square" rtlCol="0">
+            <a:spAutoFit/>
+          </a:bodyPr>
+          <a:lstStyle/>
+          <a:p>
+            <a:r>
+              <a:rPr lang="en-US" sz="1400" b="1" dirty="0"/>
+              <a:t>When Circuit Breaker Exception Detected, show the flash alert signal under the breaker to remind operator. </a:t>
+            </a:r>
+            <a:endParaRPr lang="en-SG" sz="1400" b="1" dirty="0"/>
+          </a:p>
+        </p:txBody>
+      </p:sp>
+      <p:sp>
+        <p:nvSpPr>
+          <p:cNvPr id="21" name="TextBox 20">
+            <a:extLst>
+              <a:ext uri="{FF2B5EF4-FFF2-40B4-BE49-F238E27FC236}">
+                <a16:creationId xmlns:a16="http://schemas.microsoft.com/office/drawing/2014/main" id="{8059F2F4-EB41-4C82-D37F-6F44A449FA3D}"/>
+              </a:ext>
+            </a:extLst>
+          </p:cNvPr>
+          <p:cNvSpPr txBox="1"/>
+          <p:nvPr/>
+        </p:nvSpPr>
+        <p:spPr>
+          <a:xfrm>
+            <a:off x="6611679" y="1589510"/>
+            <a:ext cx="1758585" cy="1384995"/>
+          </a:xfrm>
+          <a:prstGeom prst="rect">
+            <a:avLst/>
+          </a:prstGeom>
+          <a:noFill/>
+        </p:spPr>
+        <p:txBody>
+          <a:bodyPr wrap="square" rtlCol="0">
+            <a:spAutoFit/>
+          </a:bodyPr>
+          <a:lstStyle/>
+          <a:p>
+            <a:r>
+              <a:rPr lang="en-US" sz="1400" b="1"/>
+              <a:t>Operator needs to check </a:t>
+            </a:r>
+            <a:r>
+              <a:rPr lang="en-US" sz="1400" b="1" dirty="0"/>
+              <a:t>the breaker state, then change the breaker to correct state to clear the alert. </a:t>
+            </a:r>
+            <a:endParaRPr lang="en-SG" sz="1400" b="1" dirty="0"/>
+          </a:p>
+        </p:txBody>
+      </p:sp>
+    </p:spTree>
+    <p:extLst>
+      <p:ext uri="{BB962C8B-B14F-4D97-AF65-F5344CB8AC3E}">
+        <p14:creationId xmlns:p14="http://schemas.microsoft.com/office/powerpoint/2010/main" val="2716255319"/>
+      </p:ext>
+    </p:extLst>
+  </p:cSld>
+  <p:clrMapOvr>
+    <a:masterClrMapping/>
+  </p:clrMapOvr>
+</p:sld>
+</file>
+
 <file path=ppt/theme/theme1.xml><?xml version="1.0" encoding="utf-8"?>
 <a:theme xmlns:a="http://schemas.openxmlformats.org/drawingml/2006/main" name="Office Theme">
   <a:themeElements>

</xml_diff>

<commit_message>
Update the HMI section.
</commit_message>
<xml_diff>
--- a/OT_System_Attack_Case_Study/Power_CircuitBreaker/img/designDoc.pptx
+++ b/OT_System_Attack_Case_Study/Power_CircuitBreaker/img/designDoc.pptx
@@ -10747,12 +10747,8 @@
           <a:lstStyle/>
           <a:p>
             <a:r>
-              <a:rPr lang="en-US" sz="1400" b="1"/>
-              <a:t>Operator needs to check </a:t>
-            </a:r>
-            <a:r>
               <a:rPr lang="en-US" sz="1400" b="1" dirty="0"/>
-              <a:t>the breaker state, then change the breaker to correct state to clear the alert. </a:t>
+              <a:t>Operator needs to check the breaker state, then change the breaker to correct state to clear the alert. </a:t>
             </a:r>
             <a:endParaRPr lang="en-SG" sz="1400" b="1" dirty="0"/>
           </a:p>

</xml_diff>

<commit_message>
update the title and the reference link part.
</commit_message>
<xml_diff>
--- a/OT_System_Attack_Case_Study/Power_CircuitBreaker/img/designDoc.pptx
+++ b/OT_System_Attack_Case_Study/Power_CircuitBreaker/img/designDoc.pptx
@@ -11,6 +11,8 @@
     <p:sldId id="258" r:id="rId5"/>
     <p:sldId id="260" r:id="rId6"/>
     <p:sldId id="261" r:id="rId7"/>
+    <p:sldId id="263" r:id="rId8"/>
+    <p:sldId id="262" r:id="rId9"/>
   </p:sldIdLst>
   <p:sldSz cx="12192000" cy="6858000"/>
   <p:notesSz cx="6858000" cy="9144000"/>
@@ -266,7 +268,7 @@
           <a:p>
             <a:fld id="{F0EB0E7A-F811-45C0-9812-9E3D3D3B182F}" type="datetimeFigureOut">
               <a:rPr lang="en-SG" smtClean="0"/>
-              <a:t>19/9/2024</a:t>
+              <a:t>21/9/2024</a:t>
             </a:fld>
             <a:endParaRPr lang="en-SG"/>
           </a:p>
@@ -466,7 +468,7 @@
           <a:p>
             <a:fld id="{F0EB0E7A-F811-45C0-9812-9E3D3D3B182F}" type="datetimeFigureOut">
               <a:rPr lang="en-SG" smtClean="0"/>
-              <a:t>19/9/2024</a:t>
+              <a:t>21/9/2024</a:t>
             </a:fld>
             <a:endParaRPr lang="en-SG"/>
           </a:p>
@@ -676,7 +678,7 @@
           <a:p>
             <a:fld id="{F0EB0E7A-F811-45C0-9812-9E3D3D3B182F}" type="datetimeFigureOut">
               <a:rPr lang="en-SG" smtClean="0"/>
-              <a:t>19/9/2024</a:t>
+              <a:t>21/9/2024</a:t>
             </a:fld>
             <a:endParaRPr lang="en-SG"/>
           </a:p>
@@ -876,7 +878,7 @@
           <a:p>
             <a:fld id="{F0EB0E7A-F811-45C0-9812-9E3D3D3B182F}" type="datetimeFigureOut">
               <a:rPr lang="en-SG" smtClean="0"/>
-              <a:t>19/9/2024</a:t>
+              <a:t>21/9/2024</a:t>
             </a:fld>
             <a:endParaRPr lang="en-SG"/>
           </a:p>
@@ -1152,7 +1154,7 @@
           <a:p>
             <a:fld id="{F0EB0E7A-F811-45C0-9812-9E3D3D3B182F}" type="datetimeFigureOut">
               <a:rPr lang="en-SG" smtClean="0"/>
-              <a:t>19/9/2024</a:t>
+              <a:t>21/9/2024</a:t>
             </a:fld>
             <a:endParaRPr lang="en-SG"/>
           </a:p>
@@ -1420,7 +1422,7 @@
           <a:p>
             <a:fld id="{F0EB0E7A-F811-45C0-9812-9E3D3D3B182F}" type="datetimeFigureOut">
               <a:rPr lang="en-SG" smtClean="0"/>
-              <a:t>19/9/2024</a:t>
+              <a:t>21/9/2024</a:t>
             </a:fld>
             <a:endParaRPr lang="en-SG"/>
           </a:p>
@@ -1835,7 +1837,7 @@
           <a:p>
             <a:fld id="{F0EB0E7A-F811-45C0-9812-9E3D3D3B182F}" type="datetimeFigureOut">
               <a:rPr lang="en-SG" smtClean="0"/>
-              <a:t>19/9/2024</a:t>
+              <a:t>21/9/2024</a:t>
             </a:fld>
             <a:endParaRPr lang="en-SG"/>
           </a:p>
@@ -1977,7 +1979,7 @@
           <a:p>
             <a:fld id="{F0EB0E7A-F811-45C0-9812-9E3D3D3B182F}" type="datetimeFigureOut">
               <a:rPr lang="en-SG" smtClean="0"/>
-              <a:t>19/9/2024</a:t>
+              <a:t>21/9/2024</a:t>
             </a:fld>
             <a:endParaRPr lang="en-SG"/>
           </a:p>
@@ -2090,7 +2092,7 @@
           <a:p>
             <a:fld id="{F0EB0E7A-F811-45C0-9812-9E3D3D3B182F}" type="datetimeFigureOut">
               <a:rPr lang="en-SG" smtClean="0"/>
-              <a:t>19/9/2024</a:t>
+              <a:t>21/9/2024</a:t>
             </a:fld>
             <a:endParaRPr lang="en-SG"/>
           </a:p>
@@ -2403,7 +2405,7 @@
           <a:p>
             <a:fld id="{F0EB0E7A-F811-45C0-9812-9E3D3D3B182F}" type="datetimeFigureOut">
               <a:rPr lang="en-SG" smtClean="0"/>
-              <a:t>19/9/2024</a:t>
+              <a:t>21/9/2024</a:t>
             </a:fld>
             <a:endParaRPr lang="en-SG"/>
           </a:p>
@@ -2692,7 +2694,7 @@
           <a:p>
             <a:fld id="{F0EB0E7A-F811-45C0-9812-9E3D3D3B182F}" type="datetimeFigureOut">
               <a:rPr lang="en-SG" smtClean="0"/>
-              <a:t>19/9/2024</a:t>
+              <a:t>21/9/2024</a:t>
             </a:fld>
             <a:endParaRPr lang="en-SG"/>
           </a:p>
@@ -2935,7 +2937,7 @@
           <a:p>
             <a:fld id="{F0EB0E7A-F811-45C0-9812-9E3D3D3B182F}" type="datetimeFigureOut">
               <a:rPr lang="en-SG" smtClean="0"/>
-              <a:t>19/9/2024</a:t>
+              <a:t>21/9/2024</a:t>
             </a:fld>
             <a:endParaRPr lang="en-SG"/>
           </a:p>
@@ -10767,6 +10769,1280 @@
 </p:sld>
 </file>
 
+<file path=ppt/slides/slide7.xml><?xml version="1.0" encoding="utf-8"?>
+<p:sld xmlns:a="http://schemas.openxmlformats.org/drawingml/2006/main" xmlns:r="http://schemas.openxmlformats.org/officeDocument/2006/relationships" xmlns:p="http://schemas.openxmlformats.org/presentationml/2006/main">
+  <p:cSld>
+    <p:spTree>
+      <p:nvGrpSpPr>
+        <p:cNvPr id="1" name=""/>
+        <p:cNvGrpSpPr/>
+        <p:nvPr/>
+      </p:nvGrpSpPr>
+      <p:grpSpPr>
+        <a:xfrm>
+          <a:off x="0" y="0"/>
+          <a:ext cx="0" cy="0"/>
+          <a:chOff x="0" y="0"/>
+          <a:chExt cx="0" cy="0"/>
+        </a:xfrm>
+      </p:grpSpPr>
+      <p:pic>
+        <p:nvPicPr>
+          <p:cNvPr id="5" name="Picture 4" descr="A diagram of a power system&#10;&#10;Description automatically generated">
+            <a:extLst>
+              <a:ext uri="{FF2B5EF4-FFF2-40B4-BE49-F238E27FC236}">
+                <a16:creationId xmlns:a16="http://schemas.microsoft.com/office/drawing/2014/main" id="{6ACCF470-6189-4881-7C35-DE0E7EC05BFF}"/>
+              </a:ext>
+            </a:extLst>
+          </p:cNvPr>
+          <p:cNvPicPr>
+            <a:picLocks noChangeAspect="1"/>
+          </p:cNvPicPr>
+          <p:nvPr/>
+        </p:nvPicPr>
+        <p:blipFill>
+          <a:blip r:embed="rId2">
+            <a:extLst>
+              <a:ext uri="{28A0092B-C50C-407E-A947-70E740481C1C}">
+                <a14:useLocalDpi xmlns:a14="http://schemas.microsoft.com/office/drawing/2010/main" val="0"/>
+              </a:ext>
+            </a:extLst>
+          </a:blip>
+          <a:stretch>
+            <a:fillRect/>
+          </a:stretch>
+        </p:blipFill>
+        <p:spPr>
+          <a:xfrm>
+            <a:off x="828469" y="3814662"/>
+            <a:ext cx="4537917" cy="2509468"/>
+          </a:xfrm>
+          <a:prstGeom prst="rect">
+            <a:avLst/>
+          </a:prstGeom>
+          <a:ln w="19050">
+            <a:solidFill>
+              <a:schemeClr val="tx1"/>
+            </a:solidFill>
+          </a:ln>
+        </p:spPr>
+      </p:pic>
+      <p:pic>
+        <p:nvPicPr>
+          <p:cNvPr id="6" name="Picture 5">
+            <a:extLst>
+              <a:ext uri="{FF2B5EF4-FFF2-40B4-BE49-F238E27FC236}">
+                <a16:creationId xmlns:a16="http://schemas.microsoft.com/office/drawing/2014/main" id="{912E2333-42B0-6F80-AA38-70D3DCFE2A51}"/>
+              </a:ext>
+            </a:extLst>
+          </p:cNvPr>
+          <p:cNvPicPr>
+            <a:picLocks noChangeAspect="1"/>
+          </p:cNvPicPr>
+          <p:nvPr/>
+        </p:nvPicPr>
+        <p:blipFill>
+          <a:blip r:embed="rId3"/>
+          <a:stretch>
+            <a:fillRect/>
+          </a:stretch>
+        </p:blipFill>
+        <p:spPr>
+          <a:xfrm>
+            <a:off x="828470" y="1515048"/>
+            <a:ext cx="4537917" cy="1913952"/>
+          </a:xfrm>
+          <a:prstGeom prst="rect">
+            <a:avLst/>
+          </a:prstGeom>
+        </p:spPr>
+      </p:pic>
+      <p:pic>
+        <p:nvPicPr>
+          <p:cNvPr id="10" name="Picture 9">
+            <a:extLst>
+              <a:ext uri="{FF2B5EF4-FFF2-40B4-BE49-F238E27FC236}">
+                <a16:creationId xmlns:a16="http://schemas.microsoft.com/office/drawing/2014/main" id="{F1F6E660-C6F7-9B1F-797C-63A1556F549B}"/>
+              </a:ext>
+            </a:extLst>
+          </p:cNvPr>
+          <p:cNvPicPr>
+            <a:picLocks noChangeAspect="1"/>
+          </p:cNvPicPr>
+          <p:nvPr/>
+        </p:nvPicPr>
+        <p:blipFill>
+          <a:blip r:embed="rId4"/>
+          <a:stretch>
+            <a:fillRect/>
+          </a:stretch>
+        </p:blipFill>
+        <p:spPr>
+          <a:xfrm>
+            <a:off x="5888709" y="1515048"/>
+            <a:ext cx="5176939" cy="4809082"/>
+          </a:xfrm>
+          <a:prstGeom prst="rect">
+            <a:avLst/>
+          </a:prstGeom>
+          <a:ln w="19050">
+            <a:solidFill>
+              <a:schemeClr val="tx1"/>
+            </a:solidFill>
+          </a:ln>
+        </p:spPr>
+      </p:pic>
+      <p:sp>
+        <p:nvSpPr>
+          <p:cNvPr id="11" name="TextBox 10">
+            <a:extLst>
+              <a:ext uri="{FF2B5EF4-FFF2-40B4-BE49-F238E27FC236}">
+                <a16:creationId xmlns:a16="http://schemas.microsoft.com/office/drawing/2014/main" id="{4E31DEDA-270A-C4C4-EA3E-D8CC33C3189C}"/>
+              </a:ext>
+            </a:extLst>
+          </p:cNvPr>
+          <p:cNvSpPr txBox="1"/>
+          <p:nvPr/>
+        </p:nvSpPr>
+        <p:spPr>
+          <a:xfrm>
+            <a:off x="756549" y="1201874"/>
+            <a:ext cx="4277787" cy="307777"/>
+          </a:xfrm>
+          <a:prstGeom prst="rect">
+            <a:avLst/>
+          </a:prstGeom>
+          <a:noFill/>
+        </p:spPr>
+        <p:txBody>
+          <a:bodyPr wrap="square" rtlCol="0">
+            <a:spAutoFit/>
+          </a:bodyPr>
+          <a:lstStyle/>
+          <a:p>
+            <a:r>
+              <a:rPr lang="en-US" sz="1400" b="1" dirty="0">
+                <a:solidFill>
+                  <a:schemeClr val="accent1">
+                    <a:lumMod val="75000"/>
+                  </a:schemeClr>
+                </a:solidFill>
+              </a:rPr>
+              <a:t>Digital Equivalent Simulation (With Virtual PLC</a:t>
+            </a:r>
+            <a:r>
+              <a:rPr lang="en-US" sz="1400" b="1" dirty="0"/>
+              <a:t>)</a:t>
+            </a:r>
+            <a:endParaRPr lang="en-SG" sz="1400" b="1" dirty="0"/>
+          </a:p>
+        </p:txBody>
+      </p:sp>
+      <p:sp>
+        <p:nvSpPr>
+          <p:cNvPr id="12" name="TextBox 11">
+            <a:extLst>
+              <a:ext uri="{FF2B5EF4-FFF2-40B4-BE49-F238E27FC236}">
+                <a16:creationId xmlns:a16="http://schemas.microsoft.com/office/drawing/2014/main" id="{2DFD8FC1-153F-97AC-1FFE-76B5986207C0}"/>
+              </a:ext>
+            </a:extLst>
+          </p:cNvPr>
+          <p:cNvSpPr txBox="1"/>
+          <p:nvPr/>
+        </p:nvSpPr>
+        <p:spPr>
+          <a:xfrm>
+            <a:off x="756549" y="3476108"/>
+            <a:ext cx="4277788" cy="307777"/>
+          </a:xfrm>
+          <a:prstGeom prst="rect">
+            <a:avLst/>
+          </a:prstGeom>
+          <a:noFill/>
+        </p:spPr>
+        <p:txBody>
+          <a:bodyPr wrap="square" rtlCol="0">
+            <a:spAutoFit/>
+          </a:bodyPr>
+          <a:lstStyle/>
+          <a:p>
+            <a:r>
+              <a:rPr lang="en-US" sz="1400" b="1" dirty="0">
+                <a:solidFill>
+                  <a:schemeClr val="accent1">
+                    <a:lumMod val="75000"/>
+                  </a:schemeClr>
+                </a:solidFill>
+              </a:rPr>
+              <a:t>Physical Circuit Breaker ( with motor and sensor)</a:t>
+            </a:r>
+            <a:endParaRPr lang="en-SG" sz="1400" b="1" dirty="0">
+              <a:solidFill>
+                <a:schemeClr val="accent1">
+                  <a:lumMod val="75000"/>
+                </a:schemeClr>
+              </a:solidFill>
+            </a:endParaRPr>
+          </a:p>
+        </p:txBody>
+      </p:sp>
+      <p:sp>
+        <p:nvSpPr>
+          <p:cNvPr id="13" name="Arrow: Left-Right 12">
+            <a:extLst>
+              <a:ext uri="{FF2B5EF4-FFF2-40B4-BE49-F238E27FC236}">
+                <a16:creationId xmlns:a16="http://schemas.microsoft.com/office/drawing/2014/main" id="{7FAE30B1-B086-9A5B-9D92-61DF9A53D7BF}"/>
+              </a:ext>
+            </a:extLst>
+          </p:cNvPr>
+          <p:cNvSpPr/>
+          <p:nvPr/>
+        </p:nvSpPr>
+        <p:spPr>
+          <a:xfrm>
+            <a:off x="5365154" y="2652299"/>
+            <a:ext cx="727422" cy="149975"/>
+          </a:xfrm>
+          <a:prstGeom prst="leftRightArrow">
+            <a:avLst/>
+          </a:prstGeom>
+        </p:spPr>
+        <p:style>
+          <a:lnRef idx="2">
+            <a:schemeClr val="accent1">
+              <a:shade val="15000"/>
+            </a:schemeClr>
+          </a:lnRef>
+          <a:fillRef idx="1">
+            <a:schemeClr val="accent1"/>
+          </a:fillRef>
+          <a:effectRef idx="0">
+            <a:schemeClr val="accent1"/>
+          </a:effectRef>
+          <a:fontRef idx="minor">
+            <a:schemeClr val="lt1"/>
+          </a:fontRef>
+        </p:style>
+        <p:txBody>
+          <a:bodyPr rtlCol="0" anchor="ctr"/>
+          <a:lstStyle/>
+          <a:p>
+            <a:pPr algn="ctr"/>
+            <a:endParaRPr lang="en-SG"/>
+          </a:p>
+        </p:txBody>
+      </p:sp>
+      <p:sp>
+        <p:nvSpPr>
+          <p:cNvPr id="14" name="TextBox 13">
+            <a:extLst>
+              <a:ext uri="{FF2B5EF4-FFF2-40B4-BE49-F238E27FC236}">
+                <a16:creationId xmlns:a16="http://schemas.microsoft.com/office/drawing/2014/main" id="{CB6C65D5-6F76-5935-C69C-0AE5F3553E08}"/>
+              </a:ext>
+            </a:extLst>
+          </p:cNvPr>
+          <p:cNvSpPr txBox="1"/>
+          <p:nvPr/>
+        </p:nvSpPr>
+        <p:spPr>
+          <a:xfrm>
+            <a:off x="4725540" y="4594366"/>
+            <a:ext cx="1265103" cy="307777"/>
+          </a:xfrm>
+          <a:prstGeom prst="rect">
+            <a:avLst/>
+          </a:prstGeom>
+          <a:noFill/>
+        </p:spPr>
+        <p:txBody>
+          <a:bodyPr wrap="square" rtlCol="0">
+            <a:spAutoFit/>
+          </a:bodyPr>
+          <a:lstStyle/>
+          <a:p>
+            <a:r>
+              <a:rPr lang="en-US" sz="1400" b="1" dirty="0"/>
+              <a:t>Modbus TCP </a:t>
+            </a:r>
+          </a:p>
+        </p:txBody>
+      </p:sp>
+      <p:sp>
+        <p:nvSpPr>
+          <p:cNvPr id="15" name="Arrow: Left-Right 14">
+            <a:extLst>
+              <a:ext uri="{FF2B5EF4-FFF2-40B4-BE49-F238E27FC236}">
+                <a16:creationId xmlns:a16="http://schemas.microsoft.com/office/drawing/2014/main" id="{879C1119-E9DC-E61C-CF82-D9A0A117A36A}"/>
+              </a:ext>
+            </a:extLst>
+          </p:cNvPr>
+          <p:cNvSpPr/>
+          <p:nvPr/>
+        </p:nvSpPr>
+        <p:spPr>
+          <a:xfrm>
+            <a:off x="4738430" y="4922147"/>
+            <a:ext cx="1065386" cy="181471"/>
+          </a:xfrm>
+          <a:prstGeom prst="leftRightArrow">
+            <a:avLst/>
+          </a:prstGeom>
+        </p:spPr>
+        <p:style>
+          <a:lnRef idx="2">
+            <a:schemeClr val="accent1">
+              <a:shade val="15000"/>
+            </a:schemeClr>
+          </a:lnRef>
+          <a:fillRef idx="1">
+            <a:schemeClr val="accent1"/>
+          </a:fillRef>
+          <a:effectRef idx="0">
+            <a:schemeClr val="accent1"/>
+          </a:effectRef>
+          <a:fontRef idx="minor">
+            <a:schemeClr val="lt1"/>
+          </a:fontRef>
+        </p:style>
+        <p:txBody>
+          <a:bodyPr rtlCol="0" anchor="ctr"/>
+          <a:lstStyle/>
+          <a:p>
+            <a:pPr algn="ctr"/>
+            <a:endParaRPr lang="en-SG"/>
+          </a:p>
+        </p:txBody>
+      </p:sp>
+      <p:sp>
+        <p:nvSpPr>
+          <p:cNvPr id="16" name="TextBox 15">
+            <a:extLst>
+              <a:ext uri="{FF2B5EF4-FFF2-40B4-BE49-F238E27FC236}">
+                <a16:creationId xmlns:a16="http://schemas.microsoft.com/office/drawing/2014/main" id="{1127F6D0-07E3-2B73-F7A3-849440E85A43}"/>
+              </a:ext>
+            </a:extLst>
+          </p:cNvPr>
+          <p:cNvSpPr txBox="1"/>
+          <p:nvPr/>
+        </p:nvSpPr>
+        <p:spPr>
+          <a:xfrm>
+            <a:off x="5990643" y="2746357"/>
+            <a:ext cx="1058239" cy="523220"/>
+          </a:xfrm>
+          <a:prstGeom prst="rect">
+            <a:avLst/>
+          </a:prstGeom>
+          <a:noFill/>
+        </p:spPr>
+        <p:txBody>
+          <a:bodyPr wrap="square" rtlCol="0">
+            <a:spAutoFit/>
+          </a:bodyPr>
+          <a:lstStyle/>
+          <a:p>
+            <a:r>
+              <a:rPr lang="en-US" sz="1400" b="1" dirty="0">
+                <a:solidFill>
+                  <a:schemeClr val="bg1"/>
+                </a:solidFill>
+              </a:rPr>
+              <a:t>Modbus TCP </a:t>
+            </a:r>
+          </a:p>
+        </p:txBody>
+      </p:sp>
+      <p:sp>
+        <p:nvSpPr>
+          <p:cNvPr id="17" name="TextBox 16">
+            <a:extLst>
+              <a:ext uri="{FF2B5EF4-FFF2-40B4-BE49-F238E27FC236}">
+                <a16:creationId xmlns:a16="http://schemas.microsoft.com/office/drawing/2014/main" id="{A07A1336-3BBD-1D97-9BAB-4250C55DB5B8}"/>
+              </a:ext>
+            </a:extLst>
+          </p:cNvPr>
+          <p:cNvSpPr txBox="1"/>
+          <p:nvPr/>
+        </p:nvSpPr>
+        <p:spPr>
+          <a:xfrm>
+            <a:off x="5834639" y="1176494"/>
+            <a:ext cx="4277787" cy="307777"/>
+          </a:xfrm>
+          <a:prstGeom prst="rect">
+            <a:avLst/>
+          </a:prstGeom>
+          <a:noFill/>
+        </p:spPr>
+        <p:txBody>
+          <a:bodyPr wrap="square" rtlCol="0">
+            <a:spAutoFit/>
+          </a:bodyPr>
+          <a:lstStyle/>
+          <a:p>
+            <a:r>
+              <a:rPr lang="en-US" sz="1400" b="1" dirty="0">
+                <a:solidFill>
+                  <a:schemeClr val="accent1">
+                    <a:lumMod val="75000"/>
+                  </a:schemeClr>
+                </a:solidFill>
+              </a:rPr>
+              <a:t>Power Grid SCADA System HMI</a:t>
+            </a:r>
+            <a:endParaRPr lang="en-SG" sz="1400" b="1" dirty="0">
+              <a:solidFill>
+                <a:schemeClr val="accent1">
+                  <a:lumMod val="75000"/>
+                </a:schemeClr>
+              </a:solidFill>
+            </a:endParaRPr>
+          </a:p>
+        </p:txBody>
+      </p:sp>
+      <p:sp>
+        <p:nvSpPr>
+          <p:cNvPr id="18" name="TextBox 17">
+            <a:extLst>
+              <a:ext uri="{FF2B5EF4-FFF2-40B4-BE49-F238E27FC236}">
+                <a16:creationId xmlns:a16="http://schemas.microsoft.com/office/drawing/2014/main" id="{B6970F1C-FA83-2240-3AE4-91EA7052B534}"/>
+              </a:ext>
+            </a:extLst>
+          </p:cNvPr>
+          <p:cNvSpPr txBox="1"/>
+          <p:nvPr/>
+        </p:nvSpPr>
+        <p:spPr>
+          <a:xfrm>
+            <a:off x="796422" y="699339"/>
+            <a:ext cx="7884016" cy="400110"/>
+          </a:xfrm>
+          <a:prstGeom prst="rect">
+            <a:avLst/>
+          </a:prstGeom>
+          <a:noFill/>
+          <a:ln w="19050">
+            <a:solidFill>
+              <a:schemeClr val="tx1"/>
+            </a:solidFill>
+            <a:prstDash val="sysDash"/>
+          </a:ln>
+        </p:spPr>
+        <p:txBody>
+          <a:bodyPr wrap="square" rtlCol="0">
+            <a:spAutoFit/>
+          </a:bodyPr>
+          <a:lstStyle/>
+          <a:p>
+            <a:r>
+              <a:rPr lang="en-US" sz="2000" b="1" dirty="0"/>
+              <a:t>Use PLC to Remote Control Circuit Breaker in Power Grid System </a:t>
+            </a:r>
+            <a:endParaRPr lang="en-SG" sz="2000" b="1" dirty="0"/>
+          </a:p>
+        </p:txBody>
+      </p:sp>
+    </p:spTree>
+    <p:extLst>
+      <p:ext uri="{BB962C8B-B14F-4D97-AF65-F5344CB8AC3E}">
+        <p14:creationId xmlns:p14="http://schemas.microsoft.com/office/powerpoint/2010/main" val="1465766791"/>
+      </p:ext>
+    </p:extLst>
+  </p:cSld>
+  <p:clrMapOvr>
+    <a:masterClrMapping/>
+  </p:clrMapOvr>
+</p:sld>
+</file>
+
+<file path=ppt/slides/slide8.xml><?xml version="1.0" encoding="utf-8"?>
+<p:sld xmlns:a="http://schemas.openxmlformats.org/drawingml/2006/main" xmlns:r="http://schemas.openxmlformats.org/officeDocument/2006/relationships" xmlns:p="http://schemas.openxmlformats.org/presentationml/2006/main">
+  <p:cSld>
+    <p:spTree>
+      <p:nvGrpSpPr>
+        <p:cNvPr id="1" name=""/>
+        <p:cNvGrpSpPr/>
+        <p:nvPr/>
+      </p:nvGrpSpPr>
+      <p:grpSpPr>
+        <a:xfrm>
+          <a:off x="0" y="0"/>
+          <a:ext cx="0" cy="0"/>
+          <a:chOff x="0" y="0"/>
+          <a:chExt cx="0" cy="0"/>
+        </a:xfrm>
+      </p:grpSpPr>
+      <p:pic>
+        <p:nvPicPr>
+          <p:cNvPr id="5" name="Picture 4">
+            <a:extLst>
+              <a:ext uri="{FF2B5EF4-FFF2-40B4-BE49-F238E27FC236}">
+                <a16:creationId xmlns:a16="http://schemas.microsoft.com/office/drawing/2014/main" id="{C7AAF03C-0833-E00C-F1A4-6CC6AD7092F8}"/>
+              </a:ext>
+            </a:extLst>
+          </p:cNvPr>
+          <p:cNvPicPr>
+            <a:picLocks noChangeAspect="1"/>
+          </p:cNvPicPr>
+          <p:nvPr/>
+        </p:nvPicPr>
+        <p:blipFill>
+          <a:blip r:embed="rId2"/>
+          <a:stretch>
+            <a:fillRect/>
+          </a:stretch>
+        </p:blipFill>
+        <p:spPr>
+          <a:xfrm>
+            <a:off x="963766" y="1569952"/>
+            <a:ext cx="5600000" cy="2361905"/>
+          </a:xfrm>
+          <a:prstGeom prst="rect">
+            <a:avLst/>
+          </a:prstGeom>
+        </p:spPr>
+      </p:pic>
+      <p:cxnSp>
+        <p:nvCxnSpPr>
+          <p:cNvPr id="7" name="Straight Arrow Connector 6">
+            <a:extLst>
+              <a:ext uri="{FF2B5EF4-FFF2-40B4-BE49-F238E27FC236}">
+                <a16:creationId xmlns:a16="http://schemas.microsoft.com/office/drawing/2014/main" id="{4D1B00B2-939C-06CF-6DEF-599BDBC53CC1}"/>
+              </a:ext>
+            </a:extLst>
+          </p:cNvPr>
+          <p:cNvCxnSpPr>
+            <a:cxnSpLocks/>
+          </p:cNvCxnSpPr>
+          <p:nvPr/>
+        </p:nvCxnSpPr>
+        <p:spPr>
+          <a:xfrm>
+            <a:off x="4316251" y="3291840"/>
+            <a:ext cx="0" cy="1426385"/>
+          </a:xfrm>
+          <a:prstGeom prst="straightConnector1">
+            <a:avLst/>
+          </a:prstGeom>
+          <a:ln>
+            <a:solidFill>
+              <a:srgbClr val="FF0000"/>
+            </a:solidFill>
+            <a:prstDash val="sysDash"/>
+            <a:tailEnd type="triangle"/>
+          </a:ln>
+        </p:spPr>
+        <p:style>
+          <a:lnRef idx="2">
+            <a:schemeClr val="accent1"/>
+          </a:lnRef>
+          <a:fillRef idx="0">
+            <a:schemeClr val="accent1"/>
+          </a:fillRef>
+          <a:effectRef idx="1">
+            <a:schemeClr val="accent1"/>
+          </a:effectRef>
+          <a:fontRef idx="minor">
+            <a:schemeClr val="tx1"/>
+          </a:fontRef>
+        </p:style>
+      </p:cxnSp>
+      <p:cxnSp>
+        <p:nvCxnSpPr>
+          <p:cNvPr id="10" name="Straight Arrow Connector 9">
+            <a:extLst>
+              <a:ext uri="{FF2B5EF4-FFF2-40B4-BE49-F238E27FC236}">
+                <a16:creationId xmlns:a16="http://schemas.microsoft.com/office/drawing/2014/main" id="{9FCEE69A-5D09-5BEE-F848-E378DFE165DA}"/>
+              </a:ext>
+            </a:extLst>
+          </p:cNvPr>
+          <p:cNvCxnSpPr>
+            <a:cxnSpLocks/>
+          </p:cNvCxnSpPr>
+          <p:nvPr/>
+        </p:nvCxnSpPr>
+        <p:spPr>
+          <a:xfrm flipV="1">
+            <a:off x="4550167" y="3291840"/>
+            <a:ext cx="0" cy="1426385"/>
+          </a:xfrm>
+          <a:prstGeom prst="straightConnector1">
+            <a:avLst/>
+          </a:prstGeom>
+          <a:ln>
+            <a:solidFill>
+              <a:srgbClr val="FF0000"/>
+            </a:solidFill>
+            <a:prstDash val="sysDash"/>
+            <a:tailEnd type="triangle"/>
+          </a:ln>
+        </p:spPr>
+        <p:style>
+          <a:lnRef idx="2">
+            <a:schemeClr val="accent1"/>
+          </a:lnRef>
+          <a:fillRef idx="0">
+            <a:schemeClr val="accent1"/>
+          </a:fillRef>
+          <a:effectRef idx="1">
+            <a:schemeClr val="accent1"/>
+          </a:effectRef>
+          <a:fontRef idx="minor">
+            <a:schemeClr val="tx1"/>
+          </a:fontRef>
+        </p:style>
+      </p:cxnSp>
+      <p:sp>
+        <p:nvSpPr>
+          <p:cNvPr id="15" name="Rectangle 14">
+            <a:extLst>
+              <a:ext uri="{FF2B5EF4-FFF2-40B4-BE49-F238E27FC236}">
+                <a16:creationId xmlns:a16="http://schemas.microsoft.com/office/drawing/2014/main" id="{4047556D-27FA-62FD-6568-06A8078AA4CA}"/>
+              </a:ext>
+            </a:extLst>
+          </p:cNvPr>
+          <p:cNvSpPr/>
+          <p:nvPr/>
+        </p:nvSpPr>
+        <p:spPr>
+          <a:xfrm>
+            <a:off x="4058292" y="2750904"/>
+            <a:ext cx="626724" cy="540936"/>
+          </a:xfrm>
+          <a:prstGeom prst="rect">
+            <a:avLst/>
+          </a:prstGeom>
+          <a:noFill/>
+          <a:ln>
+            <a:solidFill>
+              <a:srgbClr val="FF0000"/>
+            </a:solidFill>
+            <a:prstDash val="sysDash"/>
+          </a:ln>
+        </p:spPr>
+        <p:style>
+          <a:lnRef idx="2">
+            <a:schemeClr val="accent1">
+              <a:shade val="15000"/>
+            </a:schemeClr>
+          </a:lnRef>
+          <a:fillRef idx="1">
+            <a:schemeClr val="accent1"/>
+          </a:fillRef>
+          <a:effectRef idx="0">
+            <a:schemeClr val="accent1"/>
+          </a:effectRef>
+          <a:fontRef idx="minor">
+            <a:schemeClr val="lt1"/>
+          </a:fontRef>
+        </p:style>
+        <p:txBody>
+          <a:bodyPr rtlCol="0" anchor="ctr"/>
+          <a:lstStyle/>
+          <a:p>
+            <a:pPr algn="ctr"/>
+            <a:endParaRPr lang="en-SG" dirty="0"/>
+          </a:p>
+        </p:txBody>
+      </p:sp>
+      <p:sp>
+        <p:nvSpPr>
+          <p:cNvPr id="16" name="TextBox 15">
+            <a:extLst>
+              <a:ext uri="{FF2B5EF4-FFF2-40B4-BE49-F238E27FC236}">
+                <a16:creationId xmlns:a16="http://schemas.microsoft.com/office/drawing/2014/main" id="{518EF588-6F9F-15ED-3820-674B02628556}"/>
+              </a:ext>
+            </a:extLst>
+          </p:cNvPr>
+          <p:cNvSpPr txBox="1"/>
+          <p:nvPr/>
+        </p:nvSpPr>
+        <p:spPr>
+          <a:xfrm>
+            <a:off x="1696993" y="3911527"/>
+            <a:ext cx="1797970" cy="461665"/>
+          </a:xfrm>
+          <a:prstGeom prst="rect">
+            <a:avLst/>
+          </a:prstGeom>
+          <a:noFill/>
+        </p:spPr>
+        <p:txBody>
+          <a:bodyPr wrap="square" rtlCol="0">
+            <a:spAutoFit/>
+          </a:bodyPr>
+          <a:lstStyle/>
+          <a:p>
+            <a:r>
+              <a:rPr lang="en-US" sz="1200" b="1" dirty="0"/>
+              <a:t>Function </a:t>
+            </a:r>
+            <a:r>
+              <a:rPr lang="en-US" sz="1200" b="1" dirty="0" err="1">
+                <a:highlight>
+                  <a:srgbClr val="C0C0C0"/>
+                </a:highlight>
+              </a:rPr>
+              <a:t>setCurrent</a:t>
+            </a:r>
+            <a:r>
+              <a:rPr lang="en-US" sz="1200" b="1" dirty="0">
+                <a:highlight>
+                  <a:srgbClr val="C0C0C0"/>
+                </a:highlight>
+              </a:rPr>
+              <a:t>() </a:t>
+            </a:r>
+            <a:r>
+              <a:rPr lang="en-US" sz="1200" b="1" dirty="0"/>
+              <a:t>interact with generator </a:t>
+            </a:r>
+            <a:endParaRPr lang="en-SG" sz="1200" b="1" dirty="0"/>
+          </a:p>
+        </p:txBody>
+      </p:sp>
+      <p:cxnSp>
+        <p:nvCxnSpPr>
+          <p:cNvPr id="17" name="Connector: Elbow 16">
+            <a:extLst>
+              <a:ext uri="{FF2B5EF4-FFF2-40B4-BE49-F238E27FC236}">
+                <a16:creationId xmlns:a16="http://schemas.microsoft.com/office/drawing/2014/main" id="{A83C118B-338D-E187-02F0-AFC558DB77DD}"/>
+              </a:ext>
+            </a:extLst>
+          </p:cNvPr>
+          <p:cNvCxnSpPr>
+            <a:cxnSpLocks/>
+            <a:endCxn id="22" idx="2"/>
+          </p:cNvCxnSpPr>
+          <p:nvPr/>
+        </p:nvCxnSpPr>
+        <p:spPr>
+          <a:xfrm rot="10800000" flipV="1">
+            <a:off x="3376256" y="3291827"/>
+            <a:ext cx="682038" cy="232207"/>
+          </a:xfrm>
+          <a:prstGeom prst="bentConnector4">
+            <a:avLst>
+              <a:gd name="adj1" fmla="val 17148"/>
+              <a:gd name="adj2" fmla="val 353307"/>
+            </a:avLst>
+          </a:prstGeom>
+          <a:ln>
+            <a:solidFill>
+              <a:srgbClr val="FF0000"/>
+            </a:solidFill>
+            <a:prstDash val="sysDash"/>
+            <a:tailEnd type="triangle"/>
+          </a:ln>
+        </p:spPr>
+        <p:style>
+          <a:lnRef idx="2">
+            <a:schemeClr val="accent1"/>
+          </a:lnRef>
+          <a:fillRef idx="0">
+            <a:schemeClr val="accent1"/>
+          </a:fillRef>
+          <a:effectRef idx="1">
+            <a:schemeClr val="accent1"/>
+          </a:effectRef>
+          <a:fontRef idx="minor">
+            <a:schemeClr val="tx1"/>
+          </a:fontRef>
+        </p:style>
+      </p:cxnSp>
+      <p:sp>
+        <p:nvSpPr>
+          <p:cNvPr id="22" name="Rectangle 21">
+            <a:extLst>
+              <a:ext uri="{FF2B5EF4-FFF2-40B4-BE49-F238E27FC236}">
+                <a16:creationId xmlns:a16="http://schemas.microsoft.com/office/drawing/2014/main" id="{40F57E3B-3BA0-7C47-41E5-EB45942ABB4F}"/>
+              </a:ext>
+            </a:extLst>
+          </p:cNvPr>
+          <p:cNvSpPr/>
+          <p:nvPr/>
+        </p:nvSpPr>
+        <p:spPr>
+          <a:xfrm>
+            <a:off x="2928136" y="2619910"/>
+            <a:ext cx="896240" cy="904125"/>
+          </a:xfrm>
+          <a:prstGeom prst="rect">
+            <a:avLst/>
+          </a:prstGeom>
+          <a:noFill/>
+          <a:ln>
+            <a:solidFill>
+              <a:srgbClr val="FF0000"/>
+            </a:solidFill>
+            <a:prstDash val="sysDash"/>
+          </a:ln>
+        </p:spPr>
+        <p:style>
+          <a:lnRef idx="2">
+            <a:schemeClr val="accent1">
+              <a:shade val="15000"/>
+            </a:schemeClr>
+          </a:lnRef>
+          <a:fillRef idx="1">
+            <a:schemeClr val="accent1"/>
+          </a:fillRef>
+          <a:effectRef idx="0">
+            <a:schemeClr val="accent1"/>
+          </a:effectRef>
+          <a:fontRef idx="minor">
+            <a:schemeClr val="lt1"/>
+          </a:fontRef>
+        </p:style>
+        <p:txBody>
+          <a:bodyPr rtlCol="0" anchor="ctr"/>
+          <a:lstStyle/>
+          <a:p>
+            <a:pPr algn="ctr"/>
+            <a:endParaRPr lang="en-SG" dirty="0"/>
+          </a:p>
+        </p:txBody>
+      </p:sp>
+      <p:sp>
+        <p:nvSpPr>
+          <p:cNvPr id="28" name="Rectangle 27">
+            <a:extLst>
+              <a:ext uri="{FF2B5EF4-FFF2-40B4-BE49-F238E27FC236}">
+                <a16:creationId xmlns:a16="http://schemas.microsoft.com/office/drawing/2014/main" id="{16328C08-2B5E-55C3-29B0-27D167F69412}"/>
+              </a:ext>
+            </a:extLst>
+          </p:cNvPr>
+          <p:cNvSpPr/>
+          <p:nvPr/>
+        </p:nvSpPr>
+        <p:spPr>
+          <a:xfrm>
+            <a:off x="3831960" y="4725864"/>
+            <a:ext cx="1590094" cy="674165"/>
+          </a:xfrm>
+          <a:prstGeom prst="rect">
+            <a:avLst/>
+          </a:prstGeom>
+        </p:spPr>
+        <p:style>
+          <a:lnRef idx="2">
+            <a:schemeClr val="accent1">
+              <a:shade val="15000"/>
+            </a:schemeClr>
+          </a:lnRef>
+          <a:fillRef idx="1">
+            <a:schemeClr val="accent1"/>
+          </a:fillRef>
+          <a:effectRef idx="0">
+            <a:schemeClr val="accent1"/>
+          </a:effectRef>
+          <a:fontRef idx="minor">
+            <a:schemeClr val="lt1"/>
+          </a:fontRef>
+        </p:style>
+        <p:txBody>
+          <a:bodyPr rtlCol="0" anchor="ctr"/>
+          <a:lstStyle/>
+          <a:p>
+            <a:pPr algn="ctr"/>
+            <a:endParaRPr lang="en-SG" dirty="0"/>
+          </a:p>
+        </p:txBody>
+      </p:sp>
+      <p:pic>
+        <p:nvPicPr>
+          <p:cNvPr id="30" name="Picture 29" descr="A close up of a computer&#10;&#10;Description automatically generated">
+            <a:extLst>
+              <a:ext uri="{FF2B5EF4-FFF2-40B4-BE49-F238E27FC236}">
+                <a16:creationId xmlns:a16="http://schemas.microsoft.com/office/drawing/2014/main" id="{F4F08F73-71C5-12D9-79B9-8B99E1699A3E}"/>
+              </a:ext>
+            </a:extLst>
+          </p:cNvPr>
+          <p:cNvPicPr>
+            <a:picLocks noChangeAspect="1"/>
+          </p:cNvPicPr>
+          <p:nvPr/>
+        </p:nvPicPr>
+        <p:blipFill>
+          <a:blip r:embed="rId3">
+            <a:extLst>
+              <a:ext uri="{28A0092B-C50C-407E-A947-70E740481C1C}">
+                <a14:useLocalDpi xmlns:a14="http://schemas.microsoft.com/office/drawing/2010/main" val="0"/>
+              </a:ext>
+            </a:extLst>
+          </a:blip>
+          <a:stretch>
+            <a:fillRect/>
+          </a:stretch>
+        </p:blipFill>
+        <p:spPr>
+          <a:xfrm>
+            <a:off x="3903048" y="4788343"/>
+            <a:ext cx="476190" cy="476190"/>
+          </a:xfrm>
+          <a:prstGeom prst="rect">
+            <a:avLst/>
+          </a:prstGeom>
+          <a:ln>
+            <a:solidFill>
+              <a:schemeClr val="tx1"/>
+            </a:solidFill>
+          </a:ln>
+        </p:spPr>
+      </p:pic>
+      <p:sp>
+        <p:nvSpPr>
+          <p:cNvPr id="33" name="TextBox 32">
+            <a:extLst>
+              <a:ext uri="{FF2B5EF4-FFF2-40B4-BE49-F238E27FC236}">
+                <a16:creationId xmlns:a16="http://schemas.microsoft.com/office/drawing/2014/main" id="{7C6A56C8-5E48-3349-B1BD-C5CBD724AAAC}"/>
+              </a:ext>
+            </a:extLst>
+          </p:cNvPr>
+          <p:cNvSpPr txBox="1"/>
+          <p:nvPr/>
+        </p:nvSpPr>
+        <p:spPr>
+          <a:xfrm>
+            <a:off x="871299" y="1175780"/>
+            <a:ext cx="2419514" cy="338554"/>
+          </a:xfrm>
+          <a:prstGeom prst="rect">
+            <a:avLst/>
+          </a:prstGeom>
+          <a:noFill/>
+        </p:spPr>
+        <p:txBody>
+          <a:bodyPr wrap="square" rtlCol="0">
+            <a:spAutoFit/>
+          </a:bodyPr>
+          <a:lstStyle/>
+          <a:p>
+            <a:r>
+              <a:rPr lang="en-US" sz="1600" b="1" dirty="0"/>
+              <a:t>Physical Simulation </a:t>
+            </a:r>
+            <a:endParaRPr lang="en-SG" sz="1600" b="1" dirty="0"/>
+          </a:p>
+        </p:txBody>
+      </p:sp>
+      <p:sp>
+        <p:nvSpPr>
+          <p:cNvPr id="6" name="TextBox 5">
+            <a:extLst>
+              <a:ext uri="{FF2B5EF4-FFF2-40B4-BE49-F238E27FC236}">
+                <a16:creationId xmlns:a16="http://schemas.microsoft.com/office/drawing/2014/main" id="{A842F6D5-DFF1-E1D0-355E-7965A6448C05}"/>
+              </a:ext>
+            </a:extLst>
+          </p:cNvPr>
+          <p:cNvSpPr txBox="1"/>
+          <p:nvPr/>
+        </p:nvSpPr>
+        <p:spPr>
+          <a:xfrm>
+            <a:off x="4353368" y="4764828"/>
+            <a:ext cx="1139774" cy="523220"/>
+          </a:xfrm>
+          <a:prstGeom prst="rect">
+            <a:avLst/>
+          </a:prstGeom>
+          <a:noFill/>
+        </p:spPr>
+        <p:txBody>
+          <a:bodyPr wrap="square" rtlCol="0">
+            <a:spAutoFit/>
+          </a:bodyPr>
+          <a:lstStyle/>
+          <a:p>
+            <a:r>
+              <a:rPr lang="en-US" sz="1400" b="1" dirty="0">
+                <a:solidFill>
+                  <a:schemeClr val="bg1"/>
+                </a:solidFill>
+              </a:rPr>
+              <a:t>Virtual PLC Program</a:t>
+            </a:r>
+            <a:endParaRPr lang="en-SG" sz="1400" b="1" dirty="0">
+              <a:solidFill>
+                <a:schemeClr val="bg1"/>
+              </a:solidFill>
+            </a:endParaRPr>
+          </a:p>
+        </p:txBody>
+      </p:sp>
+      <p:sp>
+        <p:nvSpPr>
+          <p:cNvPr id="34" name="TextBox 33">
+            <a:extLst>
+              <a:ext uri="{FF2B5EF4-FFF2-40B4-BE49-F238E27FC236}">
+                <a16:creationId xmlns:a16="http://schemas.microsoft.com/office/drawing/2014/main" id="{88BA4CA2-ED92-D5B1-3995-E2D2991EF106}"/>
+              </a:ext>
+            </a:extLst>
+          </p:cNvPr>
+          <p:cNvSpPr txBox="1"/>
+          <p:nvPr/>
+        </p:nvSpPr>
+        <p:spPr>
+          <a:xfrm>
+            <a:off x="2325923" y="4338812"/>
+            <a:ext cx="2106206" cy="461665"/>
+          </a:xfrm>
+          <a:prstGeom prst="rect">
+            <a:avLst/>
+          </a:prstGeom>
+          <a:noFill/>
+        </p:spPr>
+        <p:txBody>
+          <a:bodyPr wrap="square" rtlCol="0">
+            <a:spAutoFit/>
+          </a:bodyPr>
+          <a:lstStyle/>
+          <a:p>
+            <a:r>
+              <a:rPr lang="en-US" sz="1200" b="1" dirty="0"/>
+              <a:t>Function </a:t>
+            </a:r>
+            <a:r>
+              <a:rPr lang="en-US" sz="1200" b="1" dirty="0" err="1">
+                <a:highlight>
+                  <a:srgbClr val="C0C0C0"/>
+                </a:highlight>
+              </a:rPr>
+              <a:t>getSensorState</a:t>
+            </a:r>
+            <a:r>
+              <a:rPr lang="en-US" sz="1200" b="1" dirty="0">
+                <a:highlight>
+                  <a:srgbClr val="C0C0C0"/>
+                </a:highlight>
+              </a:rPr>
+              <a:t>() </a:t>
+            </a:r>
+            <a:r>
+              <a:rPr lang="en-US" sz="1200" b="1" dirty="0"/>
+              <a:t> to send the state to PLC</a:t>
+            </a:r>
+            <a:endParaRPr lang="en-SG" sz="1200" b="1" dirty="0"/>
+          </a:p>
+        </p:txBody>
+      </p:sp>
+      <p:sp>
+        <p:nvSpPr>
+          <p:cNvPr id="35" name="TextBox 34">
+            <a:extLst>
+              <a:ext uri="{FF2B5EF4-FFF2-40B4-BE49-F238E27FC236}">
+                <a16:creationId xmlns:a16="http://schemas.microsoft.com/office/drawing/2014/main" id="{14C9FDBB-1F87-BC11-AE5C-472F0F4A83D1}"/>
+              </a:ext>
+            </a:extLst>
+          </p:cNvPr>
+          <p:cNvSpPr txBox="1"/>
+          <p:nvPr/>
+        </p:nvSpPr>
+        <p:spPr>
+          <a:xfrm>
+            <a:off x="4515083" y="4047621"/>
+            <a:ext cx="1616335" cy="646331"/>
+          </a:xfrm>
+          <a:prstGeom prst="rect">
+            <a:avLst/>
+          </a:prstGeom>
+          <a:noFill/>
+        </p:spPr>
+        <p:txBody>
+          <a:bodyPr wrap="square" rtlCol="0">
+            <a:spAutoFit/>
+          </a:bodyPr>
+          <a:lstStyle/>
+          <a:p>
+            <a:r>
+              <a:rPr lang="en-US" sz="1200" b="1" dirty="0"/>
+              <a:t>Function </a:t>
+            </a:r>
+            <a:r>
+              <a:rPr lang="en-US" sz="1200" b="1" dirty="0" err="1">
+                <a:highlight>
+                  <a:srgbClr val="C0C0C0"/>
+                </a:highlight>
+              </a:rPr>
+              <a:t>setMotor</a:t>
+            </a:r>
+            <a:r>
+              <a:rPr lang="en-US" sz="1200" b="1" dirty="0">
+                <a:highlight>
+                  <a:srgbClr val="C0C0C0"/>
+                </a:highlight>
+              </a:rPr>
+              <a:t>() </a:t>
+            </a:r>
+            <a:r>
+              <a:rPr lang="en-US" sz="1200" b="1" dirty="0"/>
+              <a:t>to get the motor change from PLC</a:t>
+            </a:r>
+            <a:endParaRPr lang="en-SG" sz="1200" b="1" dirty="0"/>
+          </a:p>
+        </p:txBody>
+      </p:sp>
+      <p:pic>
+        <p:nvPicPr>
+          <p:cNvPr id="38" name="Picture 37">
+            <a:extLst>
+              <a:ext uri="{FF2B5EF4-FFF2-40B4-BE49-F238E27FC236}">
+                <a16:creationId xmlns:a16="http://schemas.microsoft.com/office/drawing/2014/main" id="{28983D87-9FEB-63EF-017D-A6416B23F744}"/>
+              </a:ext>
+            </a:extLst>
+          </p:cNvPr>
+          <p:cNvPicPr>
+            <a:picLocks noChangeAspect="1"/>
+          </p:cNvPicPr>
+          <p:nvPr/>
+        </p:nvPicPr>
+        <p:blipFill>
+          <a:blip r:embed="rId4"/>
+          <a:stretch>
+            <a:fillRect/>
+          </a:stretch>
+        </p:blipFill>
+        <p:spPr>
+          <a:xfrm>
+            <a:off x="6675344" y="1562123"/>
+            <a:ext cx="5380952" cy="3837906"/>
+          </a:xfrm>
+          <a:prstGeom prst="rect">
+            <a:avLst/>
+          </a:prstGeom>
+        </p:spPr>
+      </p:pic>
+      <p:sp>
+        <p:nvSpPr>
+          <p:cNvPr id="39" name="TextBox 38">
+            <a:extLst>
+              <a:ext uri="{FF2B5EF4-FFF2-40B4-BE49-F238E27FC236}">
+                <a16:creationId xmlns:a16="http://schemas.microsoft.com/office/drawing/2014/main" id="{BEE09AB0-1059-AA09-E43D-D7E1C1E73770}"/>
+              </a:ext>
+            </a:extLst>
+          </p:cNvPr>
+          <p:cNvSpPr txBox="1"/>
+          <p:nvPr/>
+        </p:nvSpPr>
+        <p:spPr>
+          <a:xfrm>
+            <a:off x="6675344" y="1193696"/>
+            <a:ext cx="2016593" cy="338554"/>
+          </a:xfrm>
+          <a:prstGeom prst="rect">
+            <a:avLst/>
+          </a:prstGeom>
+          <a:noFill/>
+        </p:spPr>
+        <p:txBody>
+          <a:bodyPr wrap="square" rtlCol="0">
+            <a:spAutoFit/>
+          </a:bodyPr>
+          <a:lstStyle/>
+          <a:p>
+            <a:r>
+              <a:rPr lang="en-US" sz="1600" b="1" dirty="0"/>
+              <a:t>Power System HMI</a:t>
+            </a:r>
+            <a:endParaRPr lang="en-SG" sz="1600" b="1" dirty="0"/>
+          </a:p>
+        </p:txBody>
+      </p:sp>
+      <p:sp>
+        <p:nvSpPr>
+          <p:cNvPr id="40" name="Arrow: Left-Right 39">
+            <a:extLst>
+              <a:ext uri="{FF2B5EF4-FFF2-40B4-BE49-F238E27FC236}">
+                <a16:creationId xmlns:a16="http://schemas.microsoft.com/office/drawing/2014/main" id="{672BCCF0-78BF-8F11-DB3A-B5BFD17CF6A9}"/>
+              </a:ext>
+            </a:extLst>
+          </p:cNvPr>
+          <p:cNvSpPr/>
+          <p:nvPr/>
+        </p:nvSpPr>
+        <p:spPr>
+          <a:xfrm>
+            <a:off x="5516657" y="4900773"/>
+            <a:ext cx="1047109" cy="174662"/>
+          </a:xfrm>
+          <a:prstGeom prst="leftRightArrow">
+            <a:avLst/>
+          </a:prstGeom>
+        </p:spPr>
+        <p:style>
+          <a:lnRef idx="2">
+            <a:schemeClr val="accent1">
+              <a:shade val="15000"/>
+            </a:schemeClr>
+          </a:lnRef>
+          <a:fillRef idx="1">
+            <a:schemeClr val="accent1"/>
+          </a:fillRef>
+          <a:effectRef idx="0">
+            <a:schemeClr val="accent1"/>
+          </a:effectRef>
+          <a:fontRef idx="minor">
+            <a:schemeClr val="lt1"/>
+          </a:fontRef>
+        </p:style>
+        <p:txBody>
+          <a:bodyPr rtlCol="0" anchor="ctr"/>
+          <a:lstStyle/>
+          <a:p>
+            <a:pPr algn="ctr"/>
+            <a:endParaRPr lang="en-SG"/>
+          </a:p>
+        </p:txBody>
+      </p:sp>
+      <p:sp>
+        <p:nvSpPr>
+          <p:cNvPr id="41" name="TextBox 40">
+            <a:extLst>
+              <a:ext uri="{FF2B5EF4-FFF2-40B4-BE49-F238E27FC236}">
+                <a16:creationId xmlns:a16="http://schemas.microsoft.com/office/drawing/2014/main" id="{86E08AE1-C06B-20EA-9403-7153FAE1398B}"/>
+              </a:ext>
+            </a:extLst>
+          </p:cNvPr>
+          <p:cNvSpPr txBox="1"/>
+          <p:nvPr/>
+        </p:nvSpPr>
+        <p:spPr>
+          <a:xfrm>
+            <a:off x="5493142" y="5092252"/>
+            <a:ext cx="1340070" cy="307777"/>
+          </a:xfrm>
+          <a:prstGeom prst="rect">
+            <a:avLst/>
+          </a:prstGeom>
+          <a:noFill/>
+        </p:spPr>
+        <p:txBody>
+          <a:bodyPr wrap="square" rtlCol="0">
+            <a:spAutoFit/>
+          </a:bodyPr>
+          <a:lstStyle/>
+          <a:p>
+            <a:r>
+              <a:rPr lang="en-US" sz="1400" b="1" dirty="0"/>
+              <a:t>Modbus TCP</a:t>
+            </a:r>
+            <a:endParaRPr lang="en-SG" sz="1400" b="1" dirty="0"/>
+          </a:p>
+        </p:txBody>
+      </p:sp>
+    </p:spTree>
+    <p:extLst>
+      <p:ext uri="{BB962C8B-B14F-4D97-AF65-F5344CB8AC3E}">
+        <p14:creationId xmlns:p14="http://schemas.microsoft.com/office/powerpoint/2010/main" val="862005314"/>
+      </p:ext>
+    </p:extLst>
+  </p:cSld>
+  <p:clrMapOvr>
+    <a:masterClrMapping/>
+  </p:clrMapOvr>
+</p:sld>
+</file>
+
 <file path=ppt/theme/theme1.xml><?xml version="1.0" encoding="utf-8"?>
 <a:theme xmlns:a="http://schemas.openxmlformats.org/drawingml/2006/main" name="Office Theme">
   <a:themeElements>

</xml_diff>